<commit_message>
Updated the ppt slides for employment distribution
</commit_message>
<xml_diff>
--- a/Project1.pptx
+++ b/Project1.pptx
@@ -4,24 +4,33 @@
   <p:sldMasterIdLst>
     <p:sldMasterId id="2147483699" r:id="rId1"/>
   </p:sldMasterIdLst>
+  <p:notesMasterIdLst>
+    <p:notesMasterId r:id="rId25"/>
+  </p:notesMasterIdLst>
   <p:sldIdLst>
     <p:sldId id="256" r:id="rId2"/>
-    <p:sldId id="257" r:id="rId3"/>
-    <p:sldId id="258" r:id="rId4"/>
-    <p:sldId id="259" r:id="rId5"/>
-    <p:sldId id="260" r:id="rId6"/>
-    <p:sldId id="261" r:id="rId7"/>
-    <p:sldId id="262" r:id="rId8"/>
-    <p:sldId id="263" r:id="rId9"/>
-    <p:sldId id="264" r:id="rId10"/>
-    <p:sldId id="265" r:id="rId11"/>
-    <p:sldId id="266" r:id="rId12"/>
-    <p:sldId id="267" r:id="rId13"/>
-    <p:sldId id="268" r:id="rId14"/>
-    <p:sldId id="269" r:id="rId15"/>
-    <p:sldId id="270" r:id="rId16"/>
-    <p:sldId id="271" r:id="rId17"/>
-    <p:sldId id="272" r:id="rId18"/>
+    <p:sldId id="273" r:id="rId3"/>
+    <p:sldId id="257" r:id="rId4"/>
+    <p:sldId id="258" r:id="rId5"/>
+    <p:sldId id="259" r:id="rId6"/>
+    <p:sldId id="260" r:id="rId7"/>
+    <p:sldId id="274" r:id="rId8"/>
+    <p:sldId id="261" r:id="rId9"/>
+    <p:sldId id="276" r:id="rId10"/>
+    <p:sldId id="278" r:id="rId11"/>
+    <p:sldId id="279" r:id="rId12"/>
+    <p:sldId id="280" r:id="rId13"/>
+    <p:sldId id="262" r:id="rId14"/>
+    <p:sldId id="263" r:id="rId15"/>
+    <p:sldId id="264" r:id="rId16"/>
+    <p:sldId id="265" r:id="rId17"/>
+    <p:sldId id="266" r:id="rId18"/>
+    <p:sldId id="267" r:id="rId19"/>
+    <p:sldId id="268" r:id="rId20"/>
+    <p:sldId id="269" r:id="rId21"/>
+    <p:sldId id="270" r:id="rId22"/>
+    <p:sldId id="271" r:id="rId23"/>
+    <p:sldId id="272" r:id="rId24"/>
   </p:sldIdLst>
   <p:sldSz cx="12192000" cy="6858000"/>
   <p:notesSz cx="6858000" cy="9144000"/>
@@ -126,6 +135,439 @@
     </p:ext>
   </p:extLst>
 </p:presentation>
+</file>
+
+<file path=ppt/notesMasters/notesMaster1.xml><?xml version="1.0" encoding="utf-8"?>
+<p:notesMaster xmlns:a="http://schemas.openxmlformats.org/drawingml/2006/main" xmlns:r="http://schemas.openxmlformats.org/officeDocument/2006/relationships" xmlns:p="http://schemas.openxmlformats.org/presentationml/2006/main">
+  <p:cSld>
+    <p:bg>
+      <p:bgRef idx="1001">
+        <a:schemeClr val="bg1"/>
+      </p:bgRef>
+    </p:bg>
+    <p:spTree>
+      <p:nvGrpSpPr>
+        <p:cNvPr id="1" name=""/>
+        <p:cNvGrpSpPr/>
+        <p:nvPr/>
+      </p:nvGrpSpPr>
+      <p:grpSpPr>
+        <a:xfrm>
+          <a:off x="0" y="0"/>
+          <a:ext cx="0" cy="0"/>
+          <a:chOff x="0" y="0"/>
+          <a:chExt cx="0" cy="0"/>
+        </a:xfrm>
+      </p:grpSpPr>
+      <p:sp>
+        <p:nvSpPr>
+          <p:cNvPr id="2" name="Header Placeholder 1"/>
+          <p:cNvSpPr>
+            <a:spLocks noGrp="1"/>
+          </p:cNvSpPr>
+          <p:nvPr>
+            <p:ph type="hdr" sz="quarter"/>
+          </p:nvPr>
+        </p:nvSpPr>
+        <p:spPr>
+          <a:xfrm>
+            <a:off x="0" y="0"/>
+            <a:ext cx="2971800" cy="458788"/>
+          </a:xfrm>
+          <a:prstGeom prst="rect">
+            <a:avLst/>
+          </a:prstGeom>
+        </p:spPr>
+        <p:txBody>
+          <a:bodyPr vert="horz" lIns="91440" tIns="45720" rIns="91440" bIns="45720" rtlCol="0"/>
+          <a:lstStyle>
+            <a:lvl1pPr algn="l">
+              <a:defRPr sz="1200"/>
+            </a:lvl1pPr>
+          </a:lstStyle>
+          <a:p>
+            <a:endParaRPr lang="en-US"/>
+          </a:p>
+        </p:txBody>
+      </p:sp>
+      <p:sp>
+        <p:nvSpPr>
+          <p:cNvPr id="3" name="Date Placeholder 2"/>
+          <p:cNvSpPr>
+            <a:spLocks noGrp="1"/>
+          </p:cNvSpPr>
+          <p:nvPr>
+            <p:ph type="dt" idx="1"/>
+          </p:nvPr>
+        </p:nvSpPr>
+        <p:spPr>
+          <a:xfrm>
+            <a:off x="3884613" y="0"/>
+            <a:ext cx="2971800" cy="458788"/>
+          </a:xfrm>
+          <a:prstGeom prst="rect">
+            <a:avLst/>
+          </a:prstGeom>
+        </p:spPr>
+        <p:txBody>
+          <a:bodyPr vert="horz" lIns="91440" tIns="45720" rIns="91440" bIns="45720" rtlCol="0"/>
+          <a:lstStyle>
+            <a:lvl1pPr algn="r">
+              <a:defRPr sz="1200"/>
+            </a:lvl1pPr>
+          </a:lstStyle>
+          <a:p>
+            <a:fld id="{BBCA6A9B-02FA-464D-8DA1-F597653855BC}" type="datetimeFigureOut">
+              <a:rPr lang="en-US" smtClean="0"/>
+              <a:t>10/22/2023</a:t>
+            </a:fld>
+            <a:endParaRPr lang="en-US"/>
+          </a:p>
+        </p:txBody>
+      </p:sp>
+      <p:sp>
+        <p:nvSpPr>
+          <p:cNvPr id="4" name="Slide Image Placeholder 3"/>
+          <p:cNvSpPr>
+            <a:spLocks noGrp="1" noRot="1" noChangeAspect="1"/>
+          </p:cNvSpPr>
+          <p:nvPr>
+            <p:ph type="sldImg" idx="2"/>
+          </p:nvPr>
+        </p:nvSpPr>
+        <p:spPr>
+          <a:xfrm>
+            <a:off x="685800" y="1143000"/>
+            <a:ext cx="5486400" cy="3086100"/>
+          </a:xfrm>
+          <a:prstGeom prst="rect">
+            <a:avLst/>
+          </a:prstGeom>
+          <a:noFill/>
+          <a:ln w="12700">
+            <a:solidFill>
+              <a:prstClr val="black"/>
+            </a:solidFill>
+          </a:ln>
+        </p:spPr>
+        <p:txBody>
+          <a:bodyPr vert="horz" lIns="91440" tIns="45720" rIns="91440" bIns="45720" rtlCol="0" anchor="ctr"/>
+          <a:lstStyle/>
+          <a:p>
+            <a:endParaRPr lang="en-US"/>
+          </a:p>
+        </p:txBody>
+      </p:sp>
+      <p:sp>
+        <p:nvSpPr>
+          <p:cNvPr id="5" name="Notes Placeholder 4"/>
+          <p:cNvSpPr>
+            <a:spLocks noGrp="1"/>
+          </p:cNvSpPr>
+          <p:nvPr>
+            <p:ph type="body" sz="quarter" idx="3"/>
+          </p:nvPr>
+        </p:nvSpPr>
+        <p:spPr>
+          <a:xfrm>
+            <a:off x="685800" y="4400550"/>
+            <a:ext cx="5486400" cy="3600450"/>
+          </a:xfrm>
+          <a:prstGeom prst="rect">
+            <a:avLst/>
+          </a:prstGeom>
+        </p:spPr>
+        <p:txBody>
+          <a:bodyPr vert="horz" lIns="91440" tIns="45720" rIns="91440" bIns="45720" rtlCol="0"/>
+          <a:lstStyle/>
+          <a:p>
+            <a:pPr lvl="0"/>
+            <a:r>
+              <a:rPr lang="en-US"/>
+              <a:t>Click to edit Master text styles</a:t>
+            </a:r>
+          </a:p>
+          <a:p>
+            <a:pPr lvl="1"/>
+            <a:r>
+              <a:rPr lang="en-US"/>
+              <a:t>Second level</a:t>
+            </a:r>
+          </a:p>
+          <a:p>
+            <a:pPr lvl="2"/>
+            <a:r>
+              <a:rPr lang="en-US"/>
+              <a:t>Third level</a:t>
+            </a:r>
+          </a:p>
+          <a:p>
+            <a:pPr lvl="3"/>
+            <a:r>
+              <a:rPr lang="en-US"/>
+              <a:t>Fourth level</a:t>
+            </a:r>
+          </a:p>
+          <a:p>
+            <a:pPr lvl="4"/>
+            <a:r>
+              <a:rPr lang="en-US"/>
+              <a:t>Fifth level</a:t>
+            </a:r>
+          </a:p>
+        </p:txBody>
+      </p:sp>
+      <p:sp>
+        <p:nvSpPr>
+          <p:cNvPr id="6" name="Footer Placeholder 5"/>
+          <p:cNvSpPr>
+            <a:spLocks noGrp="1"/>
+          </p:cNvSpPr>
+          <p:nvPr>
+            <p:ph type="ftr" sz="quarter" idx="4"/>
+          </p:nvPr>
+        </p:nvSpPr>
+        <p:spPr>
+          <a:xfrm>
+            <a:off x="0" y="8685213"/>
+            <a:ext cx="2971800" cy="458787"/>
+          </a:xfrm>
+          <a:prstGeom prst="rect">
+            <a:avLst/>
+          </a:prstGeom>
+        </p:spPr>
+        <p:txBody>
+          <a:bodyPr vert="horz" lIns="91440" tIns="45720" rIns="91440" bIns="45720" rtlCol="0" anchor="b"/>
+          <a:lstStyle>
+            <a:lvl1pPr algn="l">
+              <a:defRPr sz="1200"/>
+            </a:lvl1pPr>
+          </a:lstStyle>
+          <a:p>
+            <a:endParaRPr lang="en-US"/>
+          </a:p>
+        </p:txBody>
+      </p:sp>
+      <p:sp>
+        <p:nvSpPr>
+          <p:cNvPr id="7" name="Slide Number Placeholder 6"/>
+          <p:cNvSpPr>
+            <a:spLocks noGrp="1"/>
+          </p:cNvSpPr>
+          <p:nvPr>
+            <p:ph type="sldNum" sz="quarter" idx="5"/>
+          </p:nvPr>
+        </p:nvSpPr>
+        <p:spPr>
+          <a:xfrm>
+            <a:off x="3884613" y="8685213"/>
+            <a:ext cx="2971800" cy="458787"/>
+          </a:xfrm>
+          <a:prstGeom prst="rect">
+            <a:avLst/>
+          </a:prstGeom>
+        </p:spPr>
+        <p:txBody>
+          <a:bodyPr vert="horz" lIns="91440" tIns="45720" rIns="91440" bIns="45720" rtlCol="0" anchor="b"/>
+          <a:lstStyle>
+            <a:lvl1pPr algn="r">
+              <a:defRPr sz="1200"/>
+            </a:lvl1pPr>
+          </a:lstStyle>
+          <a:p>
+            <a:fld id="{82B1EC9F-1E60-4188-BBEA-A2871E828479}" type="slidenum">
+              <a:rPr lang="en-US" smtClean="0"/>
+              <a:t>‹#›</a:t>
+            </a:fld>
+            <a:endParaRPr lang="en-US"/>
+          </a:p>
+        </p:txBody>
+      </p:sp>
+    </p:spTree>
+    <p:extLst>
+      <p:ext uri="{BB962C8B-B14F-4D97-AF65-F5344CB8AC3E}">
+        <p14:creationId xmlns:p14="http://schemas.microsoft.com/office/powerpoint/2010/main" val="1782251157"/>
+      </p:ext>
+    </p:extLst>
+  </p:cSld>
+  <p:clrMap bg1="lt1" tx1="dk1" bg2="lt2" tx2="dk2" accent1="accent1" accent2="accent2" accent3="accent3" accent4="accent4" accent5="accent5" accent6="accent6" hlink="hlink" folHlink="folHlink"/>
+  <p:notesStyle>
+    <a:lvl1pPr marL="0" algn="l" defTabSz="914400" rtl="0" eaLnBrk="1" latinLnBrk="0" hangingPunct="1">
+      <a:defRPr sz="1200" kern="1200">
+        <a:solidFill>
+          <a:schemeClr val="tx1"/>
+        </a:solidFill>
+        <a:latin typeface="+mn-lt"/>
+        <a:ea typeface="+mn-ea"/>
+        <a:cs typeface="+mn-cs"/>
+      </a:defRPr>
+    </a:lvl1pPr>
+    <a:lvl2pPr marL="457200" algn="l" defTabSz="914400" rtl="0" eaLnBrk="1" latinLnBrk="0" hangingPunct="1">
+      <a:defRPr sz="1200" kern="1200">
+        <a:solidFill>
+          <a:schemeClr val="tx1"/>
+        </a:solidFill>
+        <a:latin typeface="+mn-lt"/>
+        <a:ea typeface="+mn-ea"/>
+        <a:cs typeface="+mn-cs"/>
+      </a:defRPr>
+    </a:lvl2pPr>
+    <a:lvl3pPr marL="914400" algn="l" defTabSz="914400" rtl="0" eaLnBrk="1" latinLnBrk="0" hangingPunct="1">
+      <a:defRPr sz="1200" kern="1200">
+        <a:solidFill>
+          <a:schemeClr val="tx1"/>
+        </a:solidFill>
+        <a:latin typeface="+mn-lt"/>
+        <a:ea typeface="+mn-ea"/>
+        <a:cs typeface="+mn-cs"/>
+      </a:defRPr>
+    </a:lvl3pPr>
+    <a:lvl4pPr marL="1371600" algn="l" defTabSz="914400" rtl="0" eaLnBrk="1" latinLnBrk="0" hangingPunct="1">
+      <a:defRPr sz="1200" kern="1200">
+        <a:solidFill>
+          <a:schemeClr val="tx1"/>
+        </a:solidFill>
+        <a:latin typeface="+mn-lt"/>
+        <a:ea typeface="+mn-ea"/>
+        <a:cs typeface="+mn-cs"/>
+      </a:defRPr>
+    </a:lvl4pPr>
+    <a:lvl5pPr marL="1828800" algn="l" defTabSz="914400" rtl="0" eaLnBrk="1" latinLnBrk="0" hangingPunct="1">
+      <a:defRPr sz="1200" kern="1200">
+        <a:solidFill>
+          <a:schemeClr val="tx1"/>
+        </a:solidFill>
+        <a:latin typeface="+mn-lt"/>
+        <a:ea typeface="+mn-ea"/>
+        <a:cs typeface="+mn-cs"/>
+      </a:defRPr>
+    </a:lvl5pPr>
+    <a:lvl6pPr marL="2286000" algn="l" defTabSz="914400" rtl="0" eaLnBrk="1" latinLnBrk="0" hangingPunct="1">
+      <a:defRPr sz="1200" kern="1200">
+        <a:solidFill>
+          <a:schemeClr val="tx1"/>
+        </a:solidFill>
+        <a:latin typeface="+mn-lt"/>
+        <a:ea typeface="+mn-ea"/>
+        <a:cs typeface="+mn-cs"/>
+      </a:defRPr>
+    </a:lvl6pPr>
+    <a:lvl7pPr marL="2743200" algn="l" defTabSz="914400" rtl="0" eaLnBrk="1" latinLnBrk="0" hangingPunct="1">
+      <a:defRPr sz="1200" kern="1200">
+        <a:solidFill>
+          <a:schemeClr val="tx1"/>
+        </a:solidFill>
+        <a:latin typeface="+mn-lt"/>
+        <a:ea typeface="+mn-ea"/>
+        <a:cs typeface="+mn-cs"/>
+      </a:defRPr>
+    </a:lvl7pPr>
+    <a:lvl8pPr marL="3200400" algn="l" defTabSz="914400" rtl="0" eaLnBrk="1" latinLnBrk="0" hangingPunct="1">
+      <a:defRPr sz="1200" kern="1200">
+        <a:solidFill>
+          <a:schemeClr val="tx1"/>
+        </a:solidFill>
+        <a:latin typeface="+mn-lt"/>
+        <a:ea typeface="+mn-ea"/>
+        <a:cs typeface="+mn-cs"/>
+      </a:defRPr>
+    </a:lvl8pPr>
+    <a:lvl9pPr marL="3657600" algn="l" defTabSz="914400" rtl="0" eaLnBrk="1" latinLnBrk="0" hangingPunct="1">
+      <a:defRPr sz="1200" kern="1200">
+        <a:solidFill>
+          <a:schemeClr val="tx1"/>
+        </a:solidFill>
+        <a:latin typeface="+mn-lt"/>
+        <a:ea typeface="+mn-ea"/>
+        <a:cs typeface="+mn-cs"/>
+      </a:defRPr>
+    </a:lvl9pPr>
+  </p:notesStyle>
+</p:notesMaster>
+</file>
+
+<file path=ppt/notesSlides/notesSlide1.xml><?xml version="1.0" encoding="utf-8"?>
+<p:notes xmlns:a="http://schemas.openxmlformats.org/drawingml/2006/main" xmlns:r="http://schemas.openxmlformats.org/officeDocument/2006/relationships" xmlns:p="http://schemas.openxmlformats.org/presentationml/2006/main">
+  <p:cSld>
+    <p:spTree>
+      <p:nvGrpSpPr>
+        <p:cNvPr id="1" name=""/>
+        <p:cNvGrpSpPr/>
+        <p:nvPr/>
+      </p:nvGrpSpPr>
+      <p:grpSpPr>
+        <a:xfrm>
+          <a:off x="0" y="0"/>
+          <a:ext cx="0" cy="0"/>
+          <a:chOff x="0" y="0"/>
+          <a:chExt cx="0" cy="0"/>
+        </a:xfrm>
+      </p:grpSpPr>
+      <p:sp>
+        <p:nvSpPr>
+          <p:cNvPr id="2" name="Slide Image Placeholder 1"/>
+          <p:cNvSpPr>
+            <a:spLocks noGrp="1" noRot="1" noChangeAspect="1"/>
+          </p:cNvSpPr>
+          <p:nvPr>
+            <p:ph type="sldImg"/>
+          </p:nvPr>
+        </p:nvSpPr>
+        <p:spPr/>
+      </p:sp>
+      <p:sp>
+        <p:nvSpPr>
+          <p:cNvPr id="3" name="Notes Placeholder 2"/>
+          <p:cNvSpPr>
+            <a:spLocks noGrp="1"/>
+          </p:cNvSpPr>
+          <p:nvPr>
+            <p:ph type="body" idx="1"/>
+          </p:nvPr>
+        </p:nvSpPr>
+        <p:spPr/>
+        <p:txBody>
+          <a:bodyPr/>
+          <a:lstStyle/>
+          <a:p>
+            <a:endParaRPr lang="en-US" dirty="0"/>
+          </a:p>
+        </p:txBody>
+      </p:sp>
+      <p:sp>
+        <p:nvSpPr>
+          <p:cNvPr id="4" name="Slide Number Placeholder 3"/>
+          <p:cNvSpPr>
+            <a:spLocks noGrp="1"/>
+          </p:cNvSpPr>
+          <p:nvPr>
+            <p:ph type="sldNum" sz="quarter" idx="5"/>
+          </p:nvPr>
+        </p:nvSpPr>
+        <p:spPr/>
+        <p:txBody>
+          <a:bodyPr/>
+          <a:lstStyle/>
+          <a:p>
+            <a:fld id="{82B1EC9F-1E60-4188-BBEA-A2871E828479}" type="slidenum">
+              <a:rPr lang="en-US" smtClean="0"/>
+              <a:t>2</a:t>
+            </a:fld>
+            <a:endParaRPr lang="en-US"/>
+          </a:p>
+        </p:txBody>
+      </p:sp>
+    </p:spTree>
+    <p:extLst>
+      <p:ext uri="{BB962C8B-B14F-4D97-AF65-F5344CB8AC3E}">
+        <p14:creationId xmlns:p14="http://schemas.microsoft.com/office/powerpoint/2010/main" val="3656496650"/>
+      </p:ext>
+    </p:extLst>
+  </p:cSld>
+  <p:clrMapOvr>
+    <a:masterClrMapping/>
+  </p:clrMapOvr>
+</p:notes>
 </file>
 
 <file path=ppt/slideLayouts/slideLayout1.xml><?xml version="1.0" encoding="utf-8"?>
@@ -435,7 +877,7 @@
           <a:p>
             <a:fld id="{12241623-A064-4BED-B073-BA4D61433402}" type="datetime1">
               <a:rPr lang="en-US" smtClean="0"/>
-              <a:t>10/17/23</a:t>
+              <a:t>10/22/2023</a:t>
             </a:fld>
             <a:endParaRPr lang="en-US" dirty="0"/>
           </a:p>
@@ -1246,7 +1688,7 @@
           <a:p>
             <a:fld id="{6F86ED0C-1DA7-41F0-94CF-6218B1FEDFF1}" type="datetime1">
               <a:rPr lang="en-US" smtClean="0"/>
-              <a:t>10/17/23</a:t>
+              <a:t>10/22/2023</a:t>
             </a:fld>
             <a:endParaRPr lang="en-US" dirty="0"/>
           </a:p>
@@ -1445,7 +1887,7 @@
           <a:p>
             <a:fld id="{EECF02AB-6034-4B88-BC5A-7C17CB0EF809}" type="datetime1">
               <a:rPr lang="en-US" smtClean="0"/>
-              <a:t>10/17/23</a:t>
+              <a:t>10/22/2023</a:t>
             </a:fld>
             <a:endParaRPr lang="en-US" dirty="0"/>
           </a:p>
@@ -1680,7 +2122,7 @@
           <a:p>
             <a:fld id="{22F3E5F3-28EE-488F-BD53-B744C06C3DEC}" type="datetime1">
               <a:rPr lang="en-US" smtClean="0"/>
-              <a:t>10/17/23</a:t>
+              <a:t>10/22/2023</a:t>
             </a:fld>
             <a:endParaRPr lang="en-US" dirty="0"/>
           </a:p>
@@ -4373,7 +4815,7 @@
           <a:p>
             <a:fld id="{E72EB70D-CD01-44DA-83B3-8FEB3383D307}" type="datetime1">
               <a:rPr lang="en-US" smtClean="0"/>
-              <a:t>10/17/23</a:t>
+              <a:t>10/22/2023</a:t>
             </a:fld>
             <a:endParaRPr lang="en-US" dirty="0"/>
           </a:p>
@@ -4569,7 +5011,7 @@
           <a:p>
             <a:fld id="{D0158CFD-9357-46BE-A189-D637A67C8730}" type="datetime1">
               <a:rPr lang="en-US" smtClean="0"/>
-              <a:t>10/17/23</a:t>
+              <a:t>10/22/2023</a:t>
             </a:fld>
             <a:endParaRPr lang="en-US" dirty="0"/>
           </a:p>
@@ -4958,7 +5400,7 @@
           <a:p>
             <a:fld id="{7B4742EE-B331-4632-BD10-A82FED6B6FC0}" type="datetime1">
               <a:rPr lang="en-US" smtClean="0"/>
-              <a:t>10/17/23</a:t>
+              <a:t>10/22/2023</a:t>
             </a:fld>
             <a:endParaRPr lang="en-US" dirty="0"/>
           </a:p>
@@ -5124,7 +5566,7 @@
           <a:p>
             <a:fld id="{451BA835-D13F-49F4-8F11-5D576AC65FAD}" type="datetime1">
               <a:rPr lang="en-US" smtClean="0"/>
-              <a:t>10/17/23</a:t>
+              <a:t>10/22/2023</a:t>
             </a:fld>
             <a:endParaRPr lang="en-US" dirty="0"/>
           </a:p>
@@ -5247,7 +5689,7 @@
           <a:p>
             <a:fld id="{ADBD1799-ACB5-4CB2-86A2-5C574F1C8706}" type="datetime1">
               <a:rPr lang="en-US" smtClean="0"/>
-              <a:t>10/17/23</a:t>
+              <a:t>10/22/2023</a:t>
             </a:fld>
             <a:endParaRPr lang="en-US" dirty="0"/>
           </a:p>
@@ -5557,7 +5999,7 @@
           <a:p>
             <a:fld id="{ED5DD0D6-7A82-473E-879B-C6ECD6CCCFEC}" type="datetime1">
               <a:rPr lang="en-US" smtClean="0"/>
-              <a:t>10/17/23</a:t>
+              <a:t>10/22/2023</a:t>
             </a:fld>
             <a:endParaRPr lang="en-US" dirty="0"/>
           </a:p>
@@ -5857,7 +6299,7 @@
           <a:p>
             <a:fld id="{D4605E03-BC17-41A7-854C-DFAB672737DC}" type="datetime1">
               <a:rPr lang="en-US" smtClean="0"/>
-              <a:t>10/17/23</a:t>
+              <a:t>10/22/2023</a:t>
             </a:fld>
             <a:endParaRPr lang="en-US" dirty="0"/>
           </a:p>
@@ -6109,7 +6551,7 @@
           <a:p>
             <a:fld id="{C4408324-A84C-4A45-93B6-78D079CCE772}" type="datetime1">
               <a:rPr lang="en-US" smtClean="0"/>
-              <a:t>10/17/23</a:t>
+              <a:t>10/22/2023</a:t>
             </a:fld>
             <a:endParaRPr lang="en-US" dirty="0"/>
           </a:p>
@@ -6749,7 +7191,7 @@
         <p:spPr>
           <a:xfrm>
             <a:off x="6226998" y="3610430"/>
-            <a:ext cx="5834374" cy="1150937"/>
+            <a:ext cx="5834374" cy="2939226"/>
           </a:xfrm>
         </p:spPr>
         <p:txBody>
@@ -6759,7 +7201,7 @@
           <a:lstStyle/>
           <a:p>
             <a:r>
-              <a:rPr lang="en-US" b="0" i="0" dirty="0">
+              <a:rPr lang="en-US" sz="1600" b="1" i="0" dirty="0">
                 <a:solidFill>
                   <a:srgbClr val="374151"/>
                 </a:solidFill>
@@ -6768,7 +7210,56 @@
               </a:rPr>
               <a:t>Navigating the Workforce of Tomorrow</a:t>
             </a:r>
-            <a:endParaRPr lang="en-US" dirty="0"/>
+          </a:p>
+          <a:p>
+            <a:endParaRPr lang="en-US" sz="1600" b="0" i="0" dirty="0">
+              <a:solidFill>
+                <a:srgbClr val="374151"/>
+              </a:solidFill>
+              <a:effectLst/>
+              <a:latin typeface="Söhne"/>
+            </a:endParaRPr>
+          </a:p>
+          <a:p>
+            <a:r>
+              <a:rPr lang="en-US" sz="1600" dirty="0">
+                <a:solidFill>
+                  <a:schemeClr val="tx1">
+                    <a:lumMod val="85000"/>
+                    <a:lumOff val="15000"/>
+                  </a:schemeClr>
+                </a:solidFill>
+              </a:rPr>
+              <a:t>TEAM:</a:t>
+            </a:r>
+          </a:p>
+          <a:p>
+            <a:r>
+              <a:rPr lang="en-US" sz="1600" kern="100" dirty="0">
+                <a:effectLst/>
+                <a:latin typeface="Times New Roman" panose="02020603050405020304" pitchFamily="18" charset="0"/>
+                <a:ea typeface="Calibri" panose="020F0502020204030204" pitchFamily="34" charset="0"/>
+                <a:cs typeface="Times New Roman" panose="02020603050405020304" pitchFamily="18" charset="0"/>
+              </a:rPr>
+              <a:t>Bryson Wersonke, Madhavi Pandey, Pallavi Tripathi, Ranjini Rao &amp; Vinaya Kusuma</a:t>
+            </a:r>
+            <a:endParaRPr lang="en-US" sz="1600" kern="100" dirty="0">
+              <a:effectLst/>
+              <a:latin typeface="Calibri" panose="020F0502020204030204" pitchFamily="34" charset="0"/>
+              <a:ea typeface="Calibri" panose="020F0502020204030204" pitchFamily="34" charset="0"/>
+              <a:cs typeface="Times New Roman" panose="02020603050405020304" pitchFamily="18" charset="0"/>
+            </a:endParaRPr>
+          </a:p>
+          <a:p>
+            <a:endParaRPr lang="en-US" sz="1600" dirty="0">
+              <a:solidFill>
+                <a:srgbClr val="374151"/>
+              </a:solidFill>
+              <a:latin typeface="Söhne"/>
+            </a:endParaRPr>
+          </a:p>
+          <a:p>
+            <a:endParaRPr lang="en-US" sz="1600" dirty="0"/>
           </a:p>
         </p:txBody>
       </p:sp>
@@ -7493,7 +7984,7 @@
           <p:cNvPr id="2" name="Title 1">
             <a:extLst>
               <a:ext uri="{FF2B5EF4-FFF2-40B4-BE49-F238E27FC236}">
-                <a16:creationId xmlns:a16="http://schemas.microsoft.com/office/drawing/2014/main" id="{AC8CA5D3-756E-6076-0084-59894B6DB045}"/>
+                <a16:creationId xmlns:a16="http://schemas.microsoft.com/office/drawing/2014/main" id="{F2652E90-55F4-1E05-F4A9-3A17DF6D0A71}"/>
               </a:ext>
             </a:extLst>
           </p:cNvPr>
@@ -7504,32 +7995,58 @@
             <p:ph type="title"/>
           </p:nvPr>
         </p:nvSpPr>
-        <p:spPr>
-          <a:xfrm>
-            <a:off x="1920239" y="398677"/>
-            <a:ext cx="8770571" cy="1345269"/>
-          </a:xfrm>
-        </p:spPr>
+        <p:spPr/>
         <p:txBody>
           <a:bodyPr/>
           <a:lstStyle/>
           <a:p>
-            <a:r>
-              <a:rPr lang="en-US" sz="2900" dirty="0"/>
-              <a:t>Fastest growing/declining occupations</a:t>
-            </a:r>
-          </a:p>
-        </p:txBody>
-      </p:sp>
-      <p:sp>
-        <p:nvSpPr>
-          <p:cNvPr id="3" name="Content Placeholder 2">
+            <a:pPr algn="ctr"/>
+            <a:r>
+              <a:rPr lang="en-US" dirty="0"/>
+              <a:t>Employment Change Profile</a:t>
+            </a:r>
+          </a:p>
+        </p:txBody>
+      </p:sp>
+      <p:pic>
+        <p:nvPicPr>
+          <p:cNvPr id="7" name="Picture 6">
             <a:extLst>
               <a:ext uri="{FF2B5EF4-FFF2-40B4-BE49-F238E27FC236}">
-                <a16:creationId xmlns:a16="http://schemas.microsoft.com/office/drawing/2014/main" id="{42B96626-6607-F1E8-FA72-C2F7D378D65A}"/>
+                <a16:creationId xmlns:a16="http://schemas.microsoft.com/office/drawing/2014/main" id="{C92A40D9-B27E-E4A9-7535-D75DB9A0519C}"/>
               </a:ext>
             </a:extLst>
           </p:cNvPr>
+          <p:cNvPicPr>
+            <a:picLocks noChangeAspect="1"/>
+          </p:cNvPicPr>
+          <p:nvPr/>
+        </p:nvPicPr>
+        <p:blipFill>
+          <a:blip r:embed="rId2"/>
+          <a:stretch>
+            <a:fillRect/>
+          </a:stretch>
+        </p:blipFill>
+        <p:spPr>
+          <a:xfrm>
+            <a:off x="1920240" y="2312276"/>
+            <a:ext cx="8569483" cy="4407532"/>
+          </a:xfrm>
+          <a:prstGeom prst="rect">
+            <a:avLst/>
+          </a:prstGeom>
+        </p:spPr>
+      </p:pic>
+      <p:sp>
+        <p:nvSpPr>
+          <p:cNvPr id="6" name="Content Placeholder 5">
+            <a:extLst>
+              <a:ext uri="{FF2B5EF4-FFF2-40B4-BE49-F238E27FC236}">
+                <a16:creationId xmlns:a16="http://schemas.microsoft.com/office/drawing/2014/main" id="{39E5943B-E876-3960-C5B3-071DEAE13DA9}"/>
+              </a:ext>
+            </a:extLst>
+          </p:cNvPr>
           <p:cNvSpPr>
             <a:spLocks noGrp="1"/>
           </p:cNvSpPr>
@@ -7541,12 +8058,6 @@
         <p:txBody>
           <a:bodyPr/>
           <a:lstStyle/>
-          <a:p>
-            <a:r>
-              <a:rPr lang="en-US" dirty="0"/>
-              <a:t>Answer to question 5</a:t>
-            </a:r>
-          </a:p>
           <a:p>
             <a:endParaRPr lang="en-US" dirty="0"/>
           </a:p>
@@ -7555,7 +8066,7 @@
     </p:spTree>
     <p:extLst>
       <p:ext uri="{BB962C8B-B14F-4D97-AF65-F5344CB8AC3E}">
-        <p14:creationId xmlns:p14="http://schemas.microsoft.com/office/powerpoint/2010/main" val="1970774222"/>
+        <p14:creationId xmlns:p14="http://schemas.microsoft.com/office/powerpoint/2010/main" val="3667185398"/>
       </p:ext>
     </p:extLst>
   </p:cSld>
@@ -7587,7 +8098,7 @@
           <p:cNvPr id="2" name="Title 1">
             <a:extLst>
               <a:ext uri="{FF2B5EF4-FFF2-40B4-BE49-F238E27FC236}">
-                <a16:creationId xmlns:a16="http://schemas.microsoft.com/office/drawing/2014/main" id="{2A50D09B-00CE-BDD6-8725-C5466B6A8F5A}"/>
+                <a16:creationId xmlns:a16="http://schemas.microsoft.com/office/drawing/2014/main" id="{E1181DAC-10FF-21EE-AC89-262C37DF9B05}"/>
               </a:ext>
             </a:extLst>
           </p:cNvPr>
@@ -7600,51 +8111,83 @@
         </p:nvSpPr>
         <p:spPr/>
         <p:txBody>
-          <a:bodyPr/>
+          <a:bodyPr>
+            <a:normAutofit fontScale="90000"/>
+          </a:bodyPr>
           <a:lstStyle/>
           <a:p>
-            <a:r>
-              <a:rPr lang="en-US" sz="2900" dirty="0"/>
-              <a:t>Employment prospects for job seekers</a:t>
-            </a:r>
-          </a:p>
-        </p:txBody>
-      </p:sp>
-      <p:sp>
-        <p:nvSpPr>
-          <p:cNvPr id="3" name="Content Placeholder 2">
+            <a:pPr algn="ctr"/>
+            <a:r>
+              <a:rPr lang="en-US" sz="4000" dirty="0"/>
+              <a:t>Top 10 Fastest growing Occupations</a:t>
+            </a:r>
+          </a:p>
+        </p:txBody>
+      </p:sp>
+      <p:pic>
+        <p:nvPicPr>
+          <p:cNvPr id="3" name="Picture 2">
             <a:extLst>
               <a:ext uri="{FF2B5EF4-FFF2-40B4-BE49-F238E27FC236}">
-                <a16:creationId xmlns:a16="http://schemas.microsoft.com/office/drawing/2014/main" id="{2146A438-C4A9-BCA6-70F9-5C049150BF61}"/>
+                <a16:creationId xmlns:a16="http://schemas.microsoft.com/office/drawing/2014/main" id="{47AF2D2A-16CD-A0FE-B033-D691D4F68D45}"/>
               </a:ext>
             </a:extLst>
           </p:cNvPr>
-          <p:cNvSpPr>
-            <a:spLocks noGrp="1"/>
-          </p:cNvSpPr>
-          <p:nvPr>
-            <p:ph idx="1"/>
-          </p:nvPr>
-        </p:nvSpPr>
-        <p:spPr/>
-        <p:txBody>
-          <a:bodyPr/>
-          <a:lstStyle/>
-          <a:p>
-            <a:r>
-              <a:rPr lang="en-US" dirty="0"/>
-              <a:t>Answer to question 6</a:t>
-            </a:r>
-          </a:p>
-          <a:p>
-            <a:endParaRPr lang="en-US" dirty="0"/>
-          </a:p>
-        </p:txBody>
-      </p:sp>
+          <p:cNvPicPr>
+            <a:picLocks noChangeAspect="1"/>
+          </p:cNvPicPr>
+          <p:nvPr/>
+        </p:nvPicPr>
+        <p:blipFill>
+          <a:blip r:embed="rId2"/>
+          <a:stretch>
+            <a:fillRect/>
+          </a:stretch>
+        </p:blipFill>
+        <p:spPr>
+          <a:xfrm>
+            <a:off x="828135" y="2601823"/>
+            <a:ext cx="6375728" cy="3225966"/>
+          </a:xfrm>
+          <a:prstGeom prst="rect">
+            <a:avLst/>
+          </a:prstGeom>
+        </p:spPr>
+      </p:pic>
+      <p:pic>
+        <p:nvPicPr>
+          <p:cNvPr id="4" name="Picture 3">
+            <a:extLst>
+              <a:ext uri="{FF2B5EF4-FFF2-40B4-BE49-F238E27FC236}">
+                <a16:creationId xmlns:a16="http://schemas.microsoft.com/office/drawing/2014/main" id="{ABA12AC8-209A-FC9A-6FA1-92A7199A14AA}"/>
+              </a:ext>
+            </a:extLst>
+          </p:cNvPr>
+          <p:cNvPicPr>
+            <a:picLocks noChangeAspect="1"/>
+          </p:cNvPicPr>
+          <p:nvPr/>
+        </p:nvPicPr>
+        <p:blipFill>
+          <a:blip r:embed="rId3"/>
+          <a:stretch>
+            <a:fillRect/>
+          </a:stretch>
+        </p:blipFill>
+        <p:spPr>
+          <a:xfrm>
+            <a:off x="7284666" y="2522863"/>
+            <a:ext cx="3937202" cy="3270418"/>
+          </a:xfrm>
+          <a:prstGeom prst="rect">
+            <a:avLst/>
+          </a:prstGeom>
+        </p:spPr>
+      </p:pic>
     </p:spTree>
     <p:extLst>
       <p:ext uri="{BB962C8B-B14F-4D97-AF65-F5344CB8AC3E}">
-        <p14:creationId xmlns:p14="http://schemas.microsoft.com/office/powerpoint/2010/main" val="271651074"/>
+        <p14:creationId xmlns:p14="http://schemas.microsoft.com/office/powerpoint/2010/main" val="577648522"/>
       </p:ext>
     </p:extLst>
   </p:cSld>
@@ -7676,7 +8219,7 @@
           <p:cNvPr id="2" name="Title 1">
             <a:extLst>
               <a:ext uri="{FF2B5EF4-FFF2-40B4-BE49-F238E27FC236}">
-                <a16:creationId xmlns:a16="http://schemas.microsoft.com/office/drawing/2014/main" id="{A112D148-F99E-41E6-C396-5396486C10AE}"/>
+                <a16:creationId xmlns:a16="http://schemas.microsoft.com/office/drawing/2014/main" id="{4D27E1D9-6E0F-4C76-551B-047BD852A078}"/>
               </a:ext>
             </a:extLst>
           </p:cNvPr>
@@ -7689,48 +8232,87 @@
         </p:nvSpPr>
         <p:spPr/>
         <p:txBody>
-          <a:bodyPr/>
+          <a:bodyPr>
+            <a:normAutofit fontScale="90000"/>
+          </a:bodyPr>
           <a:lstStyle/>
           <a:p>
-            <a:endParaRPr lang="en-US"/>
-          </a:p>
-        </p:txBody>
-      </p:sp>
-      <p:sp>
-        <p:nvSpPr>
-          <p:cNvPr id="3" name="Content Placeholder 2">
+            <a:pPr algn="ctr"/>
+            <a:r>
+              <a:rPr lang="en-US" sz="4000" dirty="0"/>
+              <a:t>Job Trends in Healthcare industry</a:t>
+            </a:r>
+          </a:p>
+        </p:txBody>
+      </p:sp>
+      <p:pic>
+        <p:nvPicPr>
+          <p:cNvPr id="5" name="Content Placeholder 4">
             <a:extLst>
               <a:ext uri="{FF2B5EF4-FFF2-40B4-BE49-F238E27FC236}">
-                <a16:creationId xmlns:a16="http://schemas.microsoft.com/office/drawing/2014/main" id="{AF0F93CC-6618-186F-421E-B4A65D3D9391}"/>
+                <a16:creationId xmlns:a16="http://schemas.microsoft.com/office/drawing/2014/main" id="{03A6D14D-15E2-F7F9-F810-2ABC16D877B2}"/>
               </a:ext>
             </a:extLst>
           </p:cNvPr>
-          <p:cNvSpPr>
-            <a:spLocks noGrp="1"/>
-          </p:cNvSpPr>
+          <p:cNvPicPr>
+            <a:picLocks noGrp="1" noChangeAspect="1"/>
+          </p:cNvPicPr>
           <p:nvPr>
             <p:ph idx="1"/>
           </p:nvPr>
-        </p:nvSpPr>
-        <p:spPr/>
-        <p:txBody>
-          <a:bodyPr/>
+        </p:nvPicPr>
+        <p:blipFill>
+          <a:blip r:embed="rId2"/>
+          <a:stretch>
+            <a:fillRect/>
+          </a:stretch>
+        </p:blipFill>
+        <p:spPr>
+          <a:xfrm>
+            <a:off x="595222" y="2340579"/>
+            <a:ext cx="8262759" cy="4407879"/>
+          </a:xfrm>
+        </p:spPr>
+      </p:pic>
+      <p:sp>
+        <p:nvSpPr>
+          <p:cNvPr id="7" name="TextBox 6">
+            <a:extLst>
+              <a:ext uri="{FF2B5EF4-FFF2-40B4-BE49-F238E27FC236}">
+                <a16:creationId xmlns:a16="http://schemas.microsoft.com/office/drawing/2014/main" id="{A78A2D58-7989-AFC7-B5DB-A9641CB83251}"/>
+              </a:ext>
+            </a:extLst>
+          </p:cNvPr>
+          <p:cNvSpPr txBox="1"/>
+          <p:nvPr/>
+        </p:nvSpPr>
+        <p:spPr>
+          <a:xfrm>
+            <a:off x="9445924" y="5391113"/>
+            <a:ext cx="2570671" cy="646331"/>
+          </a:xfrm>
+          <a:prstGeom prst="rect">
+            <a:avLst/>
+          </a:prstGeom>
+          <a:noFill/>
+        </p:spPr>
+        <p:txBody>
+          <a:bodyPr wrap="square" rtlCol="0">
+            <a:spAutoFit/>
+          </a:bodyPr>
           <a:lstStyle/>
           <a:p>
             <a:r>
-              <a:rPr lang="en-US" dirty="0"/>
-              <a:t>Answer to question 7</a:t>
-            </a:r>
-          </a:p>
-          <a:p>
-            <a:endParaRPr lang="en-US" dirty="0"/>
+              <a:rPr lang="en-US" b="1" dirty="0"/>
+              <a:t>Data Source : BLS Public Data API</a:t>
+            </a:r>
           </a:p>
         </p:txBody>
       </p:sp>
     </p:spTree>
     <p:extLst>
       <p:ext uri="{BB962C8B-B14F-4D97-AF65-F5344CB8AC3E}">
-        <p14:creationId xmlns:p14="http://schemas.microsoft.com/office/powerpoint/2010/main" val="372559737"/>
+        <p14:creationId xmlns:p14="http://schemas.microsoft.com/office/powerpoint/2010/main" val="1571691749"/>
       </p:ext>
     </p:extLst>
   </p:cSld>
@@ -7762,7 +8344,7 @@
           <p:cNvPr id="2" name="Title 1">
             <a:extLst>
               <a:ext uri="{FF2B5EF4-FFF2-40B4-BE49-F238E27FC236}">
-                <a16:creationId xmlns:a16="http://schemas.microsoft.com/office/drawing/2014/main" id="{5695B0C7-7527-9653-87F6-6A1FFE784120}"/>
+                <a16:creationId xmlns:a16="http://schemas.microsoft.com/office/drawing/2014/main" id="{366A98AE-7509-D80D-EFB1-B27BC31875E3}"/>
               </a:ext>
             </a:extLst>
           </p:cNvPr>
@@ -7778,7 +8360,10 @@
           <a:bodyPr/>
           <a:lstStyle/>
           <a:p>
-            <a:endParaRPr lang="en-US"/>
+            <a:r>
+              <a:rPr lang="en-US" sz="2900" dirty="0"/>
+              <a:t>Distribution of the wages in sectors</a:t>
+            </a:r>
           </a:p>
         </p:txBody>
       </p:sp>
@@ -7787,7 +8372,7 @@
           <p:cNvPr id="3" name="Content Placeholder 2">
             <a:extLst>
               <a:ext uri="{FF2B5EF4-FFF2-40B4-BE49-F238E27FC236}">
-                <a16:creationId xmlns:a16="http://schemas.microsoft.com/office/drawing/2014/main" id="{D0E300B5-572B-F978-5BDA-B869E8B49473}"/>
+                <a16:creationId xmlns:a16="http://schemas.microsoft.com/office/drawing/2014/main" id="{698876AD-4421-488E-E548-563BA8B50982}"/>
               </a:ext>
             </a:extLst>
           </p:cNvPr>
@@ -7805,18 +8390,15 @@
           <a:p>
             <a:r>
               <a:rPr lang="en-US" dirty="0"/>
-              <a:t>Answer to question 8</a:t>
-            </a:r>
-          </a:p>
-          <a:p>
-            <a:endParaRPr lang="en-US" dirty="0"/>
+              <a:t>Answer to question 2</a:t>
+            </a:r>
           </a:p>
         </p:txBody>
       </p:sp>
     </p:spTree>
     <p:extLst>
       <p:ext uri="{BB962C8B-B14F-4D97-AF65-F5344CB8AC3E}">
-        <p14:creationId xmlns:p14="http://schemas.microsoft.com/office/powerpoint/2010/main" val="1025258359"/>
+        <p14:creationId xmlns:p14="http://schemas.microsoft.com/office/powerpoint/2010/main" val="412630050"/>
       </p:ext>
     </p:extLst>
   </p:cSld>
@@ -7848,7 +8430,7 @@
           <p:cNvPr id="2" name="Title 1">
             <a:extLst>
               <a:ext uri="{FF2B5EF4-FFF2-40B4-BE49-F238E27FC236}">
-                <a16:creationId xmlns:a16="http://schemas.microsoft.com/office/drawing/2014/main" id="{8A9DC44B-90B9-7734-E89E-BC733E03CFFF}"/>
+                <a16:creationId xmlns:a16="http://schemas.microsoft.com/office/drawing/2014/main" id="{87611440-FD6E-8D29-49FD-B42A7175AE0B}"/>
               </a:ext>
             </a:extLst>
           </p:cNvPr>
@@ -7865,13 +8447,9 @@
           <a:lstStyle/>
           <a:p>
             <a:r>
-              <a:rPr lang="en-US" b="1" i="0" dirty="0">
-                <a:effectLst/>
-                <a:latin typeface="Söhne"/>
-              </a:rPr>
-              <a:t>Conclusion</a:t>
-            </a:r>
-            <a:endParaRPr lang="en-US" dirty="0"/>
+              <a:rPr lang="en-US" sz="2900" dirty="0"/>
+              <a:t>Employment openings and change</a:t>
+            </a:r>
           </a:p>
         </p:txBody>
       </p:sp>
@@ -7880,7 +8458,7 @@
           <p:cNvPr id="3" name="Content Placeholder 2">
             <a:extLst>
               <a:ext uri="{FF2B5EF4-FFF2-40B4-BE49-F238E27FC236}">
-                <a16:creationId xmlns:a16="http://schemas.microsoft.com/office/drawing/2014/main" id="{F7F6C1DB-77C4-DEA6-4D3A-FA7AF2180AA9}"/>
+                <a16:creationId xmlns:a16="http://schemas.microsoft.com/office/drawing/2014/main" id="{35CD4FB9-2182-FEC3-89FC-8902B131961D}"/>
               </a:ext>
             </a:extLst>
           </p:cNvPr>
@@ -7898,7 +8476,7 @@
           <a:p>
             <a:r>
               <a:rPr lang="en-US" dirty="0"/>
-              <a:t>Here we will conclude our analysis and share analysis results</a:t>
+              <a:t>Answer to question 3</a:t>
             </a:r>
           </a:p>
         </p:txBody>
@@ -7906,7 +8484,7 @@
     </p:spTree>
     <p:extLst>
       <p:ext uri="{BB962C8B-B14F-4D97-AF65-F5344CB8AC3E}">
-        <p14:creationId xmlns:p14="http://schemas.microsoft.com/office/powerpoint/2010/main" val="1819884951"/>
+        <p14:creationId xmlns:p14="http://schemas.microsoft.com/office/powerpoint/2010/main" val="3285959969"/>
       </p:ext>
     </p:extLst>
   </p:cSld>
@@ -7938,7 +8516,7 @@
           <p:cNvPr id="2" name="Title 1">
             <a:extLst>
               <a:ext uri="{FF2B5EF4-FFF2-40B4-BE49-F238E27FC236}">
-                <a16:creationId xmlns:a16="http://schemas.microsoft.com/office/drawing/2014/main" id="{4BB252BF-484D-68FB-0633-20899EDECE83}"/>
+                <a16:creationId xmlns:a16="http://schemas.microsoft.com/office/drawing/2014/main" id="{53E072B9-EF2E-6C65-5FAE-C77DD3149FCD}"/>
               </a:ext>
             </a:extLst>
           </p:cNvPr>
@@ -7955,13 +8533,9 @@
           <a:lstStyle/>
           <a:p>
             <a:r>
-              <a:rPr lang="en-US" b="1" i="0" dirty="0">
-                <a:effectLst/>
-                <a:latin typeface="Söhne"/>
-              </a:rPr>
-              <a:t>Q&amp;A</a:t>
-            </a:r>
-            <a:endParaRPr lang="en-US" dirty="0"/>
+              <a:rPr lang="en-US" sz="2900" dirty="0"/>
+              <a:t>Occupations affected due to automation</a:t>
+            </a:r>
           </a:p>
         </p:txBody>
       </p:sp>
@@ -7970,7 +8544,7 @@
           <p:cNvPr id="3" name="Content Placeholder 2">
             <a:extLst>
               <a:ext uri="{FF2B5EF4-FFF2-40B4-BE49-F238E27FC236}">
-                <a16:creationId xmlns:a16="http://schemas.microsoft.com/office/drawing/2014/main" id="{1B3D3996-60A1-2871-C46B-726A1A81EF5C}"/>
+                <a16:creationId xmlns:a16="http://schemas.microsoft.com/office/drawing/2014/main" id="{871FBAC8-42C0-B71C-E9CD-4BC8A66AEE97}"/>
               </a:ext>
             </a:extLst>
           </p:cNvPr>
@@ -7988,7 +8562,7 @@
           <a:p>
             <a:r>
               <a:rPr lang="en-US" dirty="0"/>
-              <a:t>We will take questions from audience </a:t>
+              <a:t>Answer to question 4</a:t>
             </a:r>
           </a:p>
         </p:txBody>
@@ -7996,7 +8570,7 @@
     </p:spTree>
     <p:extLst>
       <p:ext uri="{BB962C8B-B14F-4D97-AF65-F5344CB8AC3E}">
-        <p14:creationId xmlns:p14="http://schemas.microsoft.com/office/powerpoint/2010/main" val="1541405568"/>
+        <p14:creationId xmlns:p14="http://schemas.microsoft.com/office/powerpoint/2010/main" val="299659909"/>
       </p:ext>
     </p:extLst>
   </p:cSld>
@@ -8028,7 +8602,7 @@
           <p:cNvPr id="2" name="Title 1">
             <a:extLst>
               <a:ext uri="{FF2B5EF4-FFF2-40B4-BE49-F238E27FC236}">
-                <a16:creationId xmlns:a16="http://schemas.microsoft.com/office/drawing/2014/main" id="{A375243E-9A29-04F0-6451-7B75E395FD6D}"/>
+                <a16:creationId xmlns:a16="http://schemas.microsoft.com/office/drawing/2014/main" id="{AC8CA5D3-756E-6076-0084-59894B6DB045}"/>
               </a:ext>
             </a:extLst>
           </p:cNvPr>
@@ -8039,19 +8613,20 @@
             <p:ph type="title"/>
           </p:nvPr>
         </p:nvSpPr>
-        <p:spPr/>
+        <p:spPr>
+          <a:xfrm>
+            <a:off x="1920239" y="398677"/>
+            <a:ext cx="8770571" cy="1345269"/>
+          </a:xfrm>
+        </p:spPr>
         <p:txBody>
           <a:bodyPr/>
           <a:lstStyle/>
           <a:p>
             <a:r>
-              <a:rPr lang="en-US" b="1" i="0" dirty="0">
-                <a:effectLst/>
-                <a:latin typeface="Söhne"/>
-              </a:rPr>
-              <a:t>Thank You</a:t>
-            </a:r>
-            <a:endParaRPr lang="en-US" dirty="0"/>
+              <a:rPr lang="en-US" sz="2900" dirty="0"/>
+              <a:t>Fastest growing/declining occupations</a:t>
+            </a:r>
           </a:p>
         </p:txBody>
       </p:sp>
@@ -8060,7 +8635,7 @@
           <p:cNvPr id="3" name="Content Placeholder 2">
             <a:extLst>
               <a:ext uri="{FF2B5EF4-FFF2-40B4-BE49-F238E27FC236}">
-                <a16:creationId xmlns:a16="http://schemas.microsoft.com/office/drawing/2014/main" id="{CB62E303-A40D-E326-15D4-76ACB065B34E}"/>
+                <a16:creationId xmlns:a16="http://schemas.microsoft.com/office/drawing/2014/main" id="{42B96626-6607-F1E8-FA72-C2F7D378D65A}"/>
               </a:ext>
             </a:extLst>
           </p:cNvPr>
@@ -8078,15 +8653,18 @@
           <a:p>
             <a:r>
               <a:rPr lang="en-US" dirty="0"/>
-              <a:t>We will highlight our TA, and Team members photos.</a:t>
-            </a:r>
+              <a:t>Answer to question 5</a:t>
+            </a:r>
+          </a:p>
+          <a:p>
+            <a:endParaRPr lang="en-US" dirty="0"/>
           </a:p>
         </p:txBody>
       </p:sp>
     </p:spTree>
     <p:extLst>
       <p:ext uri="{BB962C8B-B14F-4D97-AF65-F5344CB8AC3E}">
-        <p14:creationId xmlns:p14="http://schemas.microsoft.com/office/powerpoint/2010/main" val="4026410825"/>
+        <p14:creationId xmlns:p14="http://schemas.microsoft.com/office/powerpoint/2010/main" val="1970774222"/>
       </p:ext>
     </p:extLst>
   </p:cSld>
@@ -8118,7 +8696,7 @@
           <p:cNvPr id="2" name="Title 1">
             <a:extLst>
               <a:ext uri="{FF2B5EF4-FFF2-40B4-BE49-F238E27FC236}">
-                <a16:creationId xmlns:a16="http://schemas.microsoft.com/office/drawing/2014/main" id="{B62A497F-33D4-48B3-0589-3BB8381FC378}"/>
+                <a16:creationId xmlns:a16="http://schemas.microsoft.com/office/drawing/2014/main" id="{2A50D09B-00CE-BDD6-8725-C5466B6A8F5A}"/>
               </a:ext>
             </a:extLst>
           </p:cNvPr>
@@ -8135,13 +8713,9 @@
           <a:lstStyle/>
           <a:p>
             <a:r>
-              <a:rPr lang="en-US" b="1" i="0" dirty="0">
-                <a:effectLst/>
-                <a:latin typeface="Söhne"/>
-              </a:rPr>
-              <a:t>Additional Resources</a:t>
-            </a:r>
-            <a:endParaRPr lang="en-US" dirty="0"/>
+              <a:rPr lang="en-US" sz="2900" dirty="0"/>
+              <a:t>Employment prospects for job seekers</a:t>
+            </a:r>
           </a:p>
         </p:txBody>
       </p:sp>
@@ -8150,7 +8724,7 @@
           <p:cNvPr id="3" name="Content Placeholder 2">
             <a:extLst>
               <a:ext uri="{FF2B5EF4-FFF2-40B4-BE49-F238E27FC236}">
-                <a16:creationId xmlns:a16="http://schemas.microsoft.com/office/drawing/2014/main" id="{28F2C3A5-5987-D23D-99D7-4453A31CD664}"/>
+                <a16:creationId xmlns:a16="http://schemas.microsoft.com/office/drawing/2014/main" id="{2146A438-C4A9-BCA6-70F9-5C049150BF61}"/>
               </a:ext>
             </a:extLst>
           </p:cNvPr>
@@ -8168,15 +8742,190 @@
           <a:p>
             <a:r>
               <a:rPr lang="en-US" dirty="0"/>
-              <a:t>Links which we used for getting data, give credit to websites where we got this data from. </a:t>
-            </a:r>
+              <a:t>Answer to question 6</a:t>
+            </a:r>
+          </a:p>
+          <a:p>
+            <a:endParaRPr lang="en-US" dirty="0"/>
           </a:p>
         </p:txBody>
       </p:sp>
     </p:spTree>
     <p:extLst>
       <p:ext uri="{BB962C8B-B14F-4D97-AF65-F5344CB8AC3E}">
-        <p14:creationId xmlns:p14="http://schemas.microsoft.com/office/powerpoint/2010/main" val="3053062664"/>
+        <p14:creationId xmlns:p14="http://schemas.microsoft.com/office/powerpoint/2010/main" val="271651074"/>
+      </p:ext>
+    </p:extLst>
+  </p:cSld>
+  <p:clrMapOvr>
+    <a:masterClrMapping/>
+  </p:clrMapOvr>
+</p:sld>
+</file>
+
+<file path=ppt/slides/slide18.xml><?xml version="1.0" encoding="utf-8"?>
+<p:sld xmlns:a="http://schemas.openxmlformats.org/drawingml/2006/main" xmlns:r="http://schemas.openxmlformats.org/officeDocument/2006/relationships" xmlns:p="http://schemas.openxmlformats.org/presentationml/2006/main">
+  <p:cSld>
+    <p:spTree>
+      <p:nvGrpSpPr>
+        <p:cNvPr id="1" name=""/>
+        <p:cNvGrpSpPr/>
+        <p:nvPr/>
+      </p:nvGrpSpPr>
+      <p:grpSpPr>
+        <a:xfrm>
+          <a:off x="0" y="0"/>
+          <a:ext cx="0" cy="0"/>
+          <a:chOff x="0" y="0"/>
+          <a:chExt cx="0" cy="0"/>
+        </a:xfrm>
+      </p:grpSpPr>
+      <p:sp>
+        <p:nvSpPr>
+          <p:cNvPr id="2" name="Title 1">
+            <a:extLst>
+              <a:ext uri="{FF2B5EF4-FFF2-40B4-BE49-F238E27FC236}">
+                <a16:creationId xmlns:a16="http://schemas.microsoft.com/office/drawing/2014/main" id="{A112D148-F99E-41E6-C396-5396486C10AE}"/>
+              </a:ext>
+            </a:extLst>
+          </p:cNvPr>
+          <p:cNvSpPr>
+            <a:spLocks noGrp="1"/>
+          </p:cNvSpPr>
+          <p:nvPr>
+            <p:ph type="title"/>
+          </p:nvPr>
+        </p:nvSpPr>
+        <p:spPr/>
+        <p:txBody>
+          <a:bodyPr/>
+          <a:lstStyle/>
+          <a:p>
+            <a:endParaRPr lang="en-US"/>
+          </a:p>
+        </p:txBody>
+      </p:sp>
+      <p:sp>
+        <p:nvSpPr>
+          <p:cNvPr id="3" name="Content Placeholder 2">
+            <a:extLst>
+              <a:ext uri="{FF2B5EF4-FFF2-40B4-BE49-F238E27FC236}">
+                <a16:creationId xmlns:a16="http://schemas.microsoft.com/office/drawing/2014/main" id="{AF0F93CC-6618-186F-421E-B4A65D3D9391}"/>
+              </a:ext>
+            </a:extLst>
+          </p:cNvPr>
+          <p:cNvSpPr>
+            <a:spLocks noGrp="1"/>
+          </p:cNvSpPr>
+          <p:nvPr>
+            <p:ph idx="1"/>
+          </p:nvPr>
+        </p:nvSpPr>
+        <p:spPr/>
+        <p:txBody>
+          <a:bodyPr/>
+          <a:lstStyle/>
+          <a:p>
+            <a:r>
+              <a:rPr lang="en-US" dirty="0"/>
+              <a:t>Answer to question 7</a:t>
+            </a:r>
+          </a:p>
+          <a:p>
+            <a:endParaRPr lang="en-US" dirty="0"/>
+          </a:p>
+        </p:txBody>
+      </p:sp>
+    </p:spTree>
+    <p:extLst>
+      <p:ext uri="{BB962C8B-B14F-4D97-AF65-F5344CB8AC3E}">
+        <p14:creationId xmlns:p14="http://schemas.microsoft.com/office/powerpoint/2010/main" val="372559737"/>
+      </p:ext>
+    </p:extLst>
+  </p:cSld>
+  <p:clrMapOvr>
+    <a:masterClrMapping/>
+  </p:clrMapOvr>
+</p:sld>
+</file>
+
+<file path=ppt/slides/slide19.xml><?xml version="1.0" encoding="utf-8"?>
+<p:sld xmlns:a="http://schemas.openxmlformats.org/drawingml/2006/main" xmlns:r="http://schemas.openxmlformats.org/officeDocument/2006/relationships" xmlns:p="http://schemas.openxmlformats.org/presentationml/2006/main">
+  <p:cSld>
+    <p:spTree>
+      <p:nvGrpSpPr>
+        <p:cNvPr id="1" name=""/>
+        <p:cNvGrpSpPr/>
+        <p:nvPr/>
+      </p:nvGrpSpPr>
+      <p:grpSpPr>
+        <a:xfrm>
+          <a:off x="0" y="0"/>
+          <a:ext cx="0" cy="0"/>
+          <a:chOff x="0" y="0"/>
+          <a:chExt cx="0" cy="0"/>
+        </a:xfrm>
+      </p:grpSpPr>
+      <p:sp>
+        <p:nvSpPr>
+          <p:cNvPr id="2" name="Title 1">
+            <a:extLst>
+              <a:ext uri="{FF2B5EF4-FFF2-40B4-BE49-F238E27FC236}">
+                <a16:creationId xmlns:a16="http://schemas.microsoft.com/office/drawing/2014/main" id="{5695B0C7-7527-9653-87F6-6A1FFE784120}"/>
+              </a:ext>
+            </a:extLst>
+          </p:cNvPr>
+          <p:cNvSpPr>
+            <a:spLocks noGrp="1"/>
+          </p:cNvSpPr>
+          <p:nvPr>
+            <p:ph type="title"/>
+          </p:nvPr>
+        </p:nvSpPr>
+        <p:spPr/>
+        <p:txBody>
+          <a:bodyPr/>
+          <a:lstStyle/>
+          <a:p>
+            <a:endParaRPr lang="en-US"/>
+          </a:p>
+        </p:txBody>
+      </p:sp>
+      <p:sp>
+        <p:nvSpPr>
+          <p:cNvPr id="3" name="Content Placeholder 2">
+            <a:extLst>
+              <a:ext uri="{FF2B5EF4-FFF2-40B4-BE49-F238E27FC236}">
+                <a16:creationId xmlns:a16="http://schemas.microsoft.com/office/drawing/2014/main" id="{D0E300B5-572B-F978-5BDA-B869E8B49473}"/>
+              </a:ext>
+            </a:extLst>
+          </p:cNvPr>
+          <p:cNvSpPr>
+            <a:spLocks noGrp="1"/>
+          </p:cNvSpPr>
+          <p:nvPr>
+            <p:ph idx="1"/>
+          </p:nvPr>
+        </p:nvSpPr>
+        <p:spPr/>
+        <p:txBody>
+          <a:bodyPr/>
+          <a:lstStyle/>
+          <a:p>
+            <a:r>
+              <a:rPr lang="en-US" dirty="0"/>
+              <a:t>Answer to question 8</a:t>
+            </a:r>
+          </a:p>
+          <a:p>
+            <a:endParaRPr lang="en-US" dirty="0"/>
+          </a:p>
+        </p:txBody>
+      </p:sp>
+    </p:spTree>
+    <p:extLst>
+      <p:ext uri="{BB962C8B-B14F-4D97-AF65-F5344CB8AC3E}">
+        <p14:creationId xmlns:p14="http://schemas.microsoft.com/office/powerpoint/2010/main" val="1025258359"/>
       </p:ext>
     </p:extLst>
   </p:cSld>
@@ -8208,7 +8957,209 @@
           <p:cNvPr id="2" name="Title 1">
             <a:extLst>
               <a:ext uri="{FF2B5EF4-FFF2-40B4-BE49-F238E27FC236}">
-                <a16:creationId xmlns:a16="http://schemas.microsoft.com/office/drawing/2014/main" id="{7069D3B9-44DE-D658-F543-C1D9F51DF36A}"/>
+                <a16:creationId xmlns:a16="http://schemas.microsoft.com/office/drawing/2014/main" id="{0118B2F7-1A9B-CD6C-BA2D-EFAEC792FC0F}"/>
+              </a:ext>
+            </a:extLst>
+          </p:cNvPr>
+          <p:cNvSpPr>
+            <a:spLocks noGrp="1"/>
+          </p:cNvSpPr>
+          <p:nvPr>
+            <p:ph type="title"/>
+          </p:nvPr>
+        </p:nvSpPr>
+        <p:spPr/>
+        <p:txBody>
+          <a:bodyPr/>
+          <a:lstStyle/>
+          <a:p>
+            <a:pPr algn="ctr"/>
+            <a:r>
+              <a:rPr lang="en-US" sz="3200" dirty="0"/>
+              <a:t>Agenda</a:t>
+            </a:r>
+            <a:endParaRPr lang="en-US" dirty="0"/>
+          </a:p>
+        </p:txBody>
+      </p:sp>
+      <p:sp>
+        <p:nvSpPr>
+          <p:cNvPr id="3" name="Content Placeholder 2">
+            <a:extLst>
+              <a:ext uri="{FF2B5EF4-FFF2-40B4-BE49-F238E27FC236}">
+                <a16:creationId xmlns:a16="http://schemas.microsoft.com/office/drawing/2014/main" id="{25DAE16B-D845-2AFF-189F-31A38E0CB611}"/>
+              </a:ext>
+            </a:extLst>
+          </p:cNvPr>
+          <p:cNvSpPr>
+            <a:spLocks noGrp="1"/>
+          </p:cNvSpPr>
+          <p:nvPr>
+            <p:ph idx="1"/>
+          </p:nvPr>
+        </p:nvSpPr>
+        <p:spPr>
+          <a:xfrm>
+            <a:off x="1920240" y="2312275"/>
+            <a:ext cx="8770571" cy="4418133"/>
+          </a:xfrm>
+        </p:spPr>
+        <p:txBody>
+          <a:bodyPr>
+            <a:noAutofit/>
+          </a:bodyPr>
+          <a:lstStyle/>
+          <a:p>
+            <a:pPr marL="285750" indent="-285750">
+              <a:lnSpc>
+                <a:spcPct val="160000"/>
+              </a:lnSpc>
+              <a:buFont typeface="Arial" panose="020B0604020202020204" pitchFamily="34" charset="0"/>
+              <a:buChar char="•"/>
+            </a:pPr>
+            <a:r>
+              <a:rPr lang="en-US" dirty="0"/>
+              <a:t>Introduction</a:t>
+            </a:r>
+          </a:p>
+          <a:p>
+            <a:pPr marL="285750" indent="-285750">
+              <a:lnSpc>
+                <a:spcPct val="160000"/>
+              </a:lnSpc>
+              <a:buFont typeface="Arial" panose="020B0604020202020204" pitchFamily="34" charset="0"/>
+              <a:buChar char="•"/>
+            </a:pPr>
+            <a:r>
+              <a:rPr lang="en-US" dirty="0"/>
+              <a:t>Objectives</a:t>
+            </a:r>
+          </a:p>
+          <a:p>
+            <a:pPr marL="285750" indent="-285750">
+              <a:lnSpc>
+                <a:spcPct val="160000"/>
+              </a:lnSpc>
+              <a:buFont typeface="Arial" panose="020B0604020202020204" pitchFamily="34" charset="0"/>
+              <a:buChar char="•"/>
+            </a:pPr>
+            <a:r>
+              <a:rPr lang="en-US" dirty="0"/>
+              <a:t>Data Source</a:t>
+            </a:r>
+          </a:p>
+          <a:p>
+            <a:pPr marL="285750" indent="-285750">
+              <a:lnSpc>
+                <a:spcPct val="160000"/>
+              </a:lnSpc>
+              <a:buFont typeface="Arial" panose="020B0604020202020204" pitchFamily="34" charset="0"/>
+              <a:buChar char="•"/>
+            </a:pPr>
+            <a:r>
+              <a:rPr lang="en-US" dirty="0"/>
+              <a:t>Data processing – cleaning</a:t>
+            </a:r>
+          </a:p>
+          <a:p>
+            <a:pPr marL="285750" indent="-285750">
+              <a:lnSpc>
+                <a:spcPct val="160000"/>
+              </a:lnSpc>
+              <a:buFont typeface="Arial" panose="020B0604020202020204" pitchFamily="34" charset="0"/>
+              <a:buChar char="•"/>
+            </a:pPr>
+            <a:r>
+              <a:rPr lang="en-US" dirty="0"/>
+              <a:t>Analysis</a:t>
+            </a:r>
+          </a:p>
+          <a:p>
+            <a:pPr marL="285750" indent="-285750">
+              <a:lnSpc>
+                <a:spcPct val="160000"/>
+              </a:lnSpc>
+              <a:buFont typeface="Arial" panose="020B0604020202020204" pitchFamily="34" charset="0"/>
+              <a:buChar char="•"/>
+            </a:pPr>
+            <a:r>
+              <a:rPr lang="en-US" dirty="0"/>
+              <a:t>Visualization</a:t>
+            </a:r>
+          </a:p>
+          <a:p>
+            <a:pPr marL="285750" indent="-285750">
+              <a:lnSpc>
+                <a:spcPct val="160000"/>
+              </a:lnSpc>
+              <a:buFont typeface="Arial" panose="020B0604020202020204" pitchFamily="34" charset="0"/>
+              <a:buChar char="•"/>
+            </a:pPr>
+            <a:r>
+              <a:rPr lang="en-US" dirty="0"/>
+              <a:t>Key findings</a:t>
+            </a:r>
+          </a:p>
+          <a:p>
+            <a:pPr marL="285750" indent="-285750">
+              <a:lnSpc>
+                <a:spcPct val="160000"/>
+              </a:lnSpc>
+              <a:buFont typeface="Arial" panose="020B0604020202020204" pitchFamily="34" charset="0"/>
+              <a:buChar char="•"/>
+            </a:pPr>
+            <a:r>
+              <a:rPr lang="en-US" dirty="0"/>
+              <a:t>Conclusion</a:t>
+            </a:r>
+          </a:p>
+          <a:p>
+            <a:pPr marL="0" indent="0">
+              <a:buNone/>
+            </a:pPr>
+            <a:endParaRPr lang="en-US" dirty="0"/>
+          </a:p>
+          <a:p>
+            <a:endParaRPr lang="en-US" dirty="0"/>
+          </a:p>
+        </p:txBody>
+      </p:sp>
+    </p:spTree>
+    <p:extLst>
+      <p:ext uri="{BB962C8B-B14F-4D97-AF65-F5344CB8AC3E}">
+        <p14:creationId xmlns:p14="http://schemas.microsoft.com/office/powerpoint/2010/main" val="1267326651"/>
+      </p:ext>
+    </p:extLst>
+  </p:cSld>
+  <p:clrMapOvr>
+    <a:masterClrMapping/>
+  </p:clrMapOvr>
+</p:sld>
+</file>
+
+<file path=ppt/slides/slide20.xml><?xml version="1.0" encoding="utf-8"?>
+<p:sld xmlns:a="http://schemas.openxmlformats.org/drawingml/2006/main" xmlns:r="http://schemas.openxmlformats.org/officeDocument/2006/relationships" xmlns:p="http://schemas.openxmlformats.org/presentationml/2006/main">
+  <p:cSld>
+    <p:spTree>
+      <p:nvGrpSpPr>
+        <p:cNvPr id="1" name=""/>
+        <p:cNvGrpSpPr/>
+        <p:nvPr/>
+      </p:nvGrpSpPr>
+      <p:grpSpPr>
+        <a:xfrm>
+          <a:off x="0" y="0"/>
+          <a:ext cx="0" cy="0"/>
+          <a:chOff x="0" y="0"/>
+          <a:chExt cx="0" cy="0"/>
+        </a:xfrm>
+      </p:grpSpPr>
+      <p:sp>
+        <p:nvSpPr>
+          <p:cNvPr id="2" name="Title 1">
+            <a:extLst>
+              <a:ext uri="{FF2B5EF4-FFF2-40B4-BE49-F238E27FC236}">
+                <a16:creationId xmlns:a16="http://schemas.microsoft.com/office/drawing/2014/main" id="{8A9DC44B-90B9-7734-E89E-BC733E03CFFF}"/>
               </a:ext>
             </a:extLst>
           </p:cNvPr>
@@ -8229,7 +9180,7 @@
                 <a:effectLst/>
                 <a:latin typeface="Söhne"/>
               </a:rPr>
-              <a:t>Objective of Analysis</a:t>
+              <a:t>Conclusion</a:t>
             </a:r>
             <a:endParaRPr lang="en-US" dirty="0"/>
           </a:p>
@@ -8240,7 +9191,7 @@
           <p:cNvPr id="3" name="Content Placeholder 2">
             <a:extLst>
               <a:ext uri="{FF2B5EF4-FFF2-40B4-BE49-F238E27FC236}">
-                <a16:creationId xmlns:a16="http://schemas.microsoft.com/office/drawing/2014/main" id="{2D9C1327-5DB1-C658-9BA6-CE87AEC0C5F3}"/>
+                <a16:creationId xmlns:a16="http://schemas.microsoft.com/office/drawing/2014/main" id="{F7F6C1DB-77C4-DEA6-4D3A-FA7AF2180AA9}"/>
               </a:ext>
             </a:extLst>
           </p:cNvPr>
@@ -8253,44 +9204,12 @@
         </p:nvSpPr>
         <p:spPr/>
         <p:txBody>
-          <a:bodyPr>
-            <a:normAutofit/>
-          </a:bodyPr>
+          <a:bodyPr/>
           <a:lstStyle/>
           <a:p>
             <a:r>
               <a:rPr lang="en-US" dirty="0"/>
-              <a:t>Core objective of this data analysis is to utilize the prediction data of job market and identify the impact of automation in specific jobs in future job market. We will answer the following questions during this analysis,</a:t>
-            </a:r>
-          </a:p>
-          <a:p>
-            <a:pPr marL="285750" indent="-285750">
-              <a:buFont typeface="Arial" panose="020B0604020202020204" pitchFamily="34" charset="0"/>
-              <a:buChar char="•"/>
-            </a:pPr>
-            <a:r>
-              <a:rPr lang="en-US" dirty="0"/>
-              <a:t>What is the employment distribution across various sectors/industries?</a:t>
-            </a:r>
-          </a:p>
-          <a:p>
-            <a:pPr marL="285750" indent="-285750">
-              <a:buFont typeface="Arial" panose="020B0604020202020204" pitchFamily="34" charset="0"/>
-              <a:buChar char="•"/>
-            </a:pPr>
-            <a:r>
-              <a:rPr lang="en-US" dirty="0"/>
-              <a:t>What is the distribution of the wages for different sectors?</a:t>
-            </a:r>
-          </a:p>
-          <a:p>
-            <a:pPr marL="285750" indent="-285750">
-              <a:buFont typeface="Arial" panose="020B0604020202020204" pitchFamily="34" charset="0"/>
-              <a:buChar char="•"/>
-            </a:pPr>
-            <a:r>
-              <a:rPr lang="en-US" dirty="0"/>
-              <a:t>Employment openings and change </a:t>
+              <a:t>Here we will conclude our analysis and share analysis results</a:t>
             </a:r>
           </a:p>
         </p:txBody>
@@ -8298,7 +9217,277 @@
     </p:spTree>
     <p:extLst>
       <p:ext uri="{BB962C8B-B14F-4D97-AF65-F5344CB8AC3E}">
-        <p14:creationId xmlns:p14="http://schemas.microsoft.com/office/powerpoint/2010/main" val="34551194"/>
+        <p14:creationId xmlns:p14="http://schemas.microsoft.com/office/powerpoint/2010/main" val="1819884951"/>
+      </p:ext>
+    </p:extLst>
+  </p:cSld>
+  <p:clrMapOvr>
+    <a:masterClrMapping/>
+  </p:clrMapOvr>
+</p:sld>
+</file>
+
+<file path=ppt/slides/slide21.xml><?xml version="1.0" encoding="utf-8"?>
+<p:sld xmlns:a="http://schemas.openxmlformats.org/drawingml/2006/main" xmlns:r="http://schemas.openxmlformats.org/officeDocument/2006/relationships" xmlns:p="http://schemas.openxmlformats.org/presentationml/2006/main">
+  <p:cSld>
+    <p:spTree>
+      <p:nvGrpSpPr>
+        <p:cNvPr id="1" name=""/>
+        <p:cNvGrpSpPr/>
+        <p:nvPr/>
+      </p:nvGrpSpPr>
+      <p:grpSpPr>
+        <a:xfrm>
+          <a:off x="0" y="0"/>
+          <a:ext cx="0" cy="0"/>
+          <a:chOff x="0" y="0"/>
+          <a:chExt cx="0" cy="0"/>
+        </a:xfrm>
+      </p:grpSpPr>
+      <p:sp>
+        <p:nvSpPr>
+          <p:cNvPr id="2" name="Title 1">
+            <a:extLst>
+              <a:ext uri="{FF2B5EF4-FFF2-40B4-BE49-F238E27FC236}">
+                <a16:creationId xmlns:a16="http://schemas.microsoft.com/office/drawing/2014/main" id="{4BB252BF-484D-68FB-0633-20899EDECE83}"/>
+              </a:ext>
+            </a:extLst>
+          </p:cNvPr>
+          <p:cNvSpPr>
+            <a:spLocks noGrp="1"/>
+          </p:cNvSpPr>
+          <p:nvPr>
+            <p:ph type="title"/>
+          </p:nvPr>
+        </p:nvSpPr>
+        <p:spPr/>
+        <p:txBody>
+          <a:bodyPr/>
+          <a:lstStyle/>
+          <a:p>
+            <a:r>
+              <a:rPr lang="en-US" b="1" i="0" dirty="0">
+                <a:effectLst/>
+                <a:latin typeface="Söhne"/>
+              </a:rPr>
+              <a:t>Q&amp;A</a:t>
+            </a:r>
+            <a:endParaRPr lang="en-US" dirty="0"/>
+          </a:p>
+        </p:txBody>
+      </p:sp>
+      <p:sp>
+        <p:nvSpPr>
+          <p:cNvPr id="3" name="Content Placeholder 2">
+            <a:extLst>
+              <a:ext uri="{FF2B5EF4-FFF2-40B4-BE49-F238E27FC236}">
+                <a16:creationId xmlns:a16="http://schemas.microsoft.com/office/drawing/2014/main" id="{1B3D3996-60A1-2871-C46B-726A1A81EF5C}"/>
+              </a:ext>
+            </a:extLst>
+          </p:cNvPr>
+          <p:cNvSpPr>
+            <a:spLocks noGrp="1"/>
+          </p:cNvSpPr>
+          <p:nvPr>
+            <p:ph idx="1"/>
+          </p:nvPr>
+        </p:nvSpPr>
+        <p:spPr/>
+        <p:txBody>
+          <a:bodyPr/>
+          <a:lstStyle/>
+          <a:p>
+            <a:r>
+              <a:rPr lang="en-US" dirty="0"/>
+              <a:t>We will take questions from audience </a:t>
+            </a:r>
+          </a:p>
+        </p:txBody>
+      </p:sp>
+    </p:spTree>
+    <p:extLst>
+      <p:ext uri="{BB962C8B-B14F-4D97-AF65-F5344CB8AC3E}">
+        <p14:creationId xmlns:p14="http://schemas.microsoft.com/office/powerpoint/2010/main" val="1541405568"/>
+      </p:ext>
+    </p:extLst>
+  </p:cSld>
+  <p:clrMapOvr>
+    <a:masterClrMapping/>
+  </p:clrMapOvr>
+</p:sld>
+</file>
+
+<file path=ppt/slides/slide22.xml><?xml version="1.0" encoding="utf-8"?>
+<p:sld xmlns:a="http://schemas.openxmlformats.org/drawingml/2006/main" xmlns:r="http://schemas.openxmlformats.org/officeDocument/2006/relationships" xmlns:p="http://schemas.openxmlformats.org/presentationml/2006/main">
+  <p:cSld>
+    <p:spTree>
+      <p:nvGrpSpPr>
+        <p:cNvPr id="1" name=""/>
+        <p:cNvGrpSpPr/>
+        <p:nvPr/>
+      </p:nvGrpSpPr>
+      <p:grpSpPr>
+        <a:xfrm>
+          <a:off x="0" y="0"/>
+          <a:ext cx="0" cy="0"/>
+          <a:chOff x="0" y="0"/>
+          <a:chExt cx="0" cy="0"/>
+        </a:xfrm>
+      </p:grpSpPr>
+      <p:sp>
+        <p:nvSpPr>
+          <p:cNvPr id="2" name="Title 1">
+            <a:extLst>
+              <a:ext uri="{FF2B5EF4-FFF2-40B4-BE49-F238E27FC236}">
+                <a16:creationId xmlns:a16="http://schemas.microsoft.com/office/drawing/2014/main" id="{A375243E-9A29-04F0-6451-7B75E395FD6D}"/>
+              </a:ext>
+            </a:extLst>
+          </p:cNvPr>
+          <p:cNvSpPr>
+            <a:spLocks noGrp="1"/>
+          </p:cNvSpPr>
+          <p:nvPr>
+            <p:ph type="title"/>
+          </p:nvPr>
+        </p:nvSpPr>
+        <p:spPr/>
+        <p:txBody>
+          <a:bodyPr/>
+          <a:lstStyle/>
+          <a:p>
+            <a:r>
+              <a:rPr lang="en-US" b="1" i="0" dirty="0">
+                <a:effectLst/>
+                <a:latin typeface="Söhne"/>
+              </a:rPr>
+              <a:t>Thank You</a:t>
+            </a:r>
+            <a:endParaRPr lang="en-US" dirty="0"/>
+          </a:p>
+        </p:txBody>
+      </p:sp>
+      <p:sp>
+        <p:nvSpPr>
+          <p:cNvPr id="3" name="Content Placeholder 2">
+            <a:extLst>
+              <a:ext uri="{FF2B5EF4-FFF2-40B4-BE49-F238E27FC236}">
+                <a16:creationId xmlns:a16="http://schemas.microsoft.com/office/drawing/2014/main" id="{CB62E303-A40D-E326-15D4-76ACB065B34E}"/>
+              </a:ext>
+            </a:extLst>
+          </p:cNvPr>
+          <p:cNvSpPr>
+            <a:spLocks noGrp="1"/>
+          </p:cNvSpPr>
+          <p:nvPr>
+            <p:ph idx="1"/>
+          </p:nvPr>
+        </p:nvSpPr>
+        <p:spPr/>
+        <p:txBody>
+          <a:bodyPr/>
+          <a:lstStyle/>
+          <a:p>
+            <a:r>
+              <a:rPr lang="en-US" dirty="0"/>
+              <a:t>We will highlight our TA, and Team members photos.</a:t>
+            </a:r>
+          </a:p>
+        </p:txBody>
+      </p:sp>
+    </p:spTree>
+    <p:extLst>
+      <p:ext uri="{BB962C8B-B14F-4D97-AF65-F5344CB8AC3E}">
+        <p14:creationId xmlns:p14="http://schemas.microsoft.com/office/powerpoint/2010/main" val="4026410825"/>
+      </p:ext>
+    </p:extLst>
+  </p:cSld>
+  <p:clrMapOvr>
+    <a:masterClrMapping/>
+  </p:clrMapOvr>
+</p:sld>
+</file>
+
+<file path=ppt/slides/slide23.xml><?xml version="1.0" encoding="utf-8"?>
+<p:sld xmlns:a="http://schemas.openxmlformats.org/drawingml/2006/main" xmlns:r="http://schemas.openxmlformats.org/officeDocument/2006/relationships" xmlns:p="http://schemas.openxmlformats.org/presentationml/2006/main">
+  <p:cSld>
+    <p:spTree>
+      <p:nvGrpSpPr>
+        <p:cNvPr id="1" name=""/>
+        <p:cNvGrpSpPr/>
+        <p:nvPr/>
+      </p:nvGrpSpPr>
+      <p:grpSpPr>
+        <a:xfrm>
+          <a:off x="0" y="0"/>
+          <a:ext cx="0" cy="0"/>
+          <a:chOff x="0" y="0"/>
+          <a:chExt cx="0" cy="0"/>
+        </a:xfrm>
+      </p:grpSpPr>
+      <p:sp>
+        <p:nvSpPr>
+          <p:cNvPr id="2" name="Title 1">
+            <a:extLst>
+              <a:ext uri="{FF2B5EF4-FFF2-40B4-BE49-F238E27FC236}">
+                <a16:creationId xmlns:a16="http://schemas.microsoft.com/office/drawing/2014/main" id="{B62A497F-33D4-48B3-0589-3BB8381FC378}"/>
+              </a:ext>
+            </a:extLst>
+          </p:cNvPr>
+          <p:cNvSpPr>
+            <a:spLocks noGrp="1"/>
+          </p:cNvSpPr>
+          <p:nvPr>
+            <p:ph type="title"/>
+          </p:nvPr>
+        </p:nvSpPr>
+        <p:spPr/>
+        <p:txBody>
+          <a:bodyPr/>
+          <a:lstStyle/>
+          <a:p>
+            <a:r>
+              <a:rPr lang="en-US" b="1" i="0" dirty="0">
+                <a:effectLst/>
+                <a:latin typeface="Söhne"/>
+              </a:rPr>
+              <a:t>Additional Resources</a:t>
+            </a:r>
+            <a:endParaRPr lang="en-US" dirty="0"/>
+          </a:p>
+        </p:txBody>
+      </p:sp>
+      <p:sp>
+        <p:nvSpPr>
+          <p:cNvPr id="3" name="Content Placeholder 2">
+            <a:extLst>
+              <a:ext uri="{FF2B5EF4-FFF2-40B4-BE49-F238E27FC236}">
+                <a16:creationId xmlns:a16="http://schemas.microsoft.com/office/drawing/2014/main" id="{28F2C3A5-5987-D23D-99D7-4453A31CD664}"/>
+              </a:ext>
+            </a:extLst>
+          </p:cNvPr>
+          <p:cNvSpPr>
+            <a:spLocks noGrp="1"/>
+          </p:cNvSpPr>
+          <p:nvPr>
+            <p:ph idx="1"/>
+          </p:nvPr>
+        </p:nvSpPr>
+        <p:spPr/>
+        <p:txBody>
+          <a:bodyPr/>
+          <a:lstStyle/>
+          <a:p>
+            <a:r>
+              <a:rPr lang="en-US" dirty="0"/>
+              <a:t>Links which we used for getting data, give credit to websites where we got this data from. </a:t>
+            </a:r>
+          </a:p>
+        </p:txBody>
+      </p:sp>
+    </p:spTree>
+    <p:extLst>
+      <p:ext uri="{BB962C8B-B14F-4D97-AF65-F5344CB8AC3E}">
+        <p14:creationId xmlns:p14="http://schemas.microsoft.com/office/powerpoint/2010/main" val="3053062664"/>
       </p:ext>
     </p:extLst>
   </p:cSld>
@@ -8330,7 +9519,7 @@
           <p:cNvPr id="2" name="Title 1">
             <a:extLst>
               <a:ext uri="{FF2B5EF4-FFF2-40B4-BE49-F238E27FC236}">
-                <a16:creationId xmlns:a16="http://schemas.microsoft.com/office/drawing/2014/main" id="{84309D03-67D4-C6B6-E978-487233BDDFF3}"/>
+                <a16:creationId xmlns:a16="http://schemas.microsoft.com/office/drawing/2014/main" id="{7069D3B9-44DE-D658-F543-C1D9F51DF36A}"/>
               </a:ext>
             </a:extLst>
           </p:cNvPr>
@@ -8346,6 +9535,7 @@
           <a:bodyPr/>
           <a:lstStyle/>
           <a:p>
+            <a:pPr algn="ctr"/>
             <a:r>
               <a:rPr lang="en-US" b="1" i="0" dirty="0">
                 <a:effectLst/>
@@ -8362,7 +9552,7 @@
           <p:cNvPr id="3" name="Content Placeholder 2">
             <a:extLst>
               <a:ext uri="{FF2B5EF4-FFF2-40B4-BE49-F238E27FC236}">
-                <a16:creationId xmlns:a16="http://schemas.microsoft.com/office/drawing/2014/main" id="{5B785898-3D3E-6EE7-A6F8-20A53B791C83}"/>
+                <a16:creationId xmlns:a16="http://schemas.microsoft.com/office/drawing/2014/main" id="{2D9C1327-5DB1-C658-9BA6-CE87AEC0C5F3}"/>
               </a:ext>
             </a:extLst>
           </p:cNvPr>
@@ -8376,9 +9566,15 @@
         <p:spPr/>
         <p:txBody>
           <a:bodyPr>
-            <a:normAutofit lnSpcReduction="10000"/>
+            <a:normAutofit/>
           </a:bodyPr>
           <a:lstStyle/>
+          <a:p>
+            <a:r>
+              <a:rPr lang="en-US" dirty="0"/>
+              <a:t>Core objective of this data analysis is to utilize the prediction data of job market and identify the impact of automation in specific jobs in future job market. We will answer the following questions during this analysis,</a:t>
+            </a:r>
+          </a:p>
           <a:p>
             <a:pPr marL="285750" indent="-285750">
               <a:buFont typeface="Arial" panose="020B0604020202020204" pitchFamily="34" charset="0"/>
@@ -8386,7 +9582,7 @@
             </a:pPr>
             <a:r>
               <a:rPr lang="en-US" dirty="0"/>
-              <a:t>What are the jobs that are affected the most due to automation</a:t>
+              <a:t>What is the employment distribution across various sectors/industries?</a:t>
             </a:r>
           </a:p>
           <a:p>
@@ -8406,7 +9602,7 @@
             </a:pPr>
             <a:r>
               <a:rPr lang="en-US" dirty="0"/>
-              <a:t>What are the employment prospects for the job seekers who have lost their jobs due to automation?</a:t>
+              <a:t>What is the distribution of the wages for different sectors?</a:t>
             </a:r>
           </a:p>
           <a:p>
@@ -8414,39 +9610,28 @@
               <a:buFont typeface="Arial" panose="020B0604020202020204" pitchFamily="34" charset="0"/>
               <a:buChar char="•"/>
             </a:pPr>
-            <a:r>
-              <a:rPr lang="en-US" dirty="0"/>
-              <a:t>Map displaying the states with booming employment </a:t>
-            </a:r>
+            <a:endParaRPr lang="en-US" dirty="0"/>
+          </a:p>
+          <a:p>
+            <a:endParaRPr lang="en-US" sz="1800" dirty="0">
+              <a:effectLst/>
+              <a:ea typeface="Times New Roman" panose="02020603050405020304" pitchFamily="18" charset="0"/>
+              <a:cs typeface="Times New Roman" panose="02020603050405020304" pitchFamily="18" charset="0"/>
+            </a:endParaRPr>
           </a:p>
           <a:p>
             <a:pPr marL="285750" indent="-285750">
               <a:buFont typeface="Arial" panose="020B0604020202020204" pitchFamily="34" charset="0"/>
               <a:buChar char="•"/>
             </a:pPr>
-            <a:r>
-              <a:rPr lang="en-US" dirty="0"/>
-              <a:t>Are the jobs being lost to automation lower or higher paying than other jobs available</a:t>
-            </a:r>
-          </a:p>
-          <a:p>
-            <a:pPr marL="285750" indent="-285750">
-              <a:buFont typeface="Arial" panose="020B0604020202020204" pitchFamily="34" charset="0"/>
-              <a:buChar char="•"/>
-            </a:pPr>
-            <a:endParaRPr lang="en-US" dirty="0">
-              <a:solidFill>
-                <a:srgbClr val="222222"/>
-              </a:solidFill>
-              <a:latin typeface="Arial" panose="020B0604020202020204" pitchFamily="34" charset="0"/>
-            </a:endParaRPr>
+            <a:endParaRPr lang="en-US" dirty="0"/>
           </a:p>
         </p:txBody>
       </p:sp>
     </p:spTree>
     <p:extLst>
       <p:ext uri="{BB962C8B-B14F-4D97-AF65-F5344CB8AC3E}">
-        <p14:creationId xmlns:p14="http://schemas.microsoft.com/office/powerpoint/2010/main" val="3173031761"/>
+        <p14:creationId xmlns:p14="http://schemas.microsoft.com/office/powerpoint/2010/main" val="34551194"/>
       </p:ext>
     </p:extLst>
   </p:cSld>
@@ -8478,7 +9663,7 @@
           <p:cNvPr id="2" name="Title 1">
             <a:extLst>
               <a:ext uri="{FF2B5EF4-FFF2-40B4-BE49-F238E27FC236}">
-                <a16:creationId xmlns:a16="http://schemas.microsoft.com/office/drawing/2014/main" id="{628525FC-DFBF-9396-F370-484A5A9337C3}"/>
+                <a16:creationId xmlns:a16="http://schemas.microsoft.com/office/drawing/2014/main" id="{84309D03-67D4-C6B6-E978-487233BDDFF3}"/>
               </a:ext>
             </a:extLst>
           </p:cNvPr>
@@ -8494,10 +9679,15 @@
           <a:bodyPr/>
           <a:lstStyle/>
           <a:p>
-            <a:r>
-              <a:rPr lang="en-US" dirty="0"/>
-              <a:t>Defining Dataset</a:t>
-            </a:r>
+            <a:pPr algn="ctr"/>
+            <a:r>
+              <a:rPr lang="en-US" b="1" i="0" dirty="0">
+                <a:effectLst/>
+                <a:latin typeface="Söhne"/>
+              </a:rPr>
+              <a:t>Objective of Analysis</a:t>
+            </a:r>
+            <a:endParaRPr lang="en-US" dirty="0"/>
           </a:p>
         </p:txBody>
       </p:sp>
@@ -8506,7 +9696,7 @@
           <p:cNvPr id="3" name="Content Placeholder 2">
             <a:extLst>
               <a:ext uri="{FF2B5EF4-FFF2-40B4-BE49-F238E27FC236}">
-                <a16:creationId xmlns:a16="http://schemas.microsoft.com/office/drawing/2014/main" id="{FF5F1A34-F58E-C6A8-0726-BEA2434DC815}"/>
+                <a16:creationId xmlns:a16="http://schemas.microsoft.com/office/drawing/2014/main" id="{5B785898-3D3E-6EE7-A6F8-20A53B791C83}"/>
               </a:ext>
             </a:extLst>
           </p:cNvPr>
@@ -8519,20 +9709,68 @@
         </p:nvSpPr>
         <p:spPr/>
         <p:txBody>
-          <a:bodyPr/>
+          <a:bodyPr>
+            <a:normAutofit/>
+          </a:bodyPr>
           <a:lstStyle/>
           <a:p>
+            <a:pPr marL="285750" indent="-285750">
+              <a:buFont typeface="Arial" panose="020B0604020202020204" pitchFamily="34" charset="0"/>
+              <a:buChar char="•"/>
+            </a:pPr>
             <a:r>
               <a:rPr lang="en-US" dirty="0"/>
-              <a:t>Here we will define the data set, explain the data we have used.</a:t>
-            </a:r>
+              <a:t>What are the jobs that are affected the most due to automation</a:t>
+            </a:r>
+          </a:p>
+          <a:p>
+            <a:pPr marL="285750" indent="-285750">
+              <a:buFont typeface="Arial" panose="020B0604020202020204" pitchFamily="34" charset="0"/>
+              <a:buChar char="•"/>
+            </a:pPr>
+            <a:r>
+              <a:rPr lang="en-US" dirty="0"/>
+              <a:t>What are the employment prospects for the job seekers who have lost their jobs due to automation?</a:t>
+            </a:r>
+          </a:p>
+          <a:p>
+            <a:pPr marL="285750" indent="-285750">
+              <a:buFont typeface="Arial" panose="020B0604020202020204" pitchFamily="34" charset="0"/>
+              <a:buChar char="•"/>
+            </a:pPr>
+            <a:r>
+              <a:rPr lang="en-US" dirty="0"/>
+              <a:t>Map displaying the states with booming employment </a:t>
+            </a:r>
+          </a:p>
+          <a:p>
+            <a:pPr marL="285750" indent="-285750">
+              <a:buFont typeface="Arial" panose="020B0604020202020204" pitchFamily="34" charset="0"/>
+              <a:buChar char="•"/>
+            </a:pPr>
+            <a:r>
+              <a:rPr lang="en-US" dirty="0"/>
+              <a:t>Are the jobs being lost to automation lower or higher paying than other jobs available</a:t>
+            </a:r>
+          </a:p>
+          <a:p>
+            <a:pPr marL="285750" indent="-285750">
+              <a:buFont typeface="Arial" panose="020B0604020202020204" pitchFamily="34" charset="0"/>
+              <a:buChar char="•"/>
+            </a:pPr>
+            <a:endParaRPr lang="en-US" dirty="0">
+              <a:solidFill>
+                <a:srgbClr val="222222"/>
+              </a:solidFill>
+              <a:latin typeface="Arial" panose="020B0604020202020204" pitchFamily="34" charset="0"/>
+            </a:endParaRPr>
           </a:p>
         </p:txBody>
       </p:sp>
     </p:spTree>
     <p:extLst>
       <p:ext uri="{BB962C8B-B14F-4D97-AF65-F5344CB8AC3E}">
-        <p14:creationId xmlns:p14="http://schemas.microsoft.com/office/powerpoint/2010/main" val="347237258"/>
+        <p14:creationId xmlns:p14="http://schemas.microsoft.com/office/powerpoint/2010/main" val="3173031761"/>
       </p:ext>
     </p:extLst>
   </p:cSld>
@@ -8564,7 +9802,7 @@
           <p:cNvPr id="2" name="Title 1">
             <a:extLst>
               <a:ext uri="{FF2B5EF4-FFF2-40B4-BE49-F238E27FC236}">
-                <a16:creationId xmlns:a16="http://schemas.microsoft.com/office/drawing/2014/main" id="{61782D0F-A29A-C296-4971-9E9E95450782}"/>
+                <a16:creationId xmlns:a16="http://schemas.microsoft.com/office/drawing/2014/main" id="{628525FC-DFBF-9396-F370-484A5A9337C3}"/>
               </a:ext>
             </a:extLst>
           </p:cNvPr>
@@ -8580,9 +9818,10 @@
           <a:bodyPr/>
           <a:lstStyle/>
           <a:p>
+            <a:pPr algn="ctr"/>
             <a:r>
               <a:rPr lang="en-US" dirty="0"/>
-              <a:t>Modeling the Data for analysis</a:t>
+              <a:t>Data Source</a:t>
             </a:r>
           </a:p>
         </p:txBody>
@@ -8592,7 +9831,7 @@
           <p:cNvPr id="3" name="Content Placeholder 2">
             <a:extLst>
               <a:ext uri="{FF2B5EF4-FFF2-40B4-BE49-F238E27FC236}">
-                <a16:creationId xmlns:a16="http://schemas.microsoft.com/office/drawing/2014/main" id="{515408FA-6489-583C-1BA3-E459DC41372F}"/>
+                <a16:creationId xmlns:a16="http://schemas.microsoft.com/office/drawing/2014/main" id="{FF5F1A34-F58E-C6A8-0726-BEA2434DC815}"/>
               </a:ext>
             </a:extLst>
           </p:cNvPr>
@@ -8603,22 +9842,270 @@
             <p:ph idx="1"/>
           </p:nvPr>
         </p:nvSpPr>
-        <p:spPr/>
-        <p:txBody>
-          <a:bodyPr/>
+        <p:spPr>
+          <a:xfrm>
+            <a:off x="1920240" y="2312276"/>
+            <a:ext cx="8770571" cy="4103504"/>
+          </a:xfrm>
+        </p:spPr>
+        <p:txBody>
+          <a:bodyPr>
+            <a:normAutofit fontScale="85000" lnSpcReduction="20000"/>
+          </a:bodyPr>
           <a:lstStyle/>
           <a:p>
-            <a:r>
-              <a:rPr lang="en-US" dirty="0"/>
-              <a:t>Here we will mention how we modeled the dataset for our analysis.</a:t>
-            </a:r>
+            <a:pPr marL="285750" indent="-285750">
+              <a:buFont typeface="Arial" panose="020B0604020202020204" pitchFamily="34" charset="0"/>
+              <a:buChar char="•"/>
+            </a:pPr>
+            <a:r>
+              <a:rPr lang="en-US" sz="1800" dirty="0">
+                <a:solidFill>
+                  <a:srgbClr val="0070C0"/>
+                </a:solidFill>
+                <a:hlinkClick r:id="rId2">
+                  <a:extLst>
+                    <a:ext uri="{A12FA001-AC4F-418D-AE19-62706E023703}">
+                      <ahyp:hlinkClr xmlns:ahyp="http://schemas.microsoft.com/office/drawing/2018/hyperlinkcolor" val="tx"/>
+                    </a:ext>
+                  </a:extLst>
+                </a:hlinkClick>
+              </a:rPr>
+              <a:t>https://www.bls.gov/emp/tables/occupational-projections-and-characteristics.htm</a:t>
+            </a:r>
+            <a:endParaRPr lang="en-US" sz="1800" dirty="0">
+              <a:solidFill>
+                <a:srgbClr val="0070C0"/>
+              </a:solidFill>
+            </a:endParaRPr>
+          </a:p>
+          <a:p>
+            <a:pPr marL="285750" indent="-285750">
+              <a:buFont typeface="Arial" panose="020B0604020202020204" pitchFamily="34" charset="0"/>
+              <a:buChar char="•"/>
+            </a:pPr>
+            <a:r>
+              <a:rPr lang="en-US" sz="1800" dirty="0">
+                <a:solidFill>
+                  <a:srgbClr val="0070C0"/>
+                </a:solidFill>
+                <a:hlinkClick r:id="rId3">
+                  <a:extLst>
+                    <a:ext uri="{A12FA001-AC4F-418D-AE19-62706E023703}">
+                      <ahyp:hlinkClr xmlns:ahyp="http://schemas.microsoft.com/office/drawing/2018/hyperlinkcolor" val="tx"/>
+                    </a:ext>
+                  </a:extLst>
+                </a:hlinkClick>
+              </a:rPr>
+              <a:t>https://www.bls.gov/oes/current/oes_nat.htm#17-0000</a:t>
+            </a:r>
+            <a:endParaRPr lang="en-US" sz="1800" dirty="0">
+              <a:solidFill>
+                <a:srgbClr val="0070C0"/>
+              </a:solidFill>
+            </a:endParaRPr>
+          </a:p>
+          <a:p>
+            <a:pPr marL="285750" indent="-285750">
+              <a:buFont typeface="Arial" panose="020B0604020202020204" pitchFamily="34" charset="0"/>
+              <a:buChar char="•"/>
+            </a:pPr>
+            <a:r>
+              <a:rPr lang="en-US" sz="1800" kern="100" dirty="0">
+                <a:solidFill>
+                  <a:srgbClr val="0070C0"/>
+                </a:solidFill>
+                <a:effectLst/>
+                <a:latin typeface="Calibri" panose="020F0502020204030204" pitchFamily="34" charset="0"/>
+                <a:ea typeface="Calibri" panose="020F0502020204030204" pitchFamily="34" charset="0"/>
+                <a:cs typeface="Times New Roman" panose="02020603050405020304" pitchFamily="18" charset="0"/>
+                <a:hlinkClick r:id="rId4">
+                  <a:extLst>
+                    <a:ext uri="{A12FA001-AC4F-418D-AE19-62706E023703}">
+                      <ahyp:hlinkClr xmlns:ahyp="http://schemas.microsoft.com/office/drawing/2018/hyperlinkcolor" val="tx"/>
+                    </a:ext>
+                  </a:extLst>
+                </a:hlinkClick>
+              </a:rPr>
+              <a:t>https://www.bls.gov/emp/tables/occupational-separations-and-openings.htm</a:t>
+            </a:r>
+            <a:endParaRPr lang="en-US" sz="1800" kern="100" dirty="0">
+              <a:solidFill>
+                <a:srgbClr val="0070C0"/>
+              </a:solidFill>
+              <a:effectLst/>
+              <a:latin typeface="Calibri" panose="020F0502020204030204" pitchFamily="34" charset="0"/>
+              <a:ea typeface="Calibri" panose="020F0502020204030204" pitchFamily="34" charset="0"/>
+              <a:cs typeface="Times New Roman" panose="02020603050405020304" pitchFamily="18" charset="0"/>
+            </a:endParaRPr>
+          </a:p>
+          <a:p>
+            <a:pPr marL="285750" indent="-285750">
+              <a:buFont typeface="Arial" panose="020B0604020202020204" pitchFamily="34" charset="0"/>
+              <a:buChar char="•"/>
+            </a:pPr>
+            <a:r>
+              <a:rPr lang="en-US" sz="1800" u="sng" kern="0" dirty="0">
+                <a:solidFill>
+                  <a:srgbClr val="0070C0"/>
+                </a:solidFill>
+                <a:effectLst/>
+                <a:latin typeface="Arial" panose="020B0604020202020204" pitchFamily="34" charset="0"/>
+                <a:ea typeface="Times New Roman" panose="02020603050405020304" pitchFamily="18" charset="0"/>
+                <a:cs typeface="Times New Roman" panose="02020603050405020304" pitchFamily="18" charset="0"/>
+                <a:hlinkClick r:id="rId5">
+                  <a:extLst>
+                    <a:ext uri="{A12FA001-AC4F-418D-AE19-62706E023703}">
+                      <ahyp:hlinkClr xmlns:ahyp="http://schemas.microsoft.com/office/drawing/2018/hyperlinkcolor" val="tx"/>
+                    </a:ext>
+                  </a:extLst>
+                </a:hlinkClick>
+              </a:rPr>
+              <a:t>https://www.bls.gov/emp/tables/unemployment-earnings-education.htm</a:t>
+            </a:r>
+            <a:endParaRPr lang="en-US" sz="1800" dirty="0">
+              <a:solidFill>
+                <a:srgbClr val="0070C0"/>
+              </a:solidFill>
+            </a:endParaRPr>
+          </a:p>
+          <a:p>
+            <a:pPr marL="285750" indent="-285750">
+              <a:buFont typeface="Arial" panose="020B0604020202020204" pitchFamily="34" charset="0"/>
+              <a:buChar char="•"/>
+            </a:pPr>
+            <a:r>
+              <a:rPr lang="en-US" sz="1800" u="sng" kern="0" dirty="0">
+                <a:solidFill>
+                  <a:srgbClr val="0070C0"/>
+                </a:solidFill>
+                <a:effectLst/>
+                <a:latin typeface="Arial" panose="020B0604020202020204" pitchFamily="34" charset="0"/>
+                <a:ea typeface="Times New Roman" panose="02020603050405020304" pitchFamily="18" charset="0"/>
+                <a:cs typeface="Times New Roman" panose="02020603050405020304" pitchFamily="18" charset="0"/>
+                <a:hlinkClick r:id="rId6">
+                  <a:extLst>
+                    <a:ext uri="{A12FA001-AC4F-418D-AE19-62706E023703}">
+                      <ahyp:hlinkClr xmlns:ahyp="http://schemas.microsoft.com/office/drawing/2018/hyperlinkcolor" val="tx"/>
+                    </a:ext>
+                  </a:extLst>
+                </a:hlinkClick>
+              </a:rPr>
+              <a:t>https://www.kaggle.com/datasets/andrewmvd/occupation-salary-and-likelihood-of-automation/</a:t>
+            </a:r>
+            <a:endParaRPr lang="en-US" sz="1800" kern="100" dirty="0">
+              <a:solidFill>
+                <a:srgbClr val="0070C0"/>
+              </a:solidFill>
+              <a:effectLst/>
+              <a:latin typeface="Calibri" panose="020F0502020204030204" pitchFamily="34" charset="0"/>
+              <a:ea typeface="Calibri" panose="020F0502020204030204" pitchFamily="34" charset="0"/>
+              <a:cs typeface="Times New Roman" panose="02020603050405020304" pitchFamily="18" charset="0"/>
+            </a:endParaRPr>
+          </a:p>
+          <a:p>
+            <a:pPr marL="285750" indent="-285750">
+              <a:buFont typeface="Arial" panose="020B0604020202020204" pitchFamily="34" charset="0"/>
+              <a:buChar char="•"/>
+            </a:pPr>
+            <a:r>
+              <a:rPr lang="en-US" sz="1800" kern="0" dirty="0">
+                <a:solidFill>
+                  <a:srgbClr val="0070C0"/>
+                </a:solidFill>
+                <a:effectLst/>
+                <a:latin typeface="Arial" panose="020B0604020202020204" pitchFamily="34" charset="0"/>
+                <a:ea typeface="Times New Roman" panose="02020603050405020304" pitchFamily="18" charset="0"/>
+                <a:cs typeface="Times New Roman" panose="02020603050405020304" pitchFamily="18" charset="0"/>
+              </a:rPr>
+              <a:t>Article: </a:t>
+            </a:r>
+            <a:r>
+              <a:rPr lang="en-US" sz="1800" u="sng" kern="0" dirty="0">
+                <a:solidFill>
+                  <a:srgbClr val="0070C0"/>
+                </a:solidFill>
+                <a:effectLst/>
+                <a:latin typeface="Arial" panose="020B0604020202020204" pitchFamily="34" charset="0"/>
+                <a:ea typeface="Times New Roman" panose="02020603050405020304" pitchFamily="18" charset="0"/>
+                <a:cs typeface="Times New Roman" panose="02020603050405020304" pitchFamily="18" charset="0"/>
+                <a:hlinkClick r:id="rId7">
+                  <a:extLst>
+                    <a:ext uri="{A12FA001-AC4F-418D-AE19-62706E023703}">
+                      <ahyp:hlinkClr xmlns:ahyp="http://schemas.microsoft.com/office/drawing/2018/hyperlinkcolor" val="tx"/>
+                    </a:ext>
+                  </a:extLst>
+                </a:hlinkClick>
+              </a:rPr>
+              <a:t>oxfordmartin.ox.ac.uk/downloads/academic/The_Future_of_Employment.pdf</a:t>
+            </a:r>
+            <a:endParaRPr lang="en-US" sz="1800" u="sng" kern="0" dirty="0">
+              <a:solidFill>
+                <a:srgbClr val="0070C0"/>
+              </a:solidFill>
+              <a:effectLst/>
+              <a:latin typeface="Arial" panose="020B0604020202020204" pitchFamily="34" charset="0"/>
+              <a:ea typeface="Times New Roman" panose="02020603050405020304" pitchFamily="18" charset="0"/>
+              <a:cs typeface="Times New Roman" panose="02020603050405020304" pitchFamily="18" charset="0"/>
+            </a:endParaRPr>
+          </a:p>
+          <a:p>
+            <a:pPr marL="285750" indent="-285750">
+              <a:buFont typeface="Arial" panose="020B0604020202020204" pitchFamily="34" charset="0"/>
+              <a:buChar char="•"/>
+            </a:pPr>
+            <a:r>
+              <a:rPr lang="en-US" sz="1800" b="0" dirty="0">
+                <a:solidFill>
+                  <a:srgbClr val="0070C0"/>
+                </a:solidFill>
+                <a:effectLst/>
+              </a:rPr>
+              <a:t>BLS Public Data API</a:t>
+            </a:r>
+          </a:p>
+          <a:p>
+            <a:pPr marL="285750" indent="-285750">
+              <a:lnSpc>
+                <a:spcPct val="120000"/>
+              </a:lnSpc>
+              <a:buFont typeface="Arial" panose="020B0604020202020204" pitchFamily="34" charset="0"/>
+              <a:buChar char="•"/>
+            </a:pPr>
+            <a:r>
+              <a:rPr lang="en-US" sz="1800" dirty="0">
+                <a:solidFill>
+                  <a:srgbClr val="0070C0"/>
+                </a:solidFill>
+              </a:rPr>
+              <a:t>"https://api.bls.gov/</a:t>
+            </a:r>
+            <a:r>
+              <a:rPr lang="en-US" sz="1800" dirty="0" err="1">
+                <a:solidFill>
+                  <a:srgbClr val="0070C0"/>
+                </a:solidFill>
+              </a:rPr>
+              <a:t>publicAPI</a:t>
+            </a:r>
+            <a:r>
+              <a:rPr lang="en-US" sz="1800" dirty="0">
+                <a:solidFill>
+                  <a:srgbClr val="0070C0"/>
+                </a:solidFill>
+              </a:rPr>
+              <a:t>/v2/"</a:t>
+            </a:r>
+          </a:p>
+          <a:p>
+            <a:endParaRPr lang="en-US" dirty="0"/>
           </a:p>
         </p:txBody>
       </p:sp>
     </p:spTree>
     <p:extLst>
       <p:ext uri="{BB962C8B-B14F-4D97-AF65-F5344CB8AC3E}">
-        <p14:creationId xmlns:p14="http://schemas.microsoft.com/office/powerpoint/2010/main" val="1050294836"/>
+        <p14:creationId xmlns:p14="http://schemas.microsoft.com/office/powerpoint/2010/main" val="347237258"/>
       </p:ext>
     </p:extLst>
   </p:cSld>
@@ -8650,7 +10137,7 @@
           <p:cNvPr id="2" name="Title 1">
             <a:extLst>
               <a:ext uri="{FF2B5EF4-FFF2-40B4-BE49-F238E27FC236}">
-                <a16:creationId xmlns:a16="http://schemas.microsoft.com/office/drawing/2014/main" id="{DA3033C8-34BA-97EB-EF47-BE9D6B87C327}"/>
+                <a16:creationId xmlns:a16="http://schemas.microsoft.com/office/drawing/2014/main" id="{61782D0F-A29A-C296-4971-9E9E95450782}"/>
               </a:ext>
             </a:extLst>
           </p:cNvPr>
@@ -8663,14 +10150,12 @@
         </p:nvSpPr>
         <p:spPr/>
         <p:txBody>
-          <a:bodyPr>
-            <a:normAutofit fontScale="90000"/>
-          </a:bodyPr>
+          <a:bodyPr/>
           <a:lstStyle/>
           <a:p>
             <a:r>
               <a:rPr lang="en-US" dirty="0"/>
-              <a:t>Employment distribution across sectors</a:t>
+              <a:t>Modeling the Data for analysis</a:t>
             </a:r>
           </a:p>
         </p:txBody>
@@ -8680,7 +10165,7 @@
           <p:cNvPr id="3" name="Content Placeholder 2">
             <a:extLst>
               <a:ext uri="{FF2B5EF4-FFF2-40B4-BE49-F238E27FC236}">
-                <a16:creationId xmlns:a16="http://schemas.microsoft.com/office/drawing/2014/main" id="{4AE43F76-A7E2-1AA4-136E-87AB8740ABC3}"/>
+                <a16:creationId xmlns:a16="http://schemas.microsoft.com/office/drawing/2014/main" id="{515408FA-6489-583C-1BA3-E459DC41372F}"/>
               </a:ext>
             </a:extLst>
           </p:cNvPr>
@@ -8698,7 +10183,7 @@
           <a:p>
             <a:r>
               <a:rPr lang="en-US" dirty="0"/>
-              <a:t>Answer to question 1</a:t>
+              <a:t>Here we will mention how we modeled the dataset for our analysis.</a:t>
             </a:r>
           </a:p>
         </p:txBody>
@@ -8706,7 +10191,7 @@
     </p:spTree>
     <p:extLst>
       <p:ext uri="{BB962C8B-B14F-4D97-AF65-F5344CB8AC3E}">
-        <p14:creationId xmlns:p14="http://schemas.microsoft.com/office/powerpoint/2010/main" val="846113174"/>
+        <p14:creationId xmlns:p14="http://schemas.microsoft.com/office/powerpoint/2010/main" val="1050294836"/>
       </p:ext>
     </p:extLst>
   </p:cSld>
@@ -8738,7 +10223,7 @@
           <p:cNvPr id="2" name="Title 1">
             <a:extLst>
               <a:ext uri="{FF2B5EF4-FFF2-40B4-BE49-F238E27FC236}">
-                <a16:creationId xmlns:a16="http://schemas.microsoft.com/office/drawing/2014/main" id="{366A98AE-7509-D80D-EFB1-B27BC31875E3}"/>
+                <a16:creationId xmlns:a16="http://schemas.microsoft.com/office/drawing/2014/main" id="{0B26DD3A-8586-17BE-EF0E-1D96C8750E0E}"/>
               </a:ext>
             </a:extLst>
           </p:cNvPr>
@@ -8751,13 +10236,17 @@
         </p:nvSpPr>
         <p:spPr/>
         <p:txBody>
-          <a:bodyPr/>
+          <a:bodyPr>
+            <a:normAutofit fontScale="90000"/>
+          </a:bodyPr>
           <a:lstStyle/>
           <a:p>
-            <a:r>
-              <a:rPr lang="en-US" sz="2900" dirty="0"/>
-              <a:t>Distribution of the wages in sectors</a:t>
-            </a:r>
+            <a:pPr algn="ctr"/>
+            <a:r>
+              <a:rPr lang="en-US" sz="3200" dirty="0"/>
+              <a:t>Data Processing – Cleaning &amp; transformation</a:t>
+            </a:r>
+            <a:endParaRPr lang="en-US" dirty="0"/>
           </a:p>
         </p:txBody>
       </p:sp>
@@ -8766,7 +10255,7 @@
           <p:cNvPr id="3" name="Content Placeholder 2">
             <a:extLst>
               <a:ext uri="{FF2B5EF4-FFF2-40B4-BE49-F238E27FC236}">
-                <a16:creationId xmlns:a16="http://schemas.microsoft.com/office/drawing/2014/main" id="{698876AD-4421-488E-E548-563BA8B50982}"/>
+                <a16:creationId xmlns:a16="http://schemas.microsoft.com/office/drawing/2014/main" id="{2DC91467-CFBA-DDDF-23B0-34D22DE5E45A}"/>
               </a:ext>
             </a:extLst>
           </p:cNvPr>
@@ -8782,17 +10271,54 @@
           <a:bodyPr/>
           <a:lstStyle/>
           <a:p>
+            <a:pPr marL="285750" indent="-285750">
+              <a:buFont typeface="Arial" panose="020B0604020202020204" pitchFamily="34" charset="0"/>
+              <a:buChar char="•"/>
+            </a:pPr>
             <a:r>
               <a:rPr lang="en-US" dirty="0"/>
-              <a:t>Answer to question 2</a:t>
-            </a:r>
+              <a:t>Removing headers and footers</a:t>
+            </a:r>
+          </a:p>
+          <a:p>
+            <a:pPr marL="285750" indent="-285750">
+              <a:buFont typeface="Arial" panose="020B0604020202020204" pitchFamily="34" charset="0"/>
+              <a:buChar char="•"/>
+            </a:pPr>
+            <a:r>
+              <a:rPr lang="en-US" dirty="0"/>
+              <a:t>Remove duplicated records  </a:t>
+            </a:r>
+          </a:p>
+          <a:p>
+            <a:pPr marL="285750" indent="-285750">
+              <a:buFont typeface="Arial" panose="020B0604020202020204" pitchFamily="34" charset="0"/>
+              <a:buChar char="•"/>
+            </a:pPr>
+            <a:r>
+              <a:rPr lang="en-US" dirty="0"/>
+              <a:t>Replace  hyphens (-), dollar signs and commas with empty string</a:t>
+            </a:r>
+          </a:p>
+          <a:p>
+            <a:pPr marL="285750" indent="-285750">
+              <a:buFont typeface="Arial" panose="020B0604020202020204" pitchFamily="34" charset="0"/>
+              <a:buChar char="•"/>
+            </a:pPr>
+            <a:r>
+              <a:rPr lang="en-US" dirty="0"/>
+              <a:t>Conversion from string to numerical </a:t>
+            </a:r>
+          </a:p>
+          <a:p>
+            <a:endParaRPr lang="en-US" dirty="0"/>
           </a:p>
         </p:txBody>
       </p:sp>
     </p:spTree>
     <p:extLst>
       <p:ext uri="{BB962C8B-B14F-4D97-AF65-F5344CB8AC3E}">
-        <p14:creationId xmlns:p14="http://schemas.microsoft.com/office/powerpoint/2010/main" val="412630050"/>
+        <p14:creationId xmlns:p14="http://schemas.microsoft.com/office/powerpoint/2010/main" val="1085880922"/>
       </p:ext>
     </p:extLst>
   </p:cSld>
@@ -8824,7 +10350,7 @@
           <p:cNvPr id="2" name="Title 1">
             <a:extLst>
               <a:ext uri="{FF2B5EF4-FFF2-40B4-BE49-F238E27FC236}">
-                <a16:creationId xmlns:a16="http://schemas.microsoft.com/office/drawing/2014/main" id="{87611440-FD6E-8D29-49FD-B42A7175AE0B}"/>
+                <a16:creationId xmlns:a16="http://schemas.microsoft.com/office/drawing/2014/main" id="{DA3033C8-34BA-97EB-EF47-BE9D6B87C327}"/>
               </a:ext>
             </a:extLst>
           </p:cNvPr>
@@ -8837,40 +10363,79 @@
         </p:nvSpPr>
         <p:spPr/>
         <p:txBody>
-          <a:bodyPr/>
+          <a:bodyPr>
+            <a:normAutofit/>
+          </a:bodyPr>
           <a:lstStyle/>
           <a:p>
-            <a:r>
-              <a:rPr lang="en-US" sz="2900" dirty="0"/>
-              <a:t>Employment openings and change</a:t>
-            </a:r>
-          </a:p>
-        </p:txBody>
-      </p:sp>
-      <p:sp>
-        <p:nvSpPr>
-          <p:cNvPr id="3" name="Content Placeholder 2">
+            <a:pPr algn="ctr"/>
+            <a:r>
+              <a:rPr lang="en-US" dirty="0"/>
+              <a:t>Employment distribution</a:t>
+            </a:r>
+          </a:p>
+        </p:txBody>
+      </p:sp>
+      <p:pic>
+        <p:nvPicPr>
+          <p:cNvPr id="5" name="Content Placeholder 4">
             <a:extLst>
               <a:ext uri="{FF2B5EF4-FFF2-40B4-BE49-F238E27FC236}">
-                <a16:creationId xmlns:a16="http://schemas.microsoft.com/office/drawing/2014/main" id="{35CD4FB9-2182-FEC3-89FC-8902B131961D}"/>
+                <a16:creationId xmlns:a16="http://schemas.microsoft.com/office/drawing/2014/main" id="{E3E0909F-364C-5E7A-1505-A3DE2FBCEEDF}"/>
               </a:ext>
             </a:extLst>
           </p:cNvPr>
-          <p:cNvSpPr>
-            <a:spLocks noGrp="1"/>
-          </p:cNvSpPr>
+          <p:cNvPicPr>
+            <a:picLocks noGrp="1" noChangeAspect="1"/>
+          </p:cNvPicPr>
           <p:nvPr>
             <p:ph idx="1"/>
           </p:nvPr>
-        </p:nvSpPr>
-        <p:spPr/>
-        <p:txBody>
-          <a:bodyPr/>
+        </p:nvPicPr>
+        <p:blipFill>
+          <a:blip r:embed="rId2"/>
+          <a:stretch>
+            <a:fillRect/>
+          </a:stretch>
+        </p:blipFill>
+        <p:spPr>
+          <a:xfrm>
+            <a:off x="2223899" y="2566184"/>
+            <a:ext cx="8163252" cy="1975275"/>
+          </a:xfrm>
+        </p:spPr>
+      </p:pic>
+      <p:sp>
+        <p:nvSpPr>
+          <p:cNvPr id="6" name="TextBox 5">
+            <a:extLst>
+              <a:ext uri="{FF2B5EF4-FFF2-40B4-BE49-F238E27FC236}">
+                <a16:creationId xmlns:a16="http://schemas.microsoft.com/office/drawing/2014/main" id="{5B277CED-5469-3359-5597-86135B941B43}"/>
+              </a:ext>
+            </a:extLst>
+          </p:cNvPr>
+          <p:cNvSpPr txBox="1"/>
+          <p:nvPr/>
+        </p:nvSpPr>
+        <p:spPr>
+          <a:xfrm>
+            <a:off x="1664898" y="5227608"/>
+            <a:ext cx="8128000" cy="338554"/>
+          </a:xfrm>
+          <a:prstGeom prst="rect">
+            <a:avLst/>
+          </a:prstGeom>
+          <a:noFill/>
+        </p:spPr>
+        <p:txBody>
+          <a:bodyPr wrap="square" rtlCol="0">
+            <a:spAutoFit/>
+          </a:bodyPr>
           <a:lstStyle/>
           <a:p>
             <a:r>
-              <a:rPr lang="en-US" dirty="0"/>
-              <a:t>Answer to question 3</a:t>
+              <a:rPr lang="en-US" sz="1600" dirty="0"/>
+              <a:t>Note: The employment data values are in thousands </a:t>
             </a:r>
           </a:p>
         </p:txBody>
@@ -8878,7 +10443,7 @@
     </p:spTree>
     <p:extLst>
       <p:ext uri="{BB962C8B-B14F-4D97-AF65-F5344CB8AC3E}">
-        <p14:creationId xmlns:p14="http://schemas.microsoft.com/office/powerpoint/2010/main" val="3285959969"/>
+        <p14:creationId xmlns:p14="http://schemas.microsoft.com/office/powerpoint/2010/main" val="846113174"/>
       </p:ext>
     </p:extLst>
   </p:cSld>
@@ -8905,66 +10470,101 @@
           <a:chExt cx="0" cy="0"/>
         </a:xfrm>
       </p:grpSpPr>
-      <p:sp>
-        <p:nvSpPr>
-          <p:cNvPr id="2" name="Title 1">
+      <p:pic>
+        <p:nvPicPr>
+          <p:cNvPr id="2" name="Picture 1">
             <a:extLst>
               <a:ext uri="{FF2B5EF4-FFF2-40B4-BE49-F238E27FC236}">
-                <a16:creationId xmlns:a16="http://schemas.microsoft.com/office/drawing/2014/main" id="{53E072B9-EF2E-6C65-5FAE-C77DD3149FCD}"/>
+                <a16:creationId xmlns:a16="http://schemas.microsoft.com/office/drawing/2014/main" id="{4C571780-F12F-73E1-9729-631DFC0C0791}"/>
               </a:ext>
             </a:extLst>
           </p:cNvPr>
-          <p:cNvSpPr>
-            <a:spLocks noGrp="1"/>
-          </p:cNvSpPr>
-          <p:nvPr>
-            <p:ph type="title"/>
-          </p:nvPr>
-        </p:nvSpPr>
-        <p:spPr/>
-        <p:txBody>
-          <a:bodyPr/>
-          <a:lstStyle/>
-          <a:p>
-            <a:r>
-              <a:rPr lang="en-US" sz="2900" dirty="0"/>
-              <a:t>Occupations affected due to automation</a:t>
-            </a:r>
-          </a:p>
-        </p:txBody>
-      </p:sp>
-      <p:sp>
-        <p:nvSpPr>
-          <p:cNvPr id="3" name="Content Placeholder 2">
+          <p:cNvPicPr>
+            <a:picLocks noChangeAspect="1"/>
+          </p:cNvPicPr>
+          <p:nvPr/>
+        </p:nvPicPr>
+        <p:blipFill>
+          <a:blip r:embed="rId2"/>
+          <a:stretch>
+            <a:fillRect/>
+          </a:stretch>
+        </p:blipFill>
+        <p:spPr>
+          <a:xfrm>
+            <a:off x="4825292" y="278372"/>
+            <a:ext cx="6137586" cy="6301256"/>
+          </a:xfrm>
+          <a:prstGeom prst="rect">
+            <a:avLst/>
+          </a:prstGeom>
+        </p:spPr>
+      </p:pic>
+      <p:sp>
+        <p:nvSpPr>
+          <p:cNvPr id="3" name="Title 1">
             <a:extLst>
               <a:ext uri="{FF2B5EF4-FFF2-40B4-BE49-F238E27FC236}">
-                <a16:creationId xmlns:a16="http://schemas.microsoft.com/office/drawing/2014/main" id="{871FBAC8-42C0-B71C-E9CD-4BC8A66AEE97}"/>
+                <a16:creationId xmlns:a16="http://schemas.microsoft.com/office/drawing/2014/main" id="{2F64FD32-CC1E-C9A5-5801-9F8595DB7DF4}"/>
               </a:ext>
             </a:extLst>
           </p:cNvPr>
-          <p:cNvSpPr>
-            <a:spLocks noGrp="1"/>
-          </p:cNvSpPr>
-          <p:nvPr>
-            <p:ph idx="1"/>
-          </p:nvPr>
-        </p:nvSpPr>
-        <p:spPr/>
-        <p:txBody>
-          <a:bodyPr/>
-          <a:lstStyle/>
-          <a:p>
-            <a:r>
-              <a:rPr lang="en-US" dirty="0"/>
-              <a:t>Answer to question 4</a:t>
-            </a:r>
+          <p:cNvSpPr txBox="1">
+            <a:spLocks/>
+          </p:cNvSpPr>
+          <p:nvPr/>
+        </p:nvSpPr>
+        <p:spPr>
+          <a:xfrm>
+            <a:off x="85060" y="442220"/>
+            <a:ext cx="4359349" cy="2311613"/>
+          </a:xfrm>
+          <a:prstGeom prst="rect">
+            <a:avLst/>
+          </a:prstGeom>
+        </p:spPr>
+        <p:txBody>
+          <a:bodyPr>
+            <a:normAutofit fontScale="97500" lnSpcReduction="10000"/>
+          </a:bodyPr>
+          <a:lstStyle>
+            <a:lvl1pPr algn="l" defTabSz="914400" rtl="0" eaLnBrk="1" latinLnBrk="0" hangingPunct="1">
+              <a:lnSpc>
+                <a:spcPct val="130000"/>
+              </a:lnSpc>
+              <a:spcBef>
+                <a:spcPct val="0"/>
+              </a:spcBef>
+              <a:buNone/>
+              <a:defRPr sz="3200" b="1" kern="1200" spc="150" baseline="0">
+                <a:solidFill>
+                  <a:schemeClr val="tx1">
+                    <a:lumMod val="75000"/>
+                    <a:lumOff val="25000"/>
+                  </a:schemeClr>
+                </a:solidFill>
+                <a:latin typeface="+mj-lt"/>
+                <a:ea typeface="+mj-ea"/>
+                <a:cs typeface="+mj-cs"/>
+              </a:defRPr>
+            </a:lvl1pPr>
+          </a:lstStyle>
+          <a:p>
+            <a:r>
+              <a:rPr lang="en-US" sz="2400"/>
+              <a:t>Current and Projected employment(2032) distribution in major sectors</a:t>
+            </a:r>
+            <a:br>
+              <a:rPr lang="en-US" sz="2400"/>
+            </a:br>
+            <a:endParaRPr lang="en-US" sz="2400" dirty="0"/>
           </a:p>
         </p:txBody>
       </p:sp>
     </p:spTree>
     <p:extLst>
       <p:ext uri="{BB962C8B-B14F-4D97-AF65-F5344CB8AC3E}">
-        <p14:creationId xmlns:p14="http://schemas.microsoft.com/office/powerpoint/2010/main" val="299659909"/>
+        <p14:creationId xmlns:p14="http://schemas.microsoft.com/office/powerpoint/2010/main" val="2847714441"/>
       </p:ext>
     </p:extLst>
   </p:cSld>
@@ -9155,4 +10755,299 @@
     </a:ext>
   </a:extLst>
 </a:theme>
+</file>
+
+<file path=ppt/theme/theme2.xml><?xml version="1.0" encoding="utf-8"?>
+<a:theme xmlns:a="http://schemas.openxmlformats.org/drawingml/2006/main" name="Office Theme">
+  <a:themeElements>
+    <a:clrScheme name="Office">
+      <a:dk1>
+        <a:sysClr val="windowText" lastClr="000000"/>
+      </a:dk1>
+      <a:lt1>
+        <a:sysClr val="window" lastClr="FFFFFF"/>
+      </a:lt1>
+      <a:dk2>
+        <a:srgbClr val="44546A"/>
+      </a:dk2>
+      <a:lt2>
+        <a:srgbClr val="E7E6E6"/>
+      </a:lt2>
+      <a:accent1>
+        <a:srgbClr val="4472C4"/>
+      </a:accent1>
+      <a:accent2>
+        <a:srgbClr val="ED7D31"/>
+      </a:accent2>
+      <a:accent3>
+        <a:srgbClr val="A5A5A5"/>
+      </a:accent3>
+      <a:accent4>
+        <a:srgbClr val="FFC000"/>
+      </a:accent4>
+      <a:accent5>
+        <a:srgbClr val="5B9BD5"/>
+      </a:accent5>
+      <a:accent6>
+        <a:srgbClr val="70AD47"/>
+      </a:accent6>
+      <a:hlink>
+        <a:srgbClr val="0563C1"/>
+      </a:hlink>
+      <a:folHlink>
+        <a:srgbClr val="954F72"/>
+      </a:folHlink>
+    </a:clrScheme>
+    <a:fontScheme name="Office">
+      <a:majorFont>
+        <a:latin typeface="Calibri Light" panose="020F0302020204030204"/>
+        <a:ea typeface=""/>
+        <a:cs typeface=""/>
+        <a:font script="Jpan" typeface="游ゴシック Light"/>
+        <a:font script="Hang" typeface="맑은 고딕"/>
+        <a:font script="Hans" typeface="等线 Light"/>
+        <a:font script="Hant" typeface="新細明體"/>
+        <a:font script="Arab" typeface="Times New Roman"/>
+        <a:font script="Hebr" typeface="Times New Roman"/>
+        <a:font script="Thai" typeface="Angsana New"/>
+        <a:font script="Ethi" typeface="Nyala"/>
+        <a:font script="Beng" typeface="Vrinda"/>
+        <a:font script="Gujr" typeface="Shruti"/>
+        <a:font script="Khmr" typeface="MoolBoran"/>
+        <a:font script="Knda" typeface="Tunga"/>
+        <a:font script="Guru" typeface="Raavi"/>
+        <a:font script="Cans" typeface="Euphemia"/>
+        <a:font script="Cher" typeface="Plantagenet Cherokee"/>
+        <a:font script="Yiii" typeface="Microsoft Yi Baiti"/>
+        <a:font script="Tibt" typeface="Microsoft Himalaya"/>
+        <a:font script="Thaa" typeface="MV Boli"/>
+        <a:font script="Deva" typeface="Mangal"/>
+        <a:font script="Telu" typeface="Gautami"/>
+        <a:font script="Taml" typeface="Latha"/>
+        <a:font script="Syrc" typeface="Estrangelo Edessa"/>
+        <a:font script="Orya" typeface="Kalinga"/>
+        <a:font script="Mlym" typeface="Kartika"/>
+        <a:font script="Laoo" typeface="DokChampa"/>
+        <a:font script="Sinh" typeface="Iskoola Pota"/>
+        <a:font script="Mong" typeface="Mongolian Baiti"/>
+        <a:font script="Viet" typeface="Times New Roman"/>
+        <a:font script="Uigh" typeface="Microsoft Uighur"/>
+        <a:font script="Geor" typeface="Sylfaen"/>
+        <a:font script="Armn" typeface="Arial"/>
+        <a:font script="Bugi" typeface="Leelawadee UI"/>
+        <a:font script="Bopo" typeface="Microsoft JhengHei"/>
+        <a:font script="Java" typeface="Javanese Text"/>
+        <a:font script="Lisu" typeface="Segoe UI"/>
+        <a:font script="Mymr" typeface="Myanmar Text"/>
+        <a:font script="Nkoo" typeface="Ebrima"/>
+        <a:font script="Olck" typeface="Nirmala UI"/>
+        <a:font script="Osma" typeface="Ebrima"/>
+        <a:font script="Phag" typeface="Phagspa"/>
+        <a:font script="Syrn" typeface="Estrangelo Edessa"/>
+        <a:font script="Syrj" typeface="Estrangelo Edessa"/>
+        <a:font script="Syre" typeface="Estrangelo Edessa"/>
+        <a:font script="Sora" typeface="Nirmala UI"/>
+        <a:font script="Tale" typeface="Microsoft Tai Le"/>
+        <a:font script="Talu" typeface="Microsoft New Tai Lue"/>
+        <a:font script="Tfng" typeface="Ebrima"/>
+      </a:majorFont>
+      <a:minorFont>
+        <a:latin typeface="Calibri" panose="020F0502020204030204"/>
+        <a:ea typeface=""/>
+        <a:cs typeface=""/>
+        <a:font script="Jpan" typeface="游ゴシック"/>
+        <a:font script="Hang" typeface="맑은 고딕"/>
+        <a:font script="Hans" typeface="等线"/>
+        <a:font script="Hant" typeface="新細明體"/>
+        <a:font script="Arab" typeface="Arial"/>
+        <a:font script="Hebr" typeface="Arial"/>
+        <a:font script="Thai" typeface="Cordia New"/>
+        <a:font script="Ethi" typeface="Nyala"/>
+        <a:font script="Beng" typeface="Vrinda"/>
+        <a:font script="Gujr" typeface="Shruti"/>
+        <a:font script="Khmr" typeface="DaunPenh"/>
+        <a:font script="Knda" typeface="Tunga"/>
+        <a:font script="Guru" typeface="Raavi"/>
+        <a:font script="Cans" typeface="Euphemia"/>
+        <a:font script="Cher" typeface="Plantagenet Cherokee"/>
+        <a:font script="Yiii" typeface="Microsoft Yi Baiti"/>
+        <a:font script="Tibt" typeface="Microsoft Himalaya"/>
+        <a:font script="Thaa" typeface="MV Boli"/>
+        <a:font script="Deva" typeface="Mangal"/>
+        <a:font script="Telu" typeface="Gautami"/>
+        <a:font script="Taml" typeface="Latha"/>
+        <a:font script="Syrc" typeface="Estrangelo Edessa"/>
+        <a:font script="Orya" typeface="Kalinga"/>
+        <a:font script="Mlym" typeface="Kartika"/>
+        <a:font script="Laoo" typeface="DokChampa"/>
+        <a:font script="Sinh" typeface="Iskoola Pota"/>
+        <a:font script="Mong" typeface="Mongolian Baiti"/>
+        <a:font script="Viet" typeface="Arial"/>
+        <a:font script="Uigh" typeface="Microsoft Uighur"/>
+        <a:font script="Geor" typeface="Sylfaen"/>
+        <a:font script="Armn" typeface="Arial"/>
+        <a:font script="Bugi" typeface="Leelawadee UI"/>
+        <a:font script="Bopo" typeface="Microsoft JhengHei"/>
+        <a:font script="Java" typeface="Javanese Text"/>
+        <a:font script="Lisu" typeface="Segoe UI"/>
+        <a:font script="Mymr" typeface="Myanmar Text"/>
+        <a:font script="Nkoo" typeface="Ebrima"/>
+        <a:font script="Olck" typeface="Nirmala UI"/>
+        <a:font script="Osma" typeface="Ebrima"/>
+        <a:font script="Phag" typeface="Phagspa"/>
+        <a:font script="Syrn" typeface="Estrangelo Edessa"/>
+        <a:font script="Syrj" typeface="Estrangelo Edessa"/>
+        <a:font script="Syre" typeface="Estrangelo Edessa"/>
+        <a:font script="Sora" typeface="Nirmala UI"/>
+        <a:font script="Tale" typeface="Microsoft Tai Le"/>
+        <a:font script="Talu" typeface="Microsoft New Tai Lue"/>
+        <a:font script="Tfng" typeface="Ebrima"/>
+      </a:minorFont>
+    </a:fontScheme>
+    <a:fmtScheme name="Office">
+      <a:fillStyleLst>
+        <a:solidFill>
+          <a:schemeClr val="phClr"/>
+        </a:solidFill>
+        <a:gradFill rotWithShape="1">
+          <a:gsLst>
+            <a:gs pos="0">
+              <a:schemeClr val="phClr">
+                <a:lumMod val="110000"/>
+                <a:satMod val="105000"/>
+                <a:tint val="67000"/>
+              </a:schemeClr>
+            </a:gs>
+            <a:gs pos="50000">
+              <a:schemeClr val="phClr">
+                <a:lumMod val="105000"/>
+                <a:satMod val="103000"/>
+                <a:tint val="73000"/>
+              </a:schemeClr>
+            </a:gs>
+            <a:gs pos="100000">
+              <a:schemeClr val="phClr">
+                <a:lumMod val="105000"/>
+                <a:satMod val="109000"/>
+                <a:tint val="81000"/>
+              </a:schemeClr>
+            </a:gs>
+          </a:gsLst>
+          <a:lin ang="5400000" scaled="0"/>
+        </a:gradFill>
+        <a:gradFill rotWithShape="1">
+          <a:gsLst>
+            <a:gs pos="0">
+              <a:schemeClr val="phClr">
+                <a:satMod val="103000"/>
+                <a:lumMod val="102000"/>
+                <a:tint val="94000"/>
+              </a:schemeClr>
+            </a:gs>
+            <a:gs pos="50000">
+              <a:schemeClr val="phClr">
+                <a:satMod val="110000"/>
+                <a:lumMod val="100000"/>
+                <a:shade val="100000"/>
+              </a:schemeClr>
+            </a:gs>
+            <a:gs pos="100000">
+              <a:schemeClr val="phClr">
+                <a:lumMod val="99000"/>
+                <a:satMod val="120000"/>
+                <a:shade val="78000"/>
+              </a:schemeClr>
+            </a:gs>
+          </a:gsLst>
+          <a:lin ang="5400000" scaled="0"/>
+        </a:gradFill>
+      </a:fillStyleLst>
+      <a:lnStyleLst>
+        <a:ln w="6350" cap="flat" cmpd="sng" algn="ctr">
+          <a:solidFill>
+            <a:schemeClr val="phClr"/>
+          </a:solidFill>
+          <a:prstDash val="solid"/>
+          <a:miter lim="800000"/>
+        </a:ln>
+        <a:ln w="12700" cap="flat" cmpd="sng" algn="ctr">
+          <a:solidFill>
+            <a:schemeClr val="phClr"/>
+          </a:solidFill>
+          <a:prstDash val="solid"/>
+          <a:miter lim="800000"/>
+        </a:ln>
+        <a:ln w="19050" cap="flat" cmpd="sng" algn="ctr">
+          <a:solidFill>
+            <a:schemeClr val="phClr"/>
+          </a:solidFill>
+          <a:prstDash val="solid"/>
+          <a:miter lim="800000"/>
+        </a:ln>
+      </a:lnStyleLst>
+      <a:effectStyleLst>
+        <a:effectStyle>
+          <a:effectLst/>
+        </a:effectStyle>
+        <a:effectStyle>
+          <a:effectLst/>
+        </a:effectStyle>
+        <a:effectStyle>
+          <a:effectLst>
+            <a:outerShdw blurRad="57150" dist="19050" dir="5400000" algn="ctr" rotWithShape="0">
+              <a:srgbClr val="000000">
+                <a:alpha val="63000"/>
+              </a:srgbClr>
+            </a:outerShdw>
+          </a:effectLst>
+        </a:effectStyle>
+      </a:effectStyleLst>
+      <a:bgFillStyleLst>
+        <a:solidFill>
+          <a:schemeClr val="phClr"/>
+        </a:solidFill>
+        <a:solidFill>
+          <a:schemeClr val="phClr">
+            <a:tint val="95000"/>
+            <a:satMod val="170000"/>
+          </a:schemeClr>
+        </a:solidFill>
+        <a:gradFill rotWithShape="1">
+          <a:gsLst>
+            <a:gs pos="0">
+              <a:schemeClr val="phClr">
+                <a:tint val="93000"/>
+                <a:satMod val="150000"/>
+                <a:shade val="98000"/>
+                <a:lumMod val="102000"/>
+              </a:schemeClr>
+            </a:gs>
+            <a:gs pos="50000">
+              <a:schemeClr val="phClr">
+                <a:tint val="98000"/>
+                <a:satMod val="130000"/>
+                <a:shade val="90000"/>
+                <a:lumMod val="103000"/>
+              </a:schemeClr>
+            </a:gs>
+            <a:gs pos="100000">
+              <a:schemeClr val="phClr">
+                <a:shade val="63000"/>
+                <a:satMod val="120000"/>
+              </a:schemeClr>
+            </a:gs>
+          </a:gsLst>
+          <a:lin ang="5400000" scaled="0"/>
+        </a:gradFill>
+      </a:bgFillStyleLst>
+    </a:fmtScheme>
+  </a:themeElements>
+  <a:objectDefaults/>
+  <a:extraClrSchemeLst/>
+  <a:extLst>
+    <a:ext uri="{05A4C25C-085E-4340-85A3-A5531E510DB2}">
+      <thm15:themeFamily xmlns:thm15="http://schemas.microsoft.com/office/thememl/2012/main" name="Office Theme" id="{62F939B6-93AF-4DB8-9C6B-D6C7DFDC589F}" vid="{4A3C46E8-61CC-4603-A589-7422A47A8E4A}"/>
+    </a:ext>
+  </a:extLst>
+</a:theme>
 </file>
</xml_diff>

<commit_message>
Analysis of impact of automation on different Ethnicity
Analysis of impact of automation on different Ethnicity,
Captured output graphs,
Analysis of impacted jobs.
</commit_message>
<xml_diff>
--- a/Project1.pptx
+++ b/Project1.pptx
@@ -5,7 +5,7 @@
     <p:sldMasterId id="2147483699" r:id="rId1"/>
   </p:sldMasterIdLst>
   <p:notesMasterIdLst>
-    <p:notesMasterId r:id="rId25"/>
+    <p:notesMasterId r:id="rId27"/>
   </p:notesMasterIdLst>
   <p:sldIdLst>
     <p:sldId id="256" r:id="rId2"/>
@@ -23,14 +23,16 @@
     <p:sldId id="262" r:id="rId14"/>
     <p:sldId id="263" r:id="rId15"/>
     <p:sldId id="264" r:id="rId16"/>
-    <p:sldId id="265" r:id="rId17"/>
-    <p:sldId id="266" r:id="rId18"/>
-    <p:sldId id="267" r:id="rId19"/>
-    <p:sldId id="268" r:id="rId20"/>
-    <p:sldId id="269" r:id="rId21"/>
-    <p:sldId id="270" r:id="rId22"/>
-    <p:sldId id="271" r:id="rId23"/>
-    <p:sldId id="272" r:id="rId24"/>
+    <p:sldId id="281" r:id="rId17"/>
+    <p:sldId id="282" r:id="rId18"/>
+    <p:sldId id="265" r:id="rId19"/>
+    <p:sldId id="266" r:id="rId20"/>
+    <p:sldId id="267" r:id="rId21"/>
+    <p:sldId id="268" r:id="rId22"/>
+    <p:sldId id="269" r:id="rId23"/>
+    <p:sldId id="270" r:id="rId24"/>
+    <p:sldId id="271" r:id="rId25"/>
+    <p:sldId id="272" r:id="rId26"/>
   </p:sldIdLst>
   <p:sldSz cx="12192000" cy="6858000"/>
   <p:notesSz cx="6858000" cy="9144000"/>
@@ -219,7 +221,7 @@
           <a:p>
             <a:fld id="{BBCA6A9B-02FA-464D-8DA1-F597653855BC}" type="datetimeFigureOut">
               <a:rPr lang="en-US" smtClean="0"/>
-              <a:t>10/22/2023</a:t>
+              <a:t>10/22/23</a:t>
             </a:fld>
             <a:endParaRPr lang="en-US"/>
           </a:p>
@@ -877,7 +879,7 @@
           <a:p>
             <a:fld id="{12241623-A064-4BED-B073-BA4D61433402}" type="datetime1">
               <a:rPr lang="en-US" smtClean="0"/>
-              <a:t>10/22/2023</a:t>
+              <a:t>10/22/23</a:t>
             </a:fld>
             <a:endParaRPr lang="en-US" dirty="0"/>
           </a:p>
@@ -1688,7 +1690,7 @@
           <a:p>
             <a:fld id="{6F86ED0C-1DA7-41F0-94CF-6218B1FEDFF1}" type="datetime1">
               <a:rPr lang="en-US" smtClean="0"/>
-              <a:t>10/22/2023</a:t>
+              <a:t>10/22/23</a:t>
             </a:fld>
             <a:endParaRPr lang="en-US" dirty="0"/>
           </a:p>
@@ -1887,7 +1889,7 @@
           <a:p>
             <a:fld id="{EECF02AB-6034-4B88-BC5A-7C17CB0EF809}" type="datetime1">
               <a:rPr lang="en-US" smtClean="0"/>
-              <a:t>10/22/2023</a:t>
+              <a:t>10/22/23</a:t>
             </a:fld>
             <a:endParaRPr lang="en-US" dirty="0"/>
           </a:p>
@@ -2122,7 +2124,7 @@
           <a:p>
             <a:fld id="{22F3E5F3-28EE-488F-BD53-B744C06C3DEC}" type="datetime1">
               <a:rPr lang="en-US" smtClean="0"/>
-              <a:t>10/22/2023</a:t>
+              <a:t>10/22/23</a:t>
             </a:fld>
             <a:endParaRPr lang="en-US" dirty="0"/>
           </a:p>
@@ -4815,7 +4817,7 @@
           <a:p>
             <a:fld id="{E72EB70D-CD01-44DA-83B3-8FEB3383D307}" type="datetime1">
               <a:rPr lang="en-US" smtClean="0"/>
-              <a:t>10/22/2023</a:t>
+              <a:t>10/22/23</a:t>
             </a:fld>
             <a:endParaRPr lang="en-US" dirty="0"/>
           </a:p>
@@ -5011,7 +5013,7 @@
           <a:p>
             <a:fld id="{D0158CFD-9357-46BE-A189-D637A67C8730}" type="datetime1">
               <a:rPr lang="en-US" smtClean="0"/>
-              <a:t>10/22/2023</a:t>
+              <a:t>10/22/23</a:t>
             </a:fld>
             <a:endParaRPr lang="en-US" dirty="0"/>
           </a:p>
@@ -5400,7 +5402,7 @@
           <a:p>
             <a:fld id="{7B4742EE-B331-4632-BD10-A82FED6B6FC0}" type="datetime1">
               <a:rPr lang="en-US" smtClean="0"/>
-              <a:t>10/22/2023</a:t>
+              <a:t>10/22/23</a:t>
             </a:fld>
             <a:endParaRPr lang="en-US" dirty="0"/>
           </a:p>
@@ -5566,7 +5568,7 @@
           <a:p>
             <a:fld id="{451BA835-D13F-49F4-8F11-5D576AC65FAD}" type="datetime1">
               <a:rPr lang="en-US" smtClean="0"/>
-              <a:t>10/22/2023</a:t>
+              <a:t>10/22/23</a:t>
             </a:fld>
             <a:endParaRPr lang="en-US" dirty="0"/>
           </a:p>
@@ -5689,7 +5691,7 @@
           <a:p>
             <a:fld id="{ADBD1799-ACB5-4CB2-86A2-5C574F1C8706}" type="datetime1">
               <a:rPr lang="en-US" smtClean="0"/>
-              <a:t>10/22/2023</a:t>
+              <a:t>10/22/23</a:t>
             </a:fld>
             <a:endParaRPr lang="en-US" dirty="0"/>
           </a:p>
@@ -5999,7 +6001,7 @@
           <a:p>
             <a:fld id="{ED5DD0D6-7A82-473E-879B-C6ECD6CCCFEC}" type="datetime1">
               <a:rPr lang="en-US" smtClean="0"/>
-              <a:t>10/22/2023</a:t>
+              <a:t>10/22/23</a:t>
             </a:fld>
             <a:endParaRPr lang="en-US" dirty="0"/>
           </a:p>
@@ -6299,7 +6301,7 @@
           <a:p>
             <a:fld id="{D4605E03-BC17-41A7-854C-DFAB672737DC}" type="datetime1">
               <a:rPr lang="en-US" smtClean="0"/>
-              <a:t>10/22/2023</a:t>
+              <a:t>10/22/23</a:t>
             </a:fld>
             <a:endParaRPr lang="en-US" dirty="0"/>
           </a:p>
@@ -6551,7 +6553,7 @@
           <a:p>
             <a:fld id="{C4408324-A84C-4A45-93B6-78D079CCE772}" type="datetime1">
               <a:rPr lang="en-US" smtClean="0"/>
-              <a:t>10/22/2023</a:t>
+              <a:t>10/22/23</a:t>
             </a:fld>
             <a:endParaRPr lang="en-US" dirty="0"/>
           </a:p>
@@ -8560,13 +8562,40 @@
           <a:bodyPr/>
           <a:lstStyle/>
           <a:p>
-            <a:r>
-              <a:rPr lang="en-US" dirty="0"/>
-              <a:t>Answer to question 4</a:t>
-            </a:r>
-          </a:p>
-        </p:txBody>
-      </p:sp>
+            <a:endParaRPr lang="en-US" dirty="0"/>
+          </a:p>
+        </p:txBody>
+      </p:sp>
+      <p:pic>
+        <p:nvPicPr>
+          <p:cNvPr id="5" name="Picture 4">
+            <a:extLst>
+              <a:ext uri="{FF2B5EF4-FFF2-40B4-BE49-F238E27FC236}">
+                <a16:creationId xmlns:a16="http://schemas.microsoft.com/office/drawing/2014/main" id="{486D3656-6354-A5EF-0FD3-23F346FE79C0}"/>
+              </a:ext>
+            </a:extLst>
+          </p:cNvPr>
+          <p:cNvPicPr>
+            <a:picLocks noChangeAspect="1"/>
+          </p:cNvPicPr>
+          <p:nvPr/>
+        </p:nvPicPr>
+        <p:blipFill>
+          <a:blip r:embed="rId2"/>
+          <a:stretch>
+            <a:fillRect/>
+          </a:stretch>
+        </p:blipFill>
+        <p:spPr>
+          <a:xfrm>
+            <a:off x="1920240" y="2201124"/>
+            <a:ext cx="8770570" cy="3984679"/>
+          </a:xfrm>
+          <a:prstGeom prst="rect">
+            <a:avLst/>
+          </a:prstGeom>
+        </p:spPr>
+      </p:pic>
     </p:spTree>
     <p:extLst>
       <p:ext uri="{BB962C8B-B14F-4D97-AF65-F5344CB8AC3E}">
@@ -8602,7 +8631,7 @@
           <p:cNvPr id="2" name="Title 1">
             <a:extLst>
               <a:ext uri="{FF2B5EF4-FFF2-40B4-BE49-F238E27FC236}">
-                <a16:creationId xmlns:a16="http://schemas.microsoft.com/office/drawing/2014/main" id="{AC8CA5D3-756E-6076-0084-59894B6DB045}"/>
+                <a16:creationId xmlns:a16="http://schemas.microsoft.com/office/drawing/2014/main" id="{AFFD55C8-029C-FE77-ECCB-A88B487FAC08}"/>
               </a:ext>
             </a:extLst>
           </p:cNvPr>
@@ -8615,56 +8644,147 @@
         </p:nvSpPr>
         <p:spPr>
           <a:xfrm>
-            <a:off x="1920239" y="398677"/>
-            <a:ext cx="8770571" cy="1345269"/>
+            <a:off x="1811903" y="195314"/>
+            <a:ext cx="8568193" cy="732337"/>
           </a:xfrm>
         </p:spPr>
         <p:txBody>
-          <a:bodyPr/>
+          <a:bodyPr>
+            <a:normAutofit fontScale="90000"/>
+          </a:bodyPr>
           <a:lstStyle/>
           <a:p>
             <a:r>
-              <a:rPr lang="en-US" sz="2900" dirty="0"/>
-              <a:t>Fastest growing/declining occupations</a:t>
-            </a:r>
-          </a:p>
-        </p:txBody>
-      </p:sp>
-      <p:sp>
-        <p:nvSpPr>
-          <p:cNvPr id="3" name="Content Placeholder 2">
+              <a:rPr lang="en-US"/>
+              <a:t>Impact of automation per Ethnicity </a:t>
+            </a:r>
+            <a:endParaRPr lang="en-US" dirty="0"/>
+          </a:p>
+        </p:txBody>
+      </p:sp>
+      <p:pic>
+        <p:nvPicPr>
+          <p:cNvPr id="5" name="Content Placeholder 4" descr="A graph with red and green bars&#10;&#10;Description automatically generated">
             <a:extLst>
               <a:ext uri="{FF2B5EF4-FFF2-40B4-BE49-F238E27FC236}">
-                <a16:creationId xmlns:a16="http://schemas.microsoft.com/office/drawing/2014/main" id="{42B96626-6607-F1E8-FA72-C2F7D378D65A}"/>
+                <a16:creationId xmlns:a16="http://schemas.microsoft.com/office/drawing/2014/main" id="{2D25F527-869D-CF03-04D6-4E3340ED0160}"/>
               </a:ext>
             </a:extLst>
           </p:cNvPr>
-          <p:cNvSpPr>
-            <a:spLocks noGrp="1"/>
-          </p:cNvSpPr>
+          <p:cNvPicPr>
+            <a:picLocks noGrp="1" noChangeAspect="1"/>
+          </p:cNvPicPr>
           <p:nvPr>
             <p:ph idx="1"/>
           </p:nvPr>
-        </p:nvSpPr>
-        <p:spPr/>
-        <p:txBody>
-          <a:bodyPr/>
-          <a:lstStyle/>
-          <a:p>
-            <a:r>
-              <a:rPr lang="en-US" dirty="0"/>
-              <a:t>Answer to question 5</a:t>
-            </a:r>
-          </a:p>
-          <a:p>
-            <a:endParaRPr lang="en-US" dirty="0"/>
-          </a:p>
-        </p:txBody>
-      </p:sp>
+        </p:nvPicPr>
+        <p:blipFill>
+          <a:blip r:embed="rId2"/>
+          <a:stretch>
+            <a:fillRect/>
+          </a:stretch>
+        </p:blipFill>
+        <p:spPr>
+          <a:xfrm>
+            <a:off x="127477" y="1060172"/>
+            <a:ext cx="2959104" cy="5446645"/>
+          </a:xfrm>
+        </p:spPr>
+      </p:pic>
+      <p:pic>
+        <p:nvPicPr>
+          <p:cNvPr id="10" name="Picture 9" descr="A graph with red and green bars&#10;&#10;Description automatically generated">
+            <a:extLst>
+              <a:ext uri="{FF2B5EF4-FFF2-40B4-BE49-F238E27FC236}">
+                <a16:creationId xmlns:a16="http://schemas.microsoft.com/office/drawing/2014/main" id="{6A28C77B-7393-D1D5-B269-84E8284FC6CC}"/>
+              </a:ext>
+            </a:extLst>
+          </p:cNvPr>
+          <p:cNvPicPr>
+            <a:picLocks noChangeAspect="1"/>
+          </p:cNvPicPr>
+          <p:nvPr/>
+        </p:nvPicPr>
+        <p:blipFill>
+          <a:blip r:embed="rId3"/>
+          <a:stretch>
+            <a:fillRect/>
+          </a:stretch>
+        </p:blipFill>
+        <p:spPr>
+          <a:xfrm>
+            <a:off x="3140771" y="1073423"/>
+            <a:ext cx="2959104" cy="5446645"/>
+          </a:xfrm>
+          <a:prstGeom prst="rect">
+            <a:avLst/>
+          </a:prstGeom>
+        </p:spPr>
+      </p:pic>
+      <p:pic>
+        <p:nvPicPr>
+          <p:cNvPr id="12" name="Picture 11" descr="A graph of a bar chart&#10;&#10;Description automatically generated with medium confidence">
+            <a:extLst>
+              <a:ext uri="{FF2B5EF4-FFF2-40B4-BE49-F238E27FC236}">
+                <a16:creationId xmlns:a16="http://schemas.microsoft.com/office/drawing/2014/main" id="{B04658D1-1BC0-CE28-114C-83C2DEEA6BF0}"/>
+              </a:ext>
+            </a:extLst>
+          </p:cNvPr>
+          <p:cNvPicPr>
+            <a:picLocks noChangeAspect="1"/>
+          </p:cNvPicPr>
+          <p:nvPr/>
+        </p:nvPicPr>
+        <p:blipFill>
+          <a:blip r:embed="rId4"/>
+          <a:stretch>
+            <a:fillRect/>
+          </a:stretch>
+        </p:blipFill>
+        <p:spPr>
+          <a:xfrm>
+            <a:off x="6142452" y="1086679"/>
+            <a:ext cx="2959105" cy="5446644"/>
+          </a:xfrm>
+          <a:prstGeom prst="rect">
+            <a:avLst/>
+          </a:prstGeom>
+        </p:spPr>
+      </p:pic>
+      <p:pic>
+        <p:nvPicPr>
+          <p:cNvPr id="14" name="Picture 13" descr="A graph with red and green bars&#10;&#10;Description automatically generated">
+            <a:extLst>
+              <a:ext uri="{FF2B5EF4-FFF2-40B4-BE49-F238E27FC236}">
+                <a16:creationId xmlns:a16="http://schemas.microsoft.com/office/drawing/2014/main" id="{956EB8B8-806B-2BB4-6F8B-1ADB060F33CB}"/>
+              </a:ext>
+            </a:extLst>
+          </p:cNvPr>
+          <p:cNvPicPr>
+            <a:picLocks noChangeAspect="1"/>
+          </p:cNvPicPr>
+          <p:nvPr/>
+        </p:nvPicPr>
+        <p:blipFill>
+          <a:blip r:embed="rId5"/>
+          <a:stretch>
+            <a:fillRect/>
+          </a:stretch>
+        </p:blipFill>
+        <p:spPr>
+          <a:xfrm>
+            <a:off x="9144134" y="1086677"/>
+            <a:ext cx="2959104" cy="5446644"/>
+          </a:xfrm>
+          <a:prstGeom prst="rect">
+            <a:avLst/>
+          </a:prstGeom>
+        </p:spPr>
+      </p:pic>
     </p:spTree>
     <p:extLst>
       <p:ext uri="{BB962C8B-B14F-4D97-AF65-F5344CB8AC3E}">
-        <p14:creationId xmlns:p14="http://schemas.microsoft.com/office/powerpoint/2010/main" val="1970774222"/>
+        <p14:creationId xmlns:p14="http://schemas.microsoft.com/office/powerpoint/2010/main" val="2160683179"/>
       </p:ext>
     </p:extLst>
   </p:cSld>
@@ -8693,10 +8813,10 @@
       </p:grpSpPr>
       <p:sp>
         <p:nvSpPr>
-          <p:cNvPr id="2" name="Title 1">
+          <p:cNvPr id="4" name="Title 1">
             <a:extLst>
               <a:ext uri="{FF2B5EF4-FFF2-40B4-BE49-F238E27FC236}">
-                <a16:creationId xmlns:a16="http://schemas.microsoft.com/office/drawing/2014/main" id="{2A50D09B-00CE-BDD6-8725-C5466B6A8F5A}"/>
+                <a16:creationId xmlns:a16="http://schemas.microsoft.com/office/drawing/2014/main" id="{4520FCB8-392C-77A4-68BA-CDDF1273956D}"/>
               </a:ext>
             </a:extLst>
           </p:cNvPr>
@@ -8709,51 +8829,54 @@
         </p:nvSpPr>
         <p:spPr/>
         <p:txBody>
-          <a:bodyPr/>
+          <a:bodyPr>
+            <a:normAutofit/>
+          </a:bodyPr>
           <a:lstStyle/>
           <a:p>
             <a:r>
-              <a:rPr lang="en-US" sz="2900" dirty="0"/>
-              <a:t>Employment prospects for job seekers</a:t>
-            </a:r>
-          </a:p>
-        </p:txBody>
-      </p:sp>
-      <p:sp>
-        <p:nvSpPr>
-          <p:cNvPr id="3" name="Content Placeholder 2">
+              <a:rPr lang="en-US" dirty="0"/>
+              <a:t>Impact of automation per Ethnicity </a:t>
+            </a:r>
+          </a:p>
+        </p:txBody>
+      </p:sp>
+      <p:pic>
+        <p:nvPicPr>
+          <p:cNvPr id="5" name="Content Placeholder 4">
             <a:extLst>
               <a:ext uri="{FF2B5EF4-FFF2-40B4-BE49-F238E27FC236}">
-                <a16:creationId xmlns:a16="http://schemas.microsoft.com/office/drawing/2014/main" id="{2146A438-C4A9-BCA6-70F9-5C049150BF61}"/>
+                <a16:creationId xmlns:a16="http://schemas.microsoft.com/office/drawing/2014/main" id="{A422FF08-092F-C984-CBE1-5B6FC00DD10B}"/>
               </a:ext>
             </a:extLst>
           </p:cNvPr>
-          <p:cNvSpPr>
-            <a:spLocks noGrp="1"/>
-          </p:cNvSpPr>
+          <p:cNvPicPr>
+            <a:picLocks noGrp="1" noChangeAspect="1"/>
+          </p:cNvPicPr>
           <p:nvPr>
             <p:ph idx="1"/>
           </p:nvPr>
-        </p:nvSpPr>
-        <p:spPr/>
-        <p:txBody>
-          <a:bodyPr/>
-          <a:lstStyle/>
-          <a:p>
-            <a:r>
-              <a:rPr lang="en-US" dirty="0"/>
-              <a:t>Answer to question 6</a:t>
-            </a:r>
-          </a:p>
-          <a:p>
-            <a:endParaRPr lang="en-US" dirty="0"/>
-          </a:p>
-        </p:txBody>
-      </p:sp>
+        </p:nvPicPr>
+        <p:blipFill>
+          <a:blip r:embed="rId2"/>
+          <a:stretch>
+            <a:fillRect/>
+          </a:stretch>
+        </p:blipFill>
+        <p:spPr>
+          <a:xfrm>
+            <a:off x="1920240" y="2376141"/>
+            <a:ext cx="8758280" cy="2553667"/>
+          </a:xfrm>
+          <a:prstGeom prst="rect">
+            <a:avLst/>
+          </a:prstGeom>
+        </p:spPr>
+      </p:pic>
     </p:spTree>
     <p:extLst>
       <p:ext uri="{BB962C8B-B14F-4D97-AF65-F5344CB8AC3E}">
-        <p14:creationId xmlns:p14="http://schemas.microsoft.com/office/powerpoint/2010/main" val="271651074"/>
+        <p14:creationId xmlns:p14="http://schemas.microsoft.com/office/powerpoint/2010/main" val="4056146393"/>
       </p:ext>
     </p:extLst>
   </p:cSld>
@@ -8785,7 +8908,7 @@
           <p:cNvPr id="2" name="Title 1">
             <a:extLst>
               <a:ext uri="{FF2B5EF4-FFF2-40B4-BE49-F238E27FC236}">
-                <a16:creationId xmlns:a16="http://schemas.microsoft.com/office/drawing/2014/main" id="{A112D148-F99E-41E6-C396-5396486C10AE}"/>
+                <a16:creationId xmlns:a16="http://schemas.microsoft.com/office/drawing/2014/main" id="{AC8CA5D3-756E-6076-0084-59894B6DB045}"/>
               </a:ext>
             </a:extLst>
           </p:cNvPr>
@@ -8796,12 +8919,20 @@
             <p:ph type="title"/>
           </p:nvPr>
         </p:nvSpPr>
-        <p:spPr/>
+        <p:spPr>
+          <a:xfrm>
+            <a:off x="1920239" y="398677"/>
+            <a:ext cx="8770571" cy="1345269"/>
+          </a:xfrm>
+        </p:spPr>
         <p:txBody>
           <a:bodyPr/>
           <a:lstStyle/>
           <a:p>
-            <a:endParaRPr lang="en-US"/>
+            <a:r>
+              <a:rPr lang="en-US" sz="2900" dirty="0"/>
+              <a:t>Fastest growing/declining occupations</a:t>
+            </a:r>
           </a:p>
         </p:txBody>
       </p:sp>
@@ -8810,7 +8941,7 @@
           <p:cNvPr id="3" name="Content Placeholder 2">
             <a:extLst>
               <a:ext uri="{FF2B5EF4-FFF2-40B4-BE49-F238E27FC236}">
-                <a16:creationId xmlns:a16="http://schemas.microsoft.com/office/drawing/2014/main" id="{AF0F93CC-6618-186F-421E-B4A65D3D9391}"/>
+                <a16:creationId xmlns:a16="http://schemas.microsoft.com/office/drawing/2014/main" id="{42B96626-6607-F1E8-FA72-C2F7D378D65A}"/>
               </a:ext>
             </a:extLst>
           </p:cNvPr>
@@ -8828,7 +8959,7 @@
           <a:p>
             <a:r>
               <a:rPr lang="en-US" dirty="0"/>
-              <a:t>Answer to question 7</a:t>
+              <a:t>Answer to question 5</a:t>
             </a:r>
           </a:p>
           <a:p>
@@ -8839,7 +8970,7 @@
     </p:spTree>
     <p:extLst>
       <p:ext uri="{BB962C8B-B14F-4D97-AF65-F5344CB8AC3E}">
-        <p14:creationId xmlns:p14="http://schemas.microsoft.com/office/powerpoint/2010/main" val="372559737"/>
+        <p14:creationId xmlns:p14="http://schemas.microsoft.com/office/powerpoint/2010/main" val="1970774222"/>
       </p:ext>
     </p:extLst>
   </p:cSld>
@@ -8871,7 +9002,7 @@
           <p:cNvPr id="2" name="Title 1">
             <a:extLst>
               <a:ext uri="{FF2B5EF4-FFF2-40B4-BE49-F238E27FC236}">
-                <a16:creationId xmlns:a16="http://schemas.microsoft.com/office/drawing/2014/main" id="{5695B0C7-7527-9653-87F6-6A1FFE784120}"/>
+                <a16:creationId xmlns:a16="http://schemas.microsoft.com/office/drawing/2014/main" id="{2A50D09B-00CE-BDD6-8725-C5466B6A8F5A}"/>
               </a:ext>
             </a:extLst>
           </p:cNvPr>
@@ -8887,7 +9018,10 @@
           <a:bodyPr/>
           <a:lstStyle/>
           <a:p>
-            <a:endParaRPr lang="en-US"/>
+            <a:r>
+              <a:rPr lang="en-US" sz="2900" dirty="0"/>
+              <a:t>Employment prospects for job seekers</a:t>
+            </a:r>
           </a:p>
         </p:txBody>
       </p:sp>
@@ -8896,7 +9030,7 @@
           <p:cNvPr id="3" name="Content Placeholder 2">
             <a:extLst>
               <a:ext uri="{FF2B5EF4-FFF2-40B4-BE49-F238E27FC236}">
-                <a16:creationId xmlns:a16="http://schemas.microsoft.com/office/drawing/2014/main" id="{D0E300B5-572B-F978-5BDA-B869E8B49473}"/>
+                <a16:creationId xmlns:a16="http://schemas.microsoft.com/office/drawing/2014/main" id="{2146A438-C4A9-BCA6-70F9-5C049150BF61}"/>
               </a:ext>
             </a:extLst>
           </p:cNvPr>
@@ -8914,7 +9048,7 @@
           <a:p>
             <a:r>
               <a:rPr lang="en-US" dirty="0"/>
-              <a:t>Answer to question 8</a:t>
+              <a:t>Answer to question 6</a:t>
             </a:r>
           </a:p>
           <a:p>
@@ -8925,7 +9059,7 @@
     </p:spTree>
     <p:extLst>
       <p:ext uri="{BB962C8B-B14F-4D97-AF65-F5344CB8AC3E}">
-        <p14:creationId xmlns:p14="http://schemas.microsoft.com/office/powerpoint/2010/main" val="1025258359"/>
+        <p14:creationId xmlns:p14="http://schemas.microsoft.com/office/powerpoint/2010/main" val="271651074"/>
       </p:ext>
     </p:extLst>
   </p:cSld>
@@ -9159,7 +9293,7 @@
           <p:cNvPr id="2" name="Title 1">
             <a:extLst>
               <a:ext uri="{FF2B5EF4-FFF2-40B4-BE49-F238E27FC236}">
-                <a16:creationId xmlns:a16="http://schemas.microsoft.com/office/drawing/2014/main" id="{8A9DC44B-90B9-7734-E89E-BC733E03CFFF}"/>
+                <a16:creationId xmlns:a16="http://schemas.microsoft.com/office/drawing/2014/main" id="{A112D148-F99E-41E6-C396-5396486C10AE}"/>
               </a:ext>
             </a:extLst>
           </p:cNvPr>
@@ -9175,14 +9309,7 @@
           <a:bodyPr/>
           <a:lstStyle/>
           <a:p>
-            <a:r>
-              <a:rPr lang="en-US" b="1" i="0" dirty="0">
-                <a:effectLst/>
-                <a:latin typeface="Söhne"/>
-              </a:rPr>
-              <a:t>Conclusion</a:t>
-            </a:r>
-            <a:endParaRPr lang="en-US" dirty="0"/>
+            <a:endParaRPr lang="en-US"/>
           </a:p>
         </p:txBody>
       </p:sp>
@@ -9191,7 +9318,7 @@
           <p:cNvPr id="3" name="Content Placeholder 2">
             <a:extLst>
               <a:ext uri="{FF2B5EF4-FFF2-40B4-BE49-F238E27FC236}">
-                <a16:creationId xmlns:a16="http://schemas.microsoft.com/office/drawing/2014/main" id="{F7F6C1DB-77C4-DEA6-4D3A-FA7AF2180AA9}"/>
+                <a16:creationId xmlns:a16="http://schemas.microsoft.com/office/drawing/2014/main" id="{AF0F93CC-6618-186F-421E-B4A65D3D9391}"/>
               </a:ext>
             </a:extLst>
           </p:cNvPr>
@@ -9209,15 +9336,18 @@
           <a:p>
             <a:r>
               <a:rPr lang="en-US" dirty="0"/>
-              <a:t>Here we will conclude our analysis and share analysis results</a:t>
-            </a:r>
+              <a:t>Answer to question 7</a:t>
+            </a:r>
+          </a:p>
+          <a:p>
+            <a:endParaRPr lang="en-US" dirty="0"/>
           </a:p>
         </p:txBody>
       </p:sp>
     </p:spTree>
     <p:extLst>
       <p:ext uri="{BB962C8B-B14F-4D97-AF65-F5344CB8AC3E}">
-        <p14:creationId xmlns:p14="http://schemas.microsoft.com/office/powerpoint/2010/main" val="1819884951"/>
+        <p14:creationId xmlns:p14="http://schemas.microsoft.com/office/powerpoint/2010/main" val="372559737"/>
       </p:ext>
     </p:extLst>
   </p:cSld>
@@ -9249,7 +9379,7 @@
           <p:cNvPr id="2" name="Title 1">
             <a:extLst>
               <a:ext uri="{FF2B5EF4-FFF2-40B4-BE49-F238E27FC236}">
-                <a16:creationId xmlns:a16="http://schemas.microsoft.com/office/drawing/2014/main" id="{4BB252BF-484D-68FB-0633-20899EDECE83}"/>
+                <a16:creationId xmlns:a16="http://schemas.microsoft.com/office/drawing/2014/main" id="{5695B0C7-7527-9653-87F6-6A1FFE784120}"/>
               </a:ext>
             </a:extLst>
           </p:cNvPr>
@@ -9265,14 +9395,7 @@
           <a:bodyPr/>
           <a:lstStyle/>
           <a:p>
-            <a:r>
-              <a:rPr lang="en-US" b="1" i="0" dirty="0">
-                <a:effectLst/>
-                <a:latin typeface="Söhne"/>
-              </a:rPr>
-              <a:t>Q&amp;A</a:t>
-            </a:r>
-            <a:endParaRPr lang="en-US" dirty="0"/>
+            <a:endParaRPr lang="en-US"/>
           </a:p>
         </p:txBody>
       </p:sp>
@@ -9281,7 +9404,7 @@
           <p:cNvPr id="3" name="Content Placeholder 2">
             <a:extLst>
               <a:ext uri="{FF2B5EF4-FFF2-40B4-BE49-F238E27FC236}">
-                <a16:creationId xmlns:a16="http://schemas.microsoft.com/office/drawing/2014/main" id="{1B3D3996-60A1-2871-C46B-726A1A81EF5C}"/>
+                <a16:creationId xmlns:a16="http://schemas.microsoft.com/office/drawing/2014/main" id="{D0E300B5-572B-F978-5BDA-B869E8B49473}"/>
               </a:ext>
             </a:extLst>
           </p:cNvPr>
@@ -9299,15 +9422,18 @@
           <a:p>
             <a:r>
               <a:rPr lang="en-US" dirty="0"/>
-              <a:t>We will take questions from audience </a:t>
-            </a:r>
+              <a:t>Answer to question 8</a:t>
+            </a:r>
+          </a:p>
+          <a:p>
+            <a:endParaRPr lang="en-US" dirty="0"/>
           </a:p>
         </p:txBody>
       </p:sp>
     </p:spTree>
     <p:extLst>
       <p:ext uri="{BB962C8B-B14F-4D97-AF65-F5344CB8AC3E}">
-        <p14:creationId xmlns:p14="http://schemas.microsoft.com/office/powerpoint/2010/main" val="1541405568"/>
+        <p14:creationId xmlns:p14="http://schemas.microsoft.com/office/powerpoint/2010/main" val="1025258359"/>
       </p:ext>
     </p:extLst>
   </p:cSld>
@@ -9339,6 +9465,186 @@
           <p:cNvPr id="2" name="Title 1">
             <a:extLst>
               <a:ext uri="{FF2B5EF4-FFF2-40B4-BE49-F238E27FC236}">
+                <a16:creationId xmlns:a16="http://schemas.microsoft.com/office/drawing/2014/main" id="{8A9DC44B-90B9-7734-E89E-BC733E03CFFF}"/>
+              </a:ext>
+            </a:extLst>
+          </p:cNvPr>
+          <p:cNvSpPr>
+            <a:spLocks noGrp="1"/>
+          </p:cNvSpPr>
+          <p:nvPr>
+            <p:ph type="title"/>
+          </p:nvPr>
+        </p:nvSpPr>
+        <p:spPr/>
+        <p:txBody>
+          <a:bodyPr/>
+          <a:lstStyle/>
+          <a:p>
+            <a:r>
+              <a:rPr lang="en-US" b="1" i="0" dirty="0">
+                <a:effectLst/>
+                <a:latin typeface="Söhne"/>
+              </a:rPr>
+              <a:t>Conclusion</a:t>
+            </a:r>
+            <a:endParaRPr lang="en-US" dirty="0"/>
+          </a:p>
+        </p:txBody>
+      </p:sp>
+      <p:sp>
+        <p:nvSpPr>
+          <p:cNvPr id="3" name="Content Placeholder 2">
+            <a:extLst>
+              <a:ext uri="{FF2B5EF4-FFF2-40B4-BE49-F238E27FC236}">
+                <a16:creationId xmlns:a16="http://schemas.microsoft.com/office/drawing/2014/main" id="{F7F6C1DB-77C4-DEA6-4D3A-FA7AF2180AA9}"/>
+              </a:ext>
+            </a:extLst>
+          </p:cNvPr>
+          <p:cNvSpPr>
+            <a:spLocks noGrp="1"/>
+          </p:cNvSpPr>
+          <p:nvPr>
+            <p:ph idx="1"/>
+          </p:nvPr>
+        </p:nvSpPr>
+        <p:spPr/>
+        <p:txBody>
+          <a:bodyPr/>
+          <a:lstStyle/>
+          <a:p>
+            <a:r>
+              <a:rPr lang="en-US" dirty="0"/>
+              <a:t>Here we will conclude our analysis and share analysis results</a:t>
+            </a:r>
+          </a:p>
+        </p:txBody>
+      </p:sp>
+    </p:spTree>
+    <p:extLst>
+      <p:ext uri="{BB962C8B-B14F-4D97-AF65-F5344CB8AC3E}">
+        <p14:creationId xmlns:p14="http://schemas.microsoft.com/office/powerpoint/2010/main" val="1819884951"/>
+      </p:ext>
+    </p:extLst>
+  </p:cSld>
+  <p:clrMapOvr>
+    <a:masterClrMapping/>
+  </p:clrMapOvr>
+</p:sld>
+</file>
+
+<file path=ppt/slides/slide23.xml><?xml version="1.0" encoding="utf-8"?>
+<p:sld xmlns:a="http://schemas.openxmlformats.org/drawingml/2006/main" xmlns:r="http://schemas.openxmlformats.org/officeDocument/2006/relationships" xmlns:p="http://schemas.openxmlformats.org/presentationml/2006/main">
+  <p:cSld>
+    <p:spTree>
+      <p:nvGrpSpPr>
+        <p:cNvPr id="1" name=""/>
+        <p:cNvGrpSpPr/>
+        <p:nvPr/>
+      </p:nvGrpSpPr>
+      <p:grpSpPr>
+        <a:xfrm>
+          <a:off x="0" y="0"/>
+          <a:ext cx="0" cy="0"/>
+          <a:chOff x="0" y="0"/>
+          <a:chExt cx="0" cy="0"/>
+        </a:xfrm>
+      </p:grpSpPr>
+      <p:sp>
+        <p:nvSpPr>
+          <p:cNvPr id="2" name="Title 1">
+            <a:extLst>
+              <a:ext uri="{FF2B5EF4-FFF2-40B4-BE49-F238E27FC236}">
+                <a16:creationId xmlns:a16="http://schemas.microsoft.com/office/drawing/2014/main" id="{4BB252BF-484D-68FB-0633-20899EDECE83}"/>
+              </a:ext>
+            </a:extLst>
+          </p:cNvPr>
+          <p:cNvSpPr>
+            <a:spLocks noGrp="1"/>
+          </p:cNvSpPr>
+          <p:nvPr>
+            <p:ph type="title"/>
+          </p:nvPr>
+        </p:nvSpPr>
+        <p:spPr/>
+        <p:txBody>
+          <a:bodyPr/>
+          <a:lstStyle/>
+          <a:p>
+            <a:r>
+              <a:rPr lang="en-US" b="1" i="0" dirty="0">
+                <a:effectLst/>
+                <a:latin typeface="Söhne"/>
+              </a:rPr>
+              <a:t>Q&amp;A</a:t>
+            </a:r>
+            <a:endParaRPr lang="en-US" dirty="0"/>
+          </a:p>
+        </p:txBody>
+      </p:sp>
+      <p:sp>
+        <p:nvSpPr>
+          <p:cNvPr id="3" name="Content Placeholder 2">
+            <a:extLst>
+              <a:ext uri="{FF2B5EF4-FFF2-40B4-BE49-F238E27FC236}">
+                <a16:creationId xmlns:a16="http://schemas.microsoft.com/office/drawing/2014/main" id="{1B3D3996-60A1-2871-C46B-726A1A81EF5C}"/>
+              </a:ext>
+            </a:extLst>
+          </p:cNvPr>
+          <p:cNvSpPr>
+            <a:spLocks noGrp="1"/>
+          </p:cNvSpPr>
+          <p:nvPr>
+            <p:ph idx="1"/>
+          </p:nvPr>
+        </p:nvSpPr>
+        <p:spPr/>
+        <p:txBody>
+          <a:bodyPr/>
+          <a:lstStyle/>
+          <a:p>
+            <a:r>
+              <a:rPr lang="en-US" dirty="0"/>
+              <a:t>We will take questions from audience </a:t>
+            </a:r>
+          </a:p>
+        </p:txBody>
+      </p:sp>
+    </p:spTree>
+    <p:extLst>
+      <p:ext uri="{BB962C8B-B14F-4D97-AF65-F5344CB8AC3E}">
+        <p14:creationId xmlns:p14="http://schemas.microsoft.com/office/powerpoint/2010/main" val="1541405568"/>
+      </p:ext>
+    </p:extLst>
+  </p:cSld>
+  <p:clrMapOvr>
+    <a:masterClrMapping/>
+  </p:clrMapOvr>
+</p:sld>
+</file>
+
+<file path=ppt/slides/slide24.xml><?xml version="1.0" encoding="utf-8"?>
+<p:sld xmlns:a="http://schemas.openxmlformats.org/drawingml/2006/main" xmlns:r="http://schemas.openxmlformats.org/officeDocument/2006/relationships" xmlns:p="http://schemas.openxmlformats.org/presentationml/2006/main">
+  <p:cSld>
+    <p:spTree>
+      <p:nvGrpSpPr>
+        <p:cNvPr id="1" name=""/>
+        <p:cNvGrpSpPr/>
+        <p:nvPr/>
+      </p:nvGrpSpPr>
+      <p:grpSpPr>
+        <a:xfrm>
+          <a:off x="0" y="0"/>
+          <a:ext cx="0" cy="0"/>
+          <a:chOff x="0" y="0"/>
+          <a:chExt cx="0" cy="0"/>
+        </a:xfrm>
+      </p:grpSpPr>
+      <p:sp>
+        <p:nvSpPr>
+          <p:cNvPr id="2" name="Title 1">
+            <a:extLst>
+              <a:ext uri="{FF2B5EF4-FFF2-40B4-BE49-F238E27FC236}">
                 <a16:creationId xmlns:a16="http://schemas.microsoft.com/office/drawing/2014/main" id="{A375243E-9A29-04F0-6451-7B75E395FD6D}"/>
               </a:ext>
             </a:extLst>
@@ -9407,7 +9713,7 @@
 </p:sld>
 </file>
 
-<file path=ppt/slides/slide23.xml><?xml version="1.0" encoding="utf-8"?>
+<file path=ppt/slides/slide25.xml><?xml version="1.0" encoding="utf-8"?>
 <p:sld xmlns:a="http://schemas.openxmlformats.org/drawingml/2006/main" xmlns:r="http://schemas.openxmlformats.org/officeDocument/2006/relationships" xmlns:p="http://schemas.openxmlformats.org/presentationml/2006/main">
   <p:cSld>
     <p:spTree>
@@ -9710,7 +10016,7 @@
         <p:spPr/>
         <p:txBody>
           <a:bodyPr>
-            <a:normAutofit/>
+            <a:normAutofit lnSpcReduction="10000"/>
           </a:bodyPr>
           <a:lstStyle/>
           <a:p>
@@ -9721,6 +10027,16 @@
             <a:r>
               <a:rPr lang="en-US" dirty="0"/>
               <a:t>What are the jobs that are affected the most due to automation</a:t>
+            </a:r>
+          </a:p>
+          <a:p>
+            <a:pPr marL="285750" indent="-285750">
+              <a:buFont typeface="Arial" panose="020B0604020202020204" pitchFamily="34" charset="0"/>
+              <a:buChar char="•"/>
+            </a:pPr>
+            <a:r>
+              <a:rPr lang="en-US" dirty="0"/>
+              <a:t>What will be the impact of automation on each ethnicity. </a:t>
             </a:r>
           </a:p>
           <a:p>

</xml_diff>

<commit_message>
Updated the slides for fastest growing occupations
</commit_message>
<xml_diff>
--- a/Project1.pptx
+++ b/Project1.pptx
@@ -5,15 +5,15 @@
     <p:sldMasterId id="2147483699" r:id="rId1"/>
   </p:sldMasterIdLst>
   <p:notesMasterIdLst>
-    <p:notesMasterId r:id="rId27"/>
+    <p:notesMasterId r:id="rId25"/>
   </p:notesMasterIdLst>
   <p:sldIdLst>
     <p:sldId id="256" r:id="rId2"/>
     <p:sldId id="273" r:id="rId3"/>
-    <p:sldId id="257" r:id="rId4"/>
-    <p:sldId id="258" r:id="rId5"/>
-    <p:sldId id="259" r:id="rId6"/>
-    <p:sldId id="260" r:id="rId7"/>
+    <p:sldId id="283" r:id="rId4"/>
+    <p:sldId id="257" r:id="rId5"/>
+    <p:sldId id="258" r:id="rId6"/>
+    <p:sldId id="259" r:id="rId7"/>
     <p:sldId id="274" r:id="rId8"/>
     <p:sldId id="261" r:id="rId9"/>
     <p:sldId id="276" r:id="rId10"/>
@@ -21,18 +21,16 @@
     <p:sldId id="279" r:id="rId12"/>
     <p:sldId id="280" r:id="rId13"/>
     <p:sldId id="262" r:id="rId14"/>
-    <p:sldId id="263" r:id="rId15"/>
-    <p:sldId id="264" r:id="rId16"/>
-    <p:sldId id="281" r:id="rId17"/>
-    <p:sldId id="282" r:id="rId18"/>
-    <p:sldId id="265" r:id="rId19"/>
-    <p:sldId id="266" r:id="rId20"/>
-    <p:sldId id="267" r:id="rId21"/>
-    <p:sldId id="268" r:id="rId22"/>
-    <p:sldId id="269" r:id="rId23"/>
-    <p:sldId id="270" r:id="rId24"/>
-    <p:sldId id="271" r:id="rId25"/>
-    <p:sldId id="272" r:id="rId26"/>
+    <p:sldId id="264" r:id="rId15"/>
+    <p:sldId id="281" r:id="rId16"/>
+    <p:sldId id="282" r:id="rId17"/>
+    <p:sldId id="266" r:id="rId18"/>
+    <p:sldId id="267" r:id="rId19"/>
+    <p:sldId id="268" r:id="rId20"/>
+    <p:sldId id="269" r:id="rId21"/>
+    <p:sldId id="270" r:id="rId22"/>
+    <p:sldId id="271" r:id="rId23"/>
+    <p:sldId id="272" r:id="rId24"/>
   </p:sldIdLst>
   <p:sldSz cx="12192000" cy="6858000"/>
   <p:notesSz cx="6858000" cy="9144000"/>
@@ -221,7 +219,7 @@
           <a:p>
             <a:fld id="{BBCA6A9B-02FA-464D-8DA1-F597653855BC}" type="datetimeFigureOut">
               <a:rPr lang="en-US" smtClean="0"/>
-              <a:t>10/22/23</a:t>
+              <a:t>10/23/2023</a:t>
             </a:fld>
             <a:endParaRPr lang="en-US"/>
           </a:p>
@@ -573,7 +571,7 @@
 </file>
 
 <file path=ppt/slideLayouts/slideLayout1.xml><?xml version="1.0" encoding="utf-8"?>
-<p:sldLayout xmlns:a="http://schemas.openxmlformats.org/drawingml/2006/main" xmlns:r="http://schemas.openxmlformats.org/officeDocument/2006/relationships" xmlns:p="http://schemas.openxmlformats.org/presentationml/2006/main" showMasterSp="0" type="title" preserve="1">
+<p:sldLayout xmlns:a="http://schemas.openxmlformats.org/drawingml/2006/main" xmlns:r="http://schemas.openxmlformats.org/officeDocument/2006/relationships" xmlns:p="http://schemas.openxmlformats.org/presentationml/2006/main" type="title" preserve="1">
   <p:cSld name="Title Slide">
     <p:spTree>
       <p:nvGrpSpPr>
@@ -879,7 +877,7 @@
           <a:p>
             <a:fld id="{12241623-A064-4BED-B073-BA4D61433402}" type="datetime1">
               <a:rPr lang="en-US" smtClean="0"/>
-              <a:t>10/22/23</a:t>
+              <a:t>10/23/2023</a:t>
             </a:fld>
             <a:endParaRPr lang="en-US" dirty="0"/>
           </a:p>
@@ -1690,7 +1688,7 @@
           <a:p>
             <a:fld id="{6F86ED0C-1DA7-41F0-94CF-6218B1FEDFF1}" type="datetime1">
               <a:rPr lang="en-US" smtClean="0"/>
-              <a:t>10/22/23</a:t>
+              <a:t>10/23/2023</a:t>
             </a:fld>
             <a:endParaRPr lang="en-US" dirty="0"/>
           </a:p>
@@ -1766,7 +1764,7 @@
 </file>
 
 <file path=ppt/slideLayouts/slideLayout11.xml><?xml version="1.0" encoding="utf-8"?>
-<p:sldLayout xmlns:a="http://schemas.openxmlformats.org/drawingml/2006/main" xmlns:r="http://schemas.openxmlformats.org/officeDocument/2006/relationships" xmlns:p="http://schemas.openxmlformats.org/presentationml/2006/main" showMasterSp="0" type="vertTitleAndTx" preserve="1">
+<p:sldLayout xmlns:a="http://schemas.openxmlformats.org/drawingml/2006/main" xmlns:r="http://schemas.openxmlformats.org/officeDocument/2006/relationships" xmlns:p="http://schemas.openxmlformats.org/presentationml/2006/main" type="vertTitleAndTx" preserve="1">
   <p:cSld name="Vertical Title and Text">
     <p:spTree>
       <p:nvGrpSpPr>
@@ -1889,7 +1887,7 @@
           <a:p>
             <a:fld id="{EECF02AB-6034-4B88-BC5A-7C17CB0EF809}" type="datetime1">
               <a:rPr lang="en-US" smtClean="0"/>
-              <a:t>10/22/23</a:t>
+              <a:t>10/23/2023</a:t>
             </a:fld>
             <a:endParaRPr lang="en-US" dirty="0"/>
           </a:p>
@@ -2124,7 +2122,7 @@
           <a:p>
             <a:fld id="{22F3E5F3-28EE-488F-BD53-B744C06C3DEC}" type="datetime1">
               <a:rPr lang="en-US" smtClean="0"/>
-              <a:t>10/22/23</a:t>
+              <a:t>10/23/2023</a:t>
             </a:fld>
             <a:endParaRPr lang="en-US" dirty="0"/>
           </a:p>
@@ -2200,7 +2198,7 @@
 </file>
 
 <file path=ppt/slideLayouts/slideLayout3.xml><?xml version="1.0" encoding="utf-8"?>
-<p:sldLayout xmlns:a="http://schemas.openxmlformats.org/drawingml/2006/main" xmlns:r="http://schemas.openxmlformats.org/officeDocument/2006/relationships" xmlns:p="http://schemas.openxmlformats.org/presentationml/2006/main" showMasterSp="0" type="secHead" preserve="1">
+<p:sldLayout xmlns:a="http://schemas.openxmlformats.org/drawingml/2006/main" xmlns:r="http://schemas.openxmlformats.org/officeDocument/2006/relationships" xmlns:p="http://schemas.openxmlformats.org/presentationml/2006/main" type="secHead" preserve="1">
   <p:cSld name="Section Header">
     <p:spTree>
       <p:nvGrpSpPr>
@@ -4817,7 +4815,7 @@
           <a:p>
             <a:fld id="{E72EB70D-CD01-44DA-83B3-8FEB3383D307}" type="datetime1">
               <a:rPr lang="en-US" smtClean="0"/>
-              <a:t>10/22/23</a:t>
+              <a:t>10/23/2023</a:t>
             </a:fld>
             <a:endParaRPr lang="en-US" dirty="0"/>
           </a:p>
@@ -5013,7 +5011,7 @@
           <a:p>
             <a:fld id="{D0158CFD-9357-46BE-A189-D637A67C8730}" type="datetime1">
               <a:rPr lang="en-US" smtClean="0"/>
-              <a:t>10/22/23</a:t>
+              <a:t>10/23/2023</a:t>
             </a:fld>
             <a:endParaRPr lang="en-US" dirty="0"/>
           </a:p>
@@ -5402,7 +5400,7 @@
           <a:p>
             <a:fld id="{7B4742EE-B331-4632-BD10-A82FED6B6FC0}" type="datetime1">
               <a:rPr lang="en-US" smtClean="0"/>
-              <a:t>10/22/23</a:t>
+              <a:t>10/23/2023</a:t>
             </a:fld>
             <a:endParaRPr lang="en-US" dirty="0"/>
           </a:p>
@@ -5568,7 +5566,7 @@
           <a:p>
             <a:fld id="{451BA835-D13F-49F4-8F11-5D576AC65FAD}" type="datetime1">
               <a:rPr lang="en-US" smtClean="0"/>
-              <a:t>10/22/23</a:t>
+              <a:t>10/23/2023</a:t>
             </a:fld>
             <a:endParaRPr lang="en-US" dirty="0"/>
           </a:p>
@@ -5644,16 +5642,8 @@
 </file>
 
 <file path=ppt/slideLayouts/slideLayout7.xml><?xml version="1.0" encoding="utf-8"?>
-<p:sldLayout xmlns:a="http://schemas.openxmlformats.org/drawingml/2006/main" xmlns:r="http://schemas.openxmlformats.org/officeDocument/2006/relationships" xmlns:p="http://schemas.openxmlformats.org/presentationml/2006/main" showMasterSp="0" type="blank" preserve="1">
+<p:sldLayout xmlns:a="http://schemas.openxmlformats.org/drawingml/2006/main" xmlns:r="http://schemas.openxmlformats.org/officeDocument/2006/relationships" xmlns:p="http://schemas.openxmlformats.org/presentationml/2006/main" type="blank" preserve="1">
   <p:cSld name="Blank">
-    <p:bg>
-      <p:bgPr>
-        <a:solidFill>
-          <a:schemeClr val="bg2"/>
-        </a:solidFill>
-        <a:effectLst/>
-      </p:bgPr>
-    </p:bg>
     <p:spTree>
       <p:nvGrpSpPr>
         <p:cNvPr id="1" name=""/>
@@ -5691,7 +5681,7 @@
           <a:p>
             <a:fld id="{ADBD1799-ACB5-4CB2-86A2-5C574F1C8706}" type="datetime1">
               <a:rPr lang="en-US" smtClean="0"/>
-              <a:t>10/22/23</a:t>
+              <a:t>10/23/2023</a:t>
             </a:fld>
             <a:endParaRPr lang="en-US" dirty="0"/>
           </a:p>
@@ -5767,7 +5757,7 @@
 </file>
 
 <file path=ppt/slideLayouts/slideLayout8.xml><?xml version="1.0" encoding="utf-8"?>
-<p:sldLayout xmlns:a="http://schemas.openxmlformats.org/drawingml/2006/main" xmlns:r="http://schemas.openxmlformats.org/officeDocument/2006/relationships" xmlns:p="http://schemas.openxmlformats.org/presentationml/2006/main" showMasterSp="0" type="objTx" preserve="1">
+<p:sldLayout xmlns:a="http://schemas.openxmlformats.org/drawingml/2006/main" xmlns:r="http://schemas.openxmlformats.org/officeDocument/2006/relationships" xmlns:p="http://schemas.openxmlformats.org/presentationml/2006/main" type="objTx" preserve="1">
   <p:cSld name="Content with Caption">
     <p:spTree>
       <p:nvGrpSpPr>
@@ -6001,7 +5991,7 @@
           <a:p>
             <a:fld id="{ED5DD0D6-7A82-473E-879B-C6ECD6CCCFEC}" type="datetime1">
               <a:rPr lang="en-US" smtClean="0"/>
-              <a:t>10/22/23</a:t>
+              <a:t>10/23/2023</a:t>
             </a:fld>
             <a:endParaRPr lang="en-US" dirty="0"/>
           </a:p>
@@ -6082,7 +6072,7 @@
 </file>
 
 <file path=ppt/slideLayouts/slideLayout9.xml><?xml version="1.0" encoding="utf-8"?>
-<p:sldLayout xmlns:a="http://schemas.openxmlformats.org/drawingml/2006/main" xmlns:r="http://schemas.openxmlformats.org/officeDocument/2006/relationships" xmlns:p="http://schemas.openxmlformats.org/presentationml/2006/main" showMasterSp="0" type="picTx" preserve="1">
+<p:sldLayout xmlns:a="http://schemas.openxmlformats.org/drawingml/2006/main" xmlns:r="http://schemas.openxmlformats.org/officeDocument/2006/relationships" xmlns:p="http://schemas.openxmlformats.org/presentationml/2006/main" type="picTx" preserve="1">
   <p:cSld name="Picture with Caption">
     <p:spTree>
       <p:nvGrpSpPr>
@@ -6301,7 +6291,7 @@
           <a:p>
             <a:fld id="{D4605E03-BC17-41A7-854C-DFAB672737DC}" type="datetime1">
               <a:rPr lang="en-US" smtClean="0"/>
-              <a:t>10/22/23</a:t>
+              <a:t>10/23/2023</a:t>
             </a:fld>
             <a:endParaRPr lang="en-US" dirty="0"/>
           </a:p>
@@ -6402,7 +6392,7 @@
     <p:bg>
       <p:bgPr>
         <a:solidFill>
-          <a:schemeClr val="bg2"/>
+          <a:schemeClr val="bg1"/>
         </a:solidFill>
         <a:effectLst/>
       </p:bgPr>
@@ -6553,7 +6543,7 @@
           <a:p>
             <a:fld id="{C4408324-A84C-4A45-93B6-78D079CCE772}" type="datetime1">
               <a:rPr lang="en-US" smtClean="0"/>
-              <a:t>10/22/23</a:t>
+              <a:t>10/23/2023</a:t>
             </a:fld>
             <a:endParaRPr lang="en-US" dirty="0"/>
           </a:p>
@@ -7021,14 +7011,6 @@
 <file path=ppt/slides/slide1.xml><?xml version="1.0" encoding="utf-8"?>
 <p:sld xmlns:a="http://schemas.openxmlformats.org/drawingml/2006/main" xmlns:r="http://schemas.openxmlformats.org/officeDocument/2006/relationships" xmlns:p="http://schemas.openxmlformats.org/presentationml/2006/main">
   <p:cSld>
-    <p:bg>
-      <p:bgPr>
-        <a:solidFill>
-          <a:schemeClr val="bg2"/>
-        </a:solidFill>
-        <a:effectLst/>
-      </p:bgPr>
-    </p:bg>
     <p:spTree>
       <p:nvGrpSpPr>
         <p:cNvPr id="1" name=""/>
@@ -7160,6 +7142,7 @@
           </a:bodyPr>
           <a:lstStyle/>
           <a:p>
+            <a:pPr algn="ctr"/>
             <a:r>
               <a:rPr lang="en-US" sz="4700" i="0" dirty="0">
                 <a:solidFill>
@@ -7168,7 +7151,7 @@
                 <a:effectLst/>
                 <a:latin typeface="Söhne"/>
               </a:rPr>
-              <a:t>Impact of Automation on Occupations, by 2032</a:t>
+              <a:t>Impact of Automation on Occupations</a:t>
             </a:r>
             <a:endParaRPr lang="en-US" sz="4700" dirty="0"/>
           </a:p>
@@ -8114,13 +8097,13 @@
         <p:spPr/>
         <p:txBody>
           <a:bodyPr>
-            <a:normAutofit fontScale="90000"/>
+            <a:normAutofit/>
           </a:bodyPr>
           <a:lstStyle/>
           <a:p>
             <a:pPr algn="ctr"/>
             <a:r>
-              <a:rPr lang="en-US" sz="4000" dirty="0"/>
+              <a:rPr lang="en-US" dirty="0"/>
               <a:t>Top 10 Fastest growing Occupations</a:t>
             </a:r>
           </a:p>
@@ -8148,7 +8131,7 @@
         </p:blipFill>
         <p:spPr>
           <a:xfrm>
-            <a:off x="828135" y="2601823"/>
+            <a:off x="142335" y="2601823"/>
             <a:ext cx="6375728" cy="3225966"/>
           </a:xfrm>
           <a:prstGeom prst="rect">
@@ -8178,7 +8161,7 @@
         </p:blipFill>
         <p:spPr>
           <a:xfrm>
-            <a:off x="7284666" y="2522863"/>
+            <a:off x="6598866" y="2522863"/>
             <a:ext cx="3937202" cy="3270418"/>
           </a:xfrm>
           <a:prstGeom prst="rect">
@@ -8186,6 +8169,559 @@
           </a:prstGeom>
         </p:spPr>
       </p:pic>
+      <p:graphicFrame>
+        <p:nvGraphicFramePr>
+          <p:cNvPr id="10" name="Table 9">
+            <a:extLst>
+              <a:ext uri="{FF2B5EF4-FFF2-40B4-BE49-F238E27FC236}">
+                <a16:creationId xmlns:a16="http://schemas.microsoft.com/office/drawing/2014/main" id="{81B2E196-4AD1-8DC0-F608-2A055E3F3006}"/>
+              </a:ext>
+            </a:extLst>
+          </p:cNvPr>
+          <p:cNvGraphicFramePr>
+            <a:graphicFrameLocks noGrp="1"/>
+          </p:cNvGraphicFramePr>
+          <p:nvPr>
+            <p:extLst>
+              <p:ext uri="{D42A27DB-BD31-4B8C-83A1-F6EECF244321}">
+                <p14:modId xmlns:p14="http://schemas.microsoft.com/office/powerpoint/2010/main" val="11599240"/>
+              </p:ext>
+            </p:extLst>
+          </p:nvPr>
+        </p:nvGraphicFramePr>
+        <p:xfrm>
+          <a:off x="10645965" y="2110105"/>
+          <a:ext cx="1139825" cy="3325495"/>
+        </p:xfrm>
+        <a:graphic>
+          <a:graphicData uri="http://schemas.openxmlformats.org/drawingml/2006/table">
+            <a:tbl>
+              <a:tblPr firstRow="1" firstCol="1" bandRow="1">
+                <a:tableStyleId>{5C22544A-7EE6-4342-B048-85BDC9FD1C3A}</a:tableStyleId>
+              </a:tblPr>
+              <a:tblGrid>
+                <a:gridCol w="1139825">
+                  <a:extLst>
+                    <a:ext uri="{9D8B030D-6E8A-4147-A177-3AD203B41FA5}">
+                      <a16:colId xmlns:a16="http://schemas.microsoft.com/office/drawing/2014/main" val="3849027981"/>
+                    </a:ext>
+                  </a:extLst>
+                </a:gridCol>
+              </a:tblGrid>
+              <a:tr h="450850">
+                <a:tc>
+                  <a:txBody>
+                    <a:bodyPr/>
+                    <a:lstStyle/>
+                    <a:p>
+                      <a:pPr marL="0" marR="0">
+                        <a:lnSpc>
+                          <a:spcPct val="107000"/>
+                        </a:lnSpc>
+                        <a:spcBef>
+                          <a:spcPts val="0"/>
+                        </a:spcBef>
+                        <a:spcAft>
+                          <a:spcPts val="0"/>
+                        </a:spcAft>
+                      </a:pPr>
+                      <a:r>
+                        <a:rPr lang="en-US" sz="1100" kern="100">
+                          <a:solidFill>
+                            <a:schemeClr val="tx1"/>
+                          </a:solidFill>
+                          <a:effectLst/>
+                        </a:rPr>
+                        <a:t>Automation Probability</a:t>
+                      </a:r>
+                      <a:endParaRPr lang="en-US" sz="1100" kern="100">
+                        <a:solidFill>
+                          <a:schemeClr val="tx1"/>
+                        </a:solidFill>
+                        <a:effectLst/>
+                        <a:latin typeface="Calibri" panose="020F0502020204030204" pitchFamily="34" charset="0"/>
+                        <a:ea typeface="Calibri" panose="020F0502020204030204" pitchFamily="34" charset="0"/>
+                        <a:cs typeface="Times New Roman" panose="02020603050405020304" pitchFamily="18" charset="0"/>
+                      </a:endParaRPr>
+                    </a:p>
+                  </a:txBody>
+                  <a:tcPr marL="68580" marR="68580" marT="0" marB="0">
+                    <a:solidFill>
+                      <a:schemeClr val="bg1">
+                        <a:lumMod val="95000"/>
+                      </a:schemeClr>
+                    </a:solidFill>
+                  </a:tcPr>
+                </a:tc>
+                <a:extLst>
+                  <a:ext uri="{0D108BD9-81ED-4DB2-BD59-A6C34878D82A}">
+                    <a16:rowId xmlns:a16="http://schemas.microsoft.com/office/drawing/2014/main" val="4172899293"/>
+                  </a:ext>
+                </a:extLst>
+              </a:tr>
+              <a:tr h="327025">
+                <a:tc>
+                  <a:txBody>
+                    <a:bodyPr/>
+                    <a:lstStyle/>
+                    <a:p>
+                      <a:pPr marL="0" marR="0">
+                        <a:lnSpc>
+                          <a:spcPct val="107000"/>
+                        </a:lnSpc>
+                        <a:spcBef>
+                          <a:spcPts val="0"/>
+                        </a:spcBef>
+                        <a:spcAft>
+                          <a:spcPts val="0"/>
+                        </a:spcAft>
+                      </a:pPr>
+                      <a:r>
+                        <a:rPr lang="en-US" sz="1100" kern="100">
+                          <a:solidFill>
+                            <a:schemeClr val="tx1"/>
+                          </a:solidFill>
+                          <a:effectLst/>
+                        </a:rPr>
+                        <a:t>0.009</a:t>
+                      </a:r>
+                      <a:endParaRPr lang="en-US" sz="1100" kern="100">
+                        <a:solidFill>
+                          <a:schemeClr val="tx1"/>
+                        </a:solidFill>
+                        <a:effectLst/>
+                        <a:latin typeface="Calibri" panose="020F0502020204030204" pitchFamily="34" charset="0"/>
+                        <a:ea typeface="Calibri" panose="020F0502020204030204" pitchFamily="34" charset="0"/>
+                        <a:cs typeface="Times New Roman" panose="02020603050405020304" pitchFamily="18" charset="0"/>
+                      </a:endParaRPr>
+                    </a:p>
+                  </a:txBody>
+                  <a:tcPr marL="68580" marR="68580" marT="0" marB="0">
+                    <a:solidFill>
+                      <a:schemeClr val="bg1">
+                        <a:lumMod val="95000"/>
+                      </a:schemeClr>
+                    </a:solidFill>
+                  </a:tcPr>
+                </a:tc>
+                <a:extLst>
+                  <a:ext uri="{0D108BD9-81ED-4DB2-BD59-A6C34878D82A}">
+                    <a16:rowId xmlns:a16="http://schemas.microsoft.com/office/drawing/2014/main" val="2366079831"/>
+                  </a:ext>
+                </a:extLst>
+              </a:tr>
+              <a:tr h="315595">
+                <a:tc>
+                  <a:txBody>
+                    <a:bodyPr/>
+                    <a:lstStyle/>
+                    <a:p>
+                      <a:pPr marL="0" marR="0">
+                        <a:lnSpc>
+                          <a:spcPct val="107000"/>
+                        </a:lnSpc>
+                        <a:spcBef>
+                          <a:spcPts val="0"/>
+                        </a:spcBef>
+                        <a:spcAft>
+                          <a:spcPts val="0"/>
+                        </a:spcAft>
+                      </a:pPr>
+                      <a:r>
+                        <a:rPr lang="en-US" sz="1100" kern="100">
+                          <a:solidFill>
+                            <a:schemeClr val="tx1"/>
+                          </a:solidFill>
+                          <a:effectLst/>
+                        </a:rPr>
+                        <a:t>0.22</a:t>
+                      </a:r>
+                      <a:endParaRPr lang="en-US" sz="1100" kern="100">
+                        <a:solidFill>
+                          <a:schemeClr val="tx1"/>
+                        </a:solidFill>
+                        <a:effectLst/>
+                        <a:latin typeface="Calibri" panose="020F0502020204030204" pitchFamily="34" charset="0"/>
+                        <a:ea typeface="Calibri" panose="020F0502020204030204" pitchFamily="34" charset="0"/>
+                        <a:cs typeface="Times New Roman" panose="02020603050405020304" pitchFamily="18" charset="0"/>
+                      </a:endParaRPr>
+                    </a:p>
+                  </a:txBody>
+                  <a:tcPr marL="68580" marR="68580" marT="0" marB="0">
+                    <a:solidFill>
+                      <a:schemeClr val="bg1">
+                        <a:lumMod val="95000"/>
+                      </a:schemeClr>
+                    </a:solidFill>
+                  </a:tcPr>
+                </a:tc>
+                <a:extLst>
+                  <a:ext uri="{0D108BD9-81ED-4DB2-BD59-A6C34878D82A}">
+                    <a16:rowId xmlns:a16="http://schemas.microsoft.com/office/drawing/2014/main" val="1003349431"/>
+                  </a:ext>
+                </a:extLst>
+              </a:tr>
+              <a:tr h="315595">
+                <a:tc>
+                  <a:txBody>
+                    <a:bodyPr/>
+                    <a:lstStyle/>
+                    <a:p>
+                      <a:pPr marL="0" marR="0">
+                        <a:lnSpc>
+                          <a:spcPct val="107000"/>
+                        </a:lnSpc>
+                        <a:spcBef>
+                          <a:spcPts val="0"/>
+                        </a:spcBef>
+                        <a:spcAft>
+                          <a:spcPts val="0"/>
+                        </a:spcAft>
+                      </a:pPr>
+                      <a:r>
+                        <a:rPr lang="en-US" sz="1100" kern="100">
+                          <a:solidFill>
+                            <a:schemeClr val="tx1"/>
+                          </a:solidFill>
+                          <a:effectLst/>
+                        </a:rPr>
+                        <a:t>0.22</a:t>
+                      </a:r>
+                      <a:endParaRPr lang="en-US" sz="1100" kern="100">
+                        <a:solidFill>
+                          <a:schemeClr val="tx1"/>
+                        </a:solidFill>
+                        <a:effectLst/>
+                        <a:latin typeface="Calibri" panose="020F0502020204030204" pitchFamily="34" charset="0"/>
+                        <a:ea typeface="Calibri" panose="020F0502020204030204" pitchFamily="34" charset="0"/>
+                        <a:cs typeface="Times New Roman" panose="02020603050405020304" pitchFamily="18" charset="0"/>
+                      </a:endParaRPr>
+                    </a:p>
+                  </a:txBody>
+                  <a:tcPr marL="68580" marR="68580" marT="0" marB="0">
+                    <a:solidFill>
+                      <a:schemeClr val="bg1">
+                        <a:lumMod val="95000"/>
+                      </a:schemeClr>
+                    </a:solidFill>
+                  </a:tcPr>
+                </a:tc>
+                <a:extLst>
+                  <a:ext uri="{0D108BD9-81ED-4DB2-BD59-A6C34878D82A}">
+                    <a16:rowId xmlns:a16="http://schemas.microsoft.com/office/drawing/2014/main" val="1544280101"/>
+                  </a:ext>
+                </a:extLst>
+              </a:tr>
+              <a:tr h="315595">
+                <a:tc>
+                  <a:txBody>
+                    <a:bodyPr/>
+                    <a:lstStyle/>
+                    <a:p>
+                      <a:pPr marL="0" marR="0">
+                        <a:lnSpc>
+                          <a:spcPct val="107000"/>
+                        </a:lnSpc>
+                        <a:spcBef>
+                          <a:spcPts val="0"/>
+                        </a:spcBef>
+                        <a:spcAft>
+                          <a:spcPts val="0"/>
+                        </a:spcAft>
+                      </a:pPr>
+                      <a:r>
+                        <a:rPr lang="en-US" sz="1100" kern="100" dirty="0">
+                          <a:solidFill>
+                            <a:schemeClr val="tx1"/>
+                          </a:solidFill>
+                          <a:effectLst/>
+                        </a:rPr>
+                        <a:t>0.21</a:t>
+                      </a:r>
+                      <a:endParaRPr lang="en-US" sz="1100" kern="100" dirty="0">
+                        <a:solidFill>
+                          <a:schemeClr val="tx1"/>
+                        </a:solidFill>
+                        <a:effectLst/>
+                        <a:latin typeface="Calibri" panose="020F0502020204030204" pitchFamily="34" charset="0"/>
+                        <a:ea typeface="Calibri" panose="020F0502020204030204" pitchFamily="34" charset="0"/>
+                        <a:cs typeface="Times New Roman" panose="02020603050405020304" pitchFamily="18" charset="0"/>
+                      </a:endParaRPr>
+                    </a:p>
+                  </a:txBody>
+                  <a:tcPr marL="68580" marR="68580" marT="0" marB="0">
+                    <a:solidFill>
+                      <a:schemeClr val="bg1">
+                        <a:lumMod val="95000"/>
+                      </a:schemeClr>
+                    </a:solidFill>
+                  </a:tcPr>
+                </a:tc>
+                <a:extLst>
+                  <a:ext uri="{0D108BD9-81ED-4DB2-BD59-A6C34878D82A}">
+                    <a16:rowId xmlns:a16="http://schemas.microsoft.com/office/drawing/2014/main" val="1584943875"/>
+                  </a:ext>
+                </a:extLst>
+              </a:tr>
+              <a:tr h="327025">
+                <a:tc>
+                  <a:txBody>
+                    <a:bodyPr/>
+                    <a:lstStyle/>
+                    <a:p>
+                      <a:pPr marL="0" marR="0">
+                        <a:lnSpc>
+                          <a:spcPct val="107000"/>
+                        </a:lnSpc>
+                        <a:spcBef>
+                          <a:spcPts val="0"/>
+                        </a:spcBef>
+                        <a:spcAft>
+                          <a:spcPts val="0"/>
+                        </a:spcAft>
+                      </a:pPr>
+                      <a:r>
+                        <a:rPr lang="en-US" sz="1100" kern="100">
+                          <a:solidFill>
+                            <a:schemeClr val="tx1"/>
+                          </a:solidFill>
+                          <a:effectLst/>
+                        </a:rPr>
+                        <a:t>0.0073</a:t>
+                      </a:r>
+                      <a:endParaRPr lang="en-US" sz="1100" kern="100">
+                        <a:solidFill>
+                          <a:schemeClr val="tx1"/>
+                        </a:solidFill>
+                        <a:effectLst/>
+                        <a:latin typeface="Calibri" panose="020F0502020204030204" pitchFamily="34" charset="0"/>
+                        <a:ea typeface="Calibri" panose="020F0502020204030204" pitchFamily="34" charset="0"/>
+                        <a:cs typeface="Times New Roman" panose="02020603050405020304" pitchFamily="18" charset="0"/>
+                      </a:endParaRPr>
+                    </a:p>
+                  </a:txBody>
+                  <a:tcPr marL="68580" marR="68580" marT="0" marB="0">
+                    <a:solidFill>
+                      <a:schemeClr val="bg1">
+                        <a:lumMod val="95000"/>
+                      </a:schemeClr>
+                    </a:solidFill>
+                  </a:tcPr>
+                </a:tc>
+                <a:extLst>
+                  <a:ext uri="{0D108BD9-81ED-4DB2-BD59-A6C34878D82A}">
+                    <a16:rowId xmlns:a16="http://schemas.microsoft.com/office/drawing/2014/main" val="2857075261"/>
+                  </a:ext>
+                </a:extLst>
+              </a:tr>
+              <a:tr h="315595">
+                <a:tc>
+                  <a:txBody>
+                    <a:bodyPr/>
+                    <a:lstStyle/>
+                    <a:p>
+                      <a:pPr marL="0" marR="0">
+                        <a:lnSpc>
+                          <a:spcPct val="107000"/>
+                        </a:lnSpc>
+                        <a:spcBef>
+                          <a:spcPts val="0"/>
+                        </a:spcBef>
+                        <a:spcAft>
+                          <a:spcPts val="0"/>
+                        </a:spcAft>
+                      </a:pPr>
+                      <a:r>
+                        <a:rPr lang="en-US" sz="1100" kern="100">
+                          <a:solidFill>
+                            <a:schemeClr val="tx1"/>
+                          </a:solidFill>
+                          <a:effectLst/>
+                        </a:rPr>
+                        <a:t>0.2</a:t>
+                      </a:r>
+                      <a:endParaRPr lang="en-US" sz="1100" kern="100">
+                        <a:solidFill>
+                          <a:schemeClr val="tx1"/>
+                        </a:solidFill>
+                        <a:effectLst/>
+                        <a:latin typeface="Calibri" panose="020F0502020204030204" pitchFamily="34" charset="0"/>
+                        <a:ea typeface="Calibri" panose="020F0502020204030204" pitchFamily="34" charset="0"/>
+                        <a:cs typeface="Times New Roman" panose="02020603050405020304" pitchFamily="18" charset="0"/>
+                      </a:endParaRPr>
+                    </a:p>
+                  </a:txBody>
+                  <a:tcPr marL="68580" marR="68580" marT="0" marB="0">
+                    <a:solidFill>
+                      <a:schemeClr val="bg1">
+                        <a:lumMod val="95000"/>
+                      </a:schemeClr>
+                    </a:solidFill>
+                  </a:tcPr>
+                </a:tc>
+                <a:extLst>
+                  <a:ext uri="{0D108BD9-81ED-4DB2-BD59-A6C34878D82A}">
+                    <a16:rowId xmlns:a16="http://schemas.microsoft.com/office/drawing/2014/main" val="2170235445"/>
+                  </a:ext>
+                </a:extLst>
+              </a:tr>
+              <a:tr h="315595">
+                <a:tc>
+                  <a:txBody>
+                    <a:bodyPr/>
+                    <a:lstStyle/>
+                    <a:p>
+                      <a:pPr marL="0" marR="0">
+                        <a:lnSpc>
+                          <a:spcPct val="107000"/>
+                        </a:lnSpc>
+                        <a:spcBef>
+                          <a:spcPts val="0"/>
+                        </a:spcBef>
+                        <a:spcAft>
+                          <a:spcPts val="0"/>
+                        </a:spcAft>
+                      </a:pPr>
+                      <a:r>
+                        <a:rPr lang="en-US" sz="1100" kern="100">
+                          <a:solidFill>
+                            <a:schemeClr val="tx1"/>
+                          </a:solidFill>
+                          <a:effectLst/>
+                        </a:rPr>
+                        <a:t>0.14</a:t>
+                      </a:r>
+                      <a:endParaRPr lang="en-US" sz="1100" kern="100">
+                        <a:solidFill>
+                          <a:schemeClr val="tx1"/>
+                        </a:solidFill>
+                        <a:effectLst/>
+                        <a:latin typeface="Calibri" panose="020F0502020204030204" pitchFamily="34" charset="0"/>
+                        <a:ea typeface="Calibri" panose="020F0502020204030204" pitchFamily="34" charset="0"/>
+                        <a:cs typeface="Times New Roman" panose="02020603050405020304" pitchFamily="18" charset="0"/>
+                      </a:endParaRPr>
+                    </a:p>
+                  </a:txBody>
+                  <a:tcPr marL="68580" marR="68580" marT="0" marB="0">
+                    <a:solidFill>
+                      <a:schemeClr val="bg1">
+                        <a:lumMod val="95000"/>
+                      </a:schemeClr>
+                    </a:solidFill>
+                  </a:tcPr>
+                </a:tc>
+                <a:extLst>
+                  <a:ext uri="{0D108BD9-81ED-4DB2-BD59-A6C34878D82A}">
+                    <a16:rowId xmlns:a16="http://schemas.microsoft.com/office/drawing/2014/main" val="6384603"/>
+                  </a:ext>
+                </a:extLst>
+              </a:tr>
+              <a:tr h="315595">
+                <a:tc>
+                  <a:txBody>
+                    <a:bodyPr/>
+                    <a:lstStyle/>
+                    <a:p>
+                      <a:pPr marL="0" marR="0">
+                        <a:lnSpc>
+                          <a:spcPct val="107000"/>
+                        </a:lnSpc>
+                        <a:spcBef>
+                          <a:spcPts val="0"/>
+                        </a:spcBef>
+                        <a:spcAft>
+                          <a:spcPts val="0"/>
+                        </a:spcAft>
+                      </a:pPr>
+                      <a:r>
+                        <a:rPr lang="en-US" sz="1100" kern="100">
+                          <a:solidFill>
+                            <a:schemeClr val="tx1"/>
+                          </a:solidFill>
+                          <a:effectLst/>
+                        </a:rPr>
+                        <a:t>0.021</a:t>
+                      </a:r>
+                      <a:endParaRPr lang="en-US" sz="1100" kern="100">
+                        <a:solidFill>
+                          <a:schemeClr val="tx1"/>
+                        </a:solidFill>
+                        <a:effectLst/>
+                        <a:latin typeface="Calibri" panose="020F0502020204030204" pitchFamily="34" charset="0"/>
+                        <a:ea typeface="Calibri" panose="020F0502020204030204" pitchFamily="34" charset="0"/>
+                        <a:cs typeface="Times New Roman" panose="02020603050405020304" pitchFamily="18" charset="0"/>
+                      </a:endParaRPr>
+                    </a:p>
+                  </a:txBody>
+                  <a:tcPr marL="68580" marR="68580" marT="0" marB="0">
+                    <a:solidFill>
+                      <a:schemeClr val="bg1">
+                        <a:lumMod val="95000"/>
+                      </a:schemeClr>
+                    </a:solidFill>
+                  </a:tcPr>
+                </a:tc>
+                <a:extLst>
+                  <a:ext uri="{0D108BD9-81ED-4DB2-BD59-A6C34878D82A}">
+                    <a16:rowId xmlns:a16="http://schemas.microsoft.com/office/drawing/2014/main" val="3784350836"/>
+                  </a:ext>
+                </a:extLst>
+              </a:tr>
+              <a:tr h="327025">
+                <a:tc>
+                  <a:txBody>
+                    <a:bodyPr/>
+                    <a:lstStyle/>
+                    <a:p>
+                      <a:pPr marL="0" marR="0">
+                        <a:lnSpc>
+                          <a:spcPct val="107000"/>
+                        </a:lnSpc>
+                        <a:spcBef>
+                          <a:spcPts val="0"/>
+                        </a:spcBef>
+                        <a:spcAft>
+                          <a:spcPts val="0"/>
+                        </a:spcAft>
+                      </a:pPr>
+                      <a:r>
+                        <a:rPr lang="en-US" sz="1100" kern="100" dirty="0">
+                          <a:solidFill>
+                            <a:schemeClr val="tx1"/>
+                          </a:solidFill>
+                          <a:effectLst/>
+                        </a:rPr>
+                        <a:t>0.13</a:t>
+                      </a:r>
+                      <a:endParaRPr lang="en-US" sz="1100" kern="100" dirty="0">
+                        <a:solidFill>
+                          <a:schemeClr val="tx1"/>
+                        </a:solidFill>
+                        <a:effectLst/>
+                        <a:latin typeface="Calibri" panose="020F0502020204030204" pitchFamily="34" charset="0"/>
+                        <a:ea typeface="Calibri" panose="020F0502020204030204" pitchFamily="34" charset="0"/>
+                        <a:cs typeface="Times New Roman" panose="02020603050405020304" pitchFamily="18" charset="0"/>
+                      </a:endParaRPr>
+                    </a:p>
+                  </a:txBody>
+                  <a:tcPr marL="68580" marR="68580" marT="0" marB="0">
+                    <a:solidFill>
+                      <a:schemeClr val="bg1">
+                        <a:lumMod val="95000"/>
+                      </a:schemeClr>
+                    </a:solidFill>
+                  </a:tcPr>
+                </a:tc>
+                <a:extLst>
+                  <a:ext uri="{0D108BD9-81ED-4DB2-BD59-A6C34878D82A}">
+                    <a16:rowId xmlns:a16="http://schemas.microsoft.com/office/drawing/2014/main" val="4063746581"/>
+                  </a:ext>
+                </a:extLst>
+              </a:tr>
+            </a:tbl>
+          </a:graphicData>
+        </a:graphic>
+      </p:graphicFrame>
     </p:spTree>
     <p:extLst>
       <p:ext uri="{BB962C8B-B14F-4D97-AF65-F5344CB8AC3E}">
@@ -8235,13 +8771,13 @@
         <p:spPr/>
         <p:txBody>
           <a:bodyPr>
-            <a:normAutofit fontScale="90000"/>
+            <a:normAutofit/>
           </a:bodyPr>
           <a:lstStyle/>
           <a:p>
             <a:pPr algn="ctr"/>
             <a:r>
-              <a:rPr lang="en-US" sz="4000" dirty="0"/>
+              <a:rPr lang="en-US" dirty="0"/>
               <a:t>Job Trends in Healthcare industry</a:t>
             </a:r>
           </a:p>
@@ -8359,11 +8895,13 @@
         </p:nvSpPr>
         <p:spPr/>
         <p:txBody>
-          <a:bodyPr/>
+          <a:bodyPr>
+            <a:normAutofit/>
+          </a:bodyPr>
           <a:lstStyle/>
           <a:p>
             <a:r>
-              <a:rPr lang="en-US" sz="2900" dirty="0"/>
+              <a:rPr lang="en-US" dirty="0"/>
               <a:t>Distribution of the wages in sectors</a:t>
             </a:r>
           </a:p>
@@ -8432,92 +8970,6 @@
           <p:cNvPr id="2" name="Title 1">
             <a:extLst>
               <a:ext uri="{FF2B5EF4-FFF2-40B4-BE49-F238E27FC236}">
-                <a16:creationId xmlns:a16="http://schemas.microsoft.com/office/drawing/2014/main" id="{87611440-FD6E-8D29-49FD-B42A7175AE0B}"/>
-              </a:ext>
-            </a:extLst>
-          </p:cNvPr>
-          <p:cNvSpPr>
-            <a:spLocks noGrp="1"/>
-          </p:cNvSpPr>
-          <p:nvPr>
-            <p:ph type="title"/>
-          </p:nvPr>
-        </p:nvSpPr>
-        <p:spPr/>
-        <p:txBody>
-          <a:bodyPr/>
-          <a:lstStyle/>
-          <a:p>
-            <a:r>
-              <a:rPr lang="en-US" sz="2900" dirty="0"/>
-              <a:t>Employment openings and change</a:t>
-            </a:r>
-          </a:p>
-        </p:txBody>
-      </p:sp>
-      <p:sp>
-        <p:nvSpPr>
-          <p:cNvPr id="3" name="Content Placeholder 2">
-            <a:extLst>
-              <a:ext uri="{FF2B5EF4-FFF2-40B4-BE49-F238E27FC236}">
-                <a16:creationId xmlns:a16="http://schemas.microsoft.com/office/drawing/2014/main" id="{35CD4FB9-2182-FEC3-89FC-8902B131961D}"/>
-              </a:ext>
-            </a:extLst>
-          </p:cNvPr>
-          <p:cNvSpPr>
-            <a:spLocks noGrp="1"/>
-          </p:cNvSpPr>
-          <p:nvPr>
-            <p:ph idx="1"/>
-          </p:nvPr>
-        </p:nvSpPr>
-        <p:spPr/>
-        <p:txBody>
-          <a:bodyPr/>
-          <a:lstStyle/>
-          <a:p>
-            <a:r>
-              <a:rPr lang="en-US" dirty="0"/>
-              <a:t>Answer to question 3</a:t>
-            </a:r>
-          </a:p>
-        </p:txBody>
-      </p:sp>
-    </p:spTree>
-    <p:extLst>
-      <p:ext uri="{BB962C8B-B14F-4D97-AF65-F5344CB8AC3E}">
-        <p14:creationId xmlns:p14="http://schemas.microsoft.com/office/powerpoint/2010/main" val="3285959969"/>
-      </p:ext>
-    </p:extLst>
-  </p:cSld>
-  <p:clrMapOvr>
-    <a:masterClrMapping/>
-  </p:clrMapOvr>
-</p:sld>
-</file>
-
-<file path=ppt/slides/slide15.xml><?xml version="1.0" encoding="utf-8"?>
-<p:sld xmlns:a="http://schemas.openxmlformats.org/drawingml/2006/main" xmlns:r="http://schemas.openxmlformats.org/officeDocument/2006/relationships" xmlns:p="http://schemas.openxmlformats.org/presentationml/2006/main">
-  <p:cSld>
-    <p:spTree>
-      <p:nvGrpSpPr>
-        <p:cNvPr id="1" name=""/>
-        <p:cNvGrpSpPr/>
-        <p:nvPr/>
-      </p:nvGrpSpPr>
-      <p:grpSpPr>
-        <a:xfrm>
-          <a:off x="0" y="0"/>
-          <a:ext cx="0" cy="0"/>
-          <a:chOff x="0" y="0"/>
-          <a:chExt cx="0" cy="0"/>
-        </a:xfrm>
-      </p:grpSpPr>
-      <p:sp>
-        <p:nvSpPr>
-          <p:cNvPr id="2" name="Title 1">
-            <a:extLst>
-              <a:ext uri="{FF2B5EF4-FFF2-40B4-BE49-F238E27FC236}">
                 <a16:creationId xmlns:a16="http://schemas.microsoft.com/office/drawing/2014/main" id="{53E072B9-EF2E-6C65-5FAE-C77DD3149FCD}"/>
               </a:ext>
             </a:extLst>
@@ -8531,11 +8983,14 @@
         </p:nvSpPr>
         <p:spPr/>
         <p:txBody>
-          <a:bodyPr/>
+          <a:bodyPr>
+            <a:noAutofit/>
+          </a:bodyPr>
           <a:lstStyle/>
           <a:p>
-            <a:r>
-              <a:rPr lang="en-US" sz="2900" dirty="0"/>
+            <a:pPr algn="ctr"/>
+            <a:r>
+              <a:rPr lang="en-US" dirty="0"/>
               <a:t>Occupations affected due to automation</a:t>
             </a:r>
           </a:p>
@@ -8609,7 +9064,7 @@
 </p:sld>
 </file>
 
-<file path=ppt/slides/slide16.xml><?xml version="1.0" encoding="utf-8"?>
+<file path=ppt/slides/slide15.xml><?xml version="1.0" encoding="utf-8"?>
 <p:sld xmlns:a="http://schemas.openxmlformats.org/drawingml/2006/main" xmlns:r="http://schemas.openxmlformats.org/officeDocument/2006/relationships" xmlns:p="http://schemas.openxmlformats.org/presentationml/2006/main">
   <p:cSld>
     <p:spTree>
@@ -8650,15 +9105,14 @@
         </p:spPr>
         <p:txBody>
           <a:bodyPr>
-            <a:normAutofit fontScale="90000"/>
+            <a:noAutofit/>
           </a:bodyPr>
           <a:lstStyle/>
           <a:p>
             <a:r>
-              <a:rPr lang="en-US"/>
+              <a:rPr lang="en-US" dirty="0"/>
               <a:t>Impact of automation per Ethnicity </a:t>
             </a:r>
-            <a:endParaRPr lang="en-US" dirty="0"/>
           </a:p>
         </p:txBody>
       </p:sp>
@@ -8794,7 +9248,7 @@
 </p:sld>
 </file>
 
-<file path=ppt/slides/slide17.xml><?xml version="1.0" encoding="utf-8"?>
+<file path=ppt/slides/slide16.xml><?xml version="1.0" encoding="utf-8"?>
 <p:sld xmlns:a="http://schemas.openxmlformats.org/drawingml/2006/main" xmlns:r="http://schemas.openxmlformats.org/officeDocument/2006/relationships" xmlns:p="http://schemas.openxmlformats.org/presentationml/2006/main">
   <p:cSld>
     <p:spTree>
@@ -8886,6 +9340,98 @@
 </p:sld>
 </file>
 
+<file path=ppt/slides/slide17.xml><?xml version="1.0" encoding="utf-8"?>
+<p:sld xmlns:a="http://schemas.openxmlformats.org/drawingml/2006/main" xmlns:r="http://schemas.openxmlformats.org/officeDocument/2006/relationships" xmlns:p="http://schemas.openxmlformats.org/presentationml/2006/main">
+  <p:cSld>
+    <p:spTree>
+      <p:nvGrpSpPr>
+        <p:cNvPr id="1" name=""/>
+        <p:cNvGrpSpPr/>
+        <p:nvPr/>
+      </p:nvGrpSpPr>
+      <p:grpSpPr>
+        <a:xfrm>
+          <a:off x="0" y="0"/>
+          <a:ext cx="0" cy="0"/>
+          <a:chOff x="0" y="0"/>
+          <a:chExt cx="0" cy="0"/>
+        </a:xfrm>
+      </p:grpSpPr>
+      <p:sp>
+        <p:nvSpPr>
+          <p:cNvPr id="2" name="Title 1">
+            <a:extLst>
+              <a:ext uri="{FF2B5EF4-FFF2-40B4-BE49-F238E27FC236}">
+                <a16:creationId xmlns:a16="http://schemas.microsoft.com/office/drawing/2014/main" id="{2A50D09B-00CE-BDD6-8725-C5466B6A8F5A}"/>
+              </a:ext>
+            </a:extLst>
+          </p:cNvPr>
+          <p:cNvSpPr>
+            <a:spLocks noGrp="1"/>
+          </p:cNvSpPr>
+          <p:nvPr>
+            <p:ph type="title"/>
+          </p:nvPr>
+        </p:nvSpPr>
+        <p:spPr/>
+        <p:txBody>
+          <a:bodyPr>
+            <a:noAutofit/>
+          </a:bodyPr>
+          <a:lstStyle/>
+          <a:p>
+            <a:pPr algn="ctr"/>
+            <a:r>
+              <a:rPr lang="en-US" dirty="0"/>
+              <a:t>Employment prospects for job seekers</a:t>
+            </a:r>
+          </a:p>
+        </p:txBody>
+      </p:sp>
+      <p:sp>
+        <p:nvSpPr>
+          <p:cNvPr id="3" name="Content Placeholder 2">
+            <a:extLst>
+              <a:ext uri="{FF2B5EF4-FFF2-40B4-BE49-F238E27FC236}">
+                <a16:creationId xmlns:a16="http://schemas.microsoft.com/office/drawing/2014/main" id="{2146A438-C4A9-BCA6-70F9-5C049150BF61}"/>
+              </a:ext>
+            </a:extLst>
+          </p:cNvPr>
+          <p:cNvSpPr>
+            <a:spLocks noGrp="1"/>
+          </p:cNvSpPr>
+          <p:nvPr>
+            <p:ph idx="1"/>
+          </p:nvPr>
+        </p:nvSpPr>
+        <p:spPr/>
+        <p:txBody>
+          <a:bodyPr/>
+          <a:lstStyle/>
+          <a:p>
+            <a:r>
+              <a:rPr lang="en-US" dirty="0"/>
+              <a:t>Answer to question 6</a:t>
+            </a:r>
+          </a:p>
+          <a:p>
+            <a:endParaRPr lang="en-US" dirty="0"/>
+          </a:p>
+        </p:txBody>
+      </p:sp>
+    </p:spTree>
+    <p:extLst>
+      <p:ext uri="{BB962C8B-B14F-4D97-AF65-F5344CB8AC3E}">
+        <p14:creationId xmlns:p14="http://schemas.microsoft.com/office/powerpoint/2010/main" val="271651074"/>
+      </p:ext>
+    </p:extLst>
+  </p:cSld>
+  <p:clrMapOvr>
+    <a:masterClrMapping/>
+  </p:clrMapOvr>
+</p:sld>
+</file>
+
 <file path=ppt/slides/slide18.xml><?xml version="1.0" encoding="utf-8"?>
 <p:sld xmlns:a="http://schemas.openxmlformats.org/drawingml/2006/main" xmlns:r="http://schemas.openxmlformats.org/officeDocument/2006/relationships" xmlns:p="http://schemas.openxmlformats.org/presentationml/2006/main">
   <p:cSld>
@@ -8908,7 +9454,7 @@
           <p:cNvPr id="2" name="Title 1">
             <a:extLst>
               <a:ext uri="{FF2B5EF4-FFF2-40B4-BE49-F238E27FC236}">
-                <a16:creationId xmlns:a16="http://schemas.microsoft.com/office/drawing/2014/main" id="{AC8CA5D3-756E-6076-0084-59894B6DB045}"/>
+                <a16:creationId xmlns:a16="http://schemas.microsoft.com/office/drawing/2014/main" id="{A112D148-F99E-41E6-C396-5396486C10AE}"/>
               </a:ext>
             </a:extLst>
           </p:cNvPr>
@@ -8919,20 +9465,12 @@
             <p:ph type="title"/>
           </p:nvPr>
         </p:nvSpPr>
-        <p:spPr>
-          <a:xfrm>
-            <a:off x="1920239" y="398677"/>
-            <a:ext cx="8770571" cy="1345269"/>
-          </a:xfrm>
-        </p:spPr>
+        <p:spPr/>
         <p:txBody>
           <a:bodyPr/>
           <a:lstStyle/>
           <a:p>
-            <a:r>
-              <a:rPr lang="en-US" sz="2900" dirty="0"/>
-              <a:t>Fastest growing/declining occupations</a:t>
-            </a:r>
+            <a:endParaRPr lang="en-US"/>
           </a:p>
         </p:txBody>
       </p:sp>
@@ -8941,7 +9479,7 @@
           <p:cNvPr id="3" name="Content Placeholder 2">
             <a:extLst>
               <a:ext uri="{FF2B5EF4-FFF2-40B4-BE49-F238E27FC236}">
-                <a16:creationId xmlns:a16="http://schemas.microsoft.com/office/drawing/2014/main" id="{42B96626-6607-F1E8-FA72-C2F7D378D65A}"/>
+                <a16:creationId xmlns:a16="http://schemas.microsoft.com/office/drawing/2014/main" id="{AF0F93CC-6618-186F-421E-B4A65D3D9391}"/>
               </a:ext>
             </a:extLst>
           </p:cNvPr>
@@ -8959,7 +9497,7 @@
           <a:p>
             <a:r>
               <a:rPr lang="en-US" dirty="0"/>
-              <a:t>Answer to question 5</a:t>
+              <a:t>Answer to question 7</a:t>
             </a:r>
           </a:p>
           <a:p>
@@ -8970,7 +9508,7 @@
     </p:spTree>
     <p:extLst>
       <p:ext uri="{BB962C8B-B14F-4D97-AF65-F5344CB8AC3E}">
-        <p14:creationId xmlns:p14="http://schemas.microsoft.com/office/powerpoint/2010/main" val="1970774222"/>
+        <p14:creationId xmlns:p14="http://schemas.microsoft.com/office/powerpoint/2010/main" val="372559737"/>
       </p:ext>
     </p:extLst>
   </p:cSld>
@@ -9002,7 +9540,7 @@
           <p:cNvPr id="2" name="Title 1">
             <a:extLst>
               <a:ext uri="{FF2B5EF4-FFF2-40B4-BE49-F238E27FC236}">
-                <a16:creationId xmlns:a16="http://schemas.microsoft.com/office/drawing/2014/main" id="{2A50D09B-00CE-BDD6-8725-C5466B6A8F5A}"/>
+                <a16:creationId xmlns:a16="http://schemas.microsoft.com/office/drawing/2014/main" id="{5695B0C7-7527-9653-87F6-6A1FFE784120}"/>
               </a:ext>
             </a:extLst>
           </p:cNvPr>
@@ -9018,10 +9556,7 @@
           <a:bodyPr/>
           <a:lstStyle/>
           <a:p>
-            <a:r>
-              <a:rPr lang="en-US" sz="2900" dirty="0"/>
-              <a:t>Employment prospects for job seekers</a:t>
-            </a:r>
+            <a:endParaRPr lang="en-US"/>
           </a:p>
         </p:txBody>
       </p:sp>
@@ -9030,7 +9565,7 @@
           <p:cNvPr id="3" name="Content Placeholder 2">
             <a:extLst>
               <a:ext uri="{FF2B5EF4-FFF2-40B4-BE49-F238E27FC236}">
-                <a16:creationId xmlns:a16="http://schemas.microsoft.com/office/drawing/2014/main" id="{2146A438-C4A9-BCA6-70F9-5C049150BF61}"/>
+                <a16:creationId xmlns:a16="http://schemas.microsoft.com/office/drawing/2014/main" id="{D0E300B5-572B-F978-5BDA-B869E8B49473}"/>
               </a:ext>
             </a:extLst>
           </p:cNvPr>
@@ -9048,7 +9583,7 @@
           <a:p>
             <a:r>
               <a:rPr lang="en-US" dirty="0"/>
-              <a:t>Answer to question 6</a:t>
+              <a:t>Answer to question 8</a:t>
             </a:r>
           </a:p>
           <a:p>
@@ -9059,7 +9594,7 @@
     </p:spTree>
     <p:extLst>
       <p:ext uri="{BB962C8B-B14F-4D97-AF65-F5344CB8AC3E}">
-        <p14:creationId xmlns:p14="http://schemas.microsoft.com/office/powerpoint/2010/main" val="271651074"/>
+        <p14:creationId xmlns:p14="http://schemas.microsoft.com/office/powerpoint/2010/main" val="1025258359"/>
       </p:ext>
     </p:extLst>
   </p:cSld>
@@ -9293,7 +9828,7 @@
           <p:cNvPr id="2" name="Title 1">
             <a:extLst>
               <a:ext uri="{FF2B5EF4-FFF2-40B4-BE49-F238E27FC236}">
-                <a16:creationId xmlns:a16="http://schemas.microsoft.com/office/drawing/2014/main" id="{A112D148-F99E-41E6-C396-5396486C10AE}"/>
+                <a16:creationId xmlns:a16="http://schemas.microsoft.com/office/drawing/2014/main" id="{8A9DC44B-90B9-7734-E89E-BC733E03CFFF}"/>
               </a:ext>
             </a:extLst>
           </p:cNvPr>
@@ -9306,10 +9841,20 @@
         </p:nvSpPr>
         <p:spPr/>
         <p:txBody>
-          <a:bodyPr/>
+          <a:bodyPr>
+            <a:normAutofit/>
+          </a:bodyPr>
           <a:lstStyle/>
           <a:p>
-            <a:endParaRPr lang="en-US"/>
+            <a:pPr algn="ctr"/>
+            <a:r>
+              <a:rPr lang="en-US" b="1" i="0" dirty="0">
+                <a:effectLst/>
+                <a:latin typeface="Söhne"/>
+              </a:rPr>
+              <a:t>Conclusion</a:t>
+            </a:r>
+            <a:endParaRPr lang="en-US" dirty="0"/>
           </a:p>
         </p:txBody>
       </p:sp>
@@ -9318,7 +9863,7 @@
           <p:cNvPr id="3" name="Content Placeholder 2">
             <a:extLst>
               <a:ext uri="{FF2B5EF4-FFF2-40B4-BE49-F238E27FC236}">
-                <a16:creationId xmlns:a16="http://schemas.microsoft.com/office/drawing/2014/main" id="{AF0F93CC-6618-186F-421E-B4A65D3D9391}"/>
+                <a16:creationId xmlns:a16="http://schemas.microsoft.com/office/drawing/2014/main" id="{F7F6C1DB-77C4-DEA6-4D3A-FA7AF2180AA9}"/>
               </a:ext>
             </a:extLst>
           </p:cNvPr>
@@ -9336,18 +9881,15 @@
           <a:p>
             <a:r>
               <a:rPr lang="en-US" dirty="0"/>
-              <a:t>Answer to question 7</a:t>
-            </a:r>
-          </a:p>
-          <a:p>
-            <a:endParaRPr lang="en-US" dirty="0"/>
+              <a:t>Here we will conclude our analysis and share analysis results</a:t>
+            </a:r>
           </a:p>
         </p:txBody>
       </p:sp>
     </p:spTree>
     <p:extLst>
       <p:ext uri="{BB962C8B-B14F-4D97-AF65-F5344CB8AC3E}">
-        <p14:creationId xmlns:p14="http://schemas.microsoft.com/office/powerpoint/2010/main" val="372559737"/>
+        <p14:creationId xmlns:p14="http://schemas.microsoft.com/office/powerpoint/2010/main" val="1819884951"/>
       </p:ext>
     </p:extLst>
   </p:cSld>
@@ -9379,7 +9921,7 @@
           <p:cNvPr id="2" name="Title 1">
             <a:extLst>
               <a:ext uri="{FF2B5EF4-FFF2-40B4-BE49-F238E27FC236}">
-                <a16:creationId xmlns:a16="http://schemas.microsoft.com/office/drawing/2014/main" id="{5695B0C7-7527-9653-87F6-6A1FFE784120}"/>
+                <a16:creationId xmlns:a16="http://schemas.microsoft.com/office/drawing/2014/main" id="{4BB252BF-484D-68FB-0633-20899EDECE83}"/>
               </a:ext>
             </a:extLst>
           </p:cNvPr>
@@ -9395,7 +9937,14 @@
           <a:bodyPr/>
           <a:lstStyle/>
           <a:p>
-            <a:endParaRPr lang="en-US"/>
+            <a:r>
+              <a:rPr lang="en-US" b="1" i="0" dirty="0">
+                <a:effectLst/>
+                <a:latin typeface="Söhne"/>
+              </a:rPr>
+              <a:t>Q&amp;A</a:t>
+            </a:r>
+            <a:endParaRPr lang="en-US" dirty="0"/>
           </a:p>
         </p:txBody>
       </p:sp>
@@ -9404,7 +9953,7 @@
           <p:cNvPr id="3" name="Content Placeholder 2">
             <a:extLst>
               <a:ext uri="{FF2B5EF4-FFF2-40B4-BE49-F238E27FC236}">
-                <a16:creationId xmlns:a16="http://schemas.microsoft.com/office/drawing/2014/main" id="{D0E300B5-572B-F978-5BDA-B869E8B49473}"/>
+                <a16:creationId xmlns:a16="http://schemas.microsoft.com/office/drawing/2014/main" id="{1B3D3996-60A1-2871-C46B-726A1A81EF5C}"/>
               </a:ext>
             </a:extLst>
           </p:cNvPr>
@@ -9422,18 +9971,15 @@
           <a:p>
             <a:r>
               <a:rPr lang="en-US" dirty="0"/>
-              <a:t>Answer to question 8</a:t>
-            </a:r>
-          </a:p>
-          <a:p>
-            <a:endParaRPr lang="en-US" dirty="0"/>
+              <a:t>We will take questions from audience </a:t>
+            </a:r>
           </a:p>
         </p:txBody>
       </p:sp>
     </p:spTree>
     <p:extLst>
       <p:ext uri="{BB962C8B-B14F-4D97-AF65-F5344CB8AC3E}">
-        <p14:creationId xmlns:p14="http://schemas.microsoft.com/office/powerpoint/2010/main" val="1025258359"/>
+        <p14:creationId xmlns:p14="http://schemas.microsoft.com/office/powerpoint/2010/main" val="1541405568"/>
       </p:ext>
     </p:extLst>
   </p:cSld>
@@ -9465,186 +10011,6 @@
           <p:cNvPr id="2" name="Title 1">
             <a:extLst>
               <a:ext uri="{FF2B5EF4-FFF2-40B4-BE49-F238E27FC236}">
-                <a16:creationId xmlns:a16="http://schemas.microsoft.com/office/drawing/2014/main" id="{8A9DC44B-90B9-7734-E89E-BC733E03CFFF}"/>
-              </a:ext>
-            </a:extLst>
-          </p:cNvPr>
-          <p:cNvSpPr>
-            <a:spLocks noGrp="1"/>
-          </p:cNvSpPr>
-          <p:nvPr>
-            <p:ph type="title"/>
-          </p:nvPr>
-        </p:nvSpPr>
-        <p:spPr/>
-        <p:txBody>
-          <a:bodyPr/>
-          <a:lstStyle/>
-          <a:p>
-            <a:r>
-              <a:rPr lang="en-US" b="1" i="0" dirty="0">
-                <a:effectLst/>
-                <a:latin typeface="Söhne"/>
-              </a:rPr>
-              <a:t>Conclusion</a:t>
-            </a:r>
-            <a:endParaRPr lang="en-US" dirty="0"/>
-          </a:p>
-        </p:txBody>
-      </p:sp>
-      <p:sp>
-        <p:nvSpPr>
-          <p:cNvPr id="3" name="Content Placeholder 2">
-            <a:extLst>
-              <a:ext uri="{FF2B5EF4-FFF2-40B4-BE49-F238E27FC236}">
-                <a16:creationId xmlns:a16="http://schemas.microsoft.com/office/drawing/2014/main" id="{F7F6C1DB-77C4-DEA6-4D3A-FA7AF2180AA9}"/>
-              </a:ext>
-            </a:extLst>
-          </p:cNvPr>
-          <p:cNvSpPr>
-            <a:spLocks noGrp="1"/>
-          </p:cNvSpPr>
-          <p:nvPr>
-            <p:ph idx="1"/>
-          </p:nvPr>
-        </p:nvSpPr>
-        <p:spPr/>
-        <p:txBody>
-          <a:bodyPr/>
-          <a:lstStyle/>
-          <a:p>
-            <a:r>
-              <a:rPr lang="en-US" dirty="0"/>
-              <a:t>Here we will conclude our analysis and share analysis results</a:t>
-            </a:r>
-          </a:p>
-        </p:txBody>
-      </p:sp>
-    </p:spTree>
-    <p:extLst>
-      <p:ext uri="{BB962C8B-B14F-4D97-AF65-F5344CB8AC3E}">
-        <p14:creationId xmlns:p14="http://schemas.microsoft.com/office/powerpoint/2010/main" val="1819884951"/>
-      </p:ext>
-    </p:extLst>
-  </p:cSld>
-  <p:clrMapOvr>
-    <a:masterClrMapping/>
-  </p:clrMapOvr>
-</p:sld>
-</file>
-
-<file path=ppt/slides/slide23.xml><?xml version="1.0" encoding="utf-8"?>
-<p:sld xmlns:a="http://schemas.openxmlformats.org/drawingml/2006/main" xmlns:r="http://schemas.openxmlformats.org/officeDocument/2006/relationships" xmlns:p="http://schemas.openxmlformats.org/presentationml/2006/main">
-  <p:cSld>
-    <p:spTree>
-      <p:nvGrpSpPr>
-        <p:cNvPr id="1" name=""/>
-        <p:cNvGrpSpPr/>
-        <p:nvPr/>
-      </p:nvGrpSpPr>
-      <p:grpSpPr>
-        <a:xfrm>
-          <a:off x="0" y="0"/>
-          <a:ext cx="0" cy="0"/>
-          <a:chOff x="0" y="0"/>
-          <a:chExt cx="0" cy="0"/>
-        </a:xfrm>
-      </p:grpSpPr>
-      <p:sp>
-        <p:nvSpPr>
-          <p:cNvPr id="2" name="Title 1">
-            <a:extLst>
-              <a:ext uri="{FF2B5EF4-FFF2-40B4-BE49-F238E27FC236}">
-                <a16:creationId xmlns:a16="http://schemas.microsoft.com/office/drawing/2014/main" id="{4BB252BF-484D-68FB-0633-20899EDECE83}"/>
-              </a:ext>
-            </a:extLst>
-          </p:cNvPr>
-          <p:cNvSpPr>
-            <a:spLocks noGrp="1"/>
-          </p:cNvSpPr>
-          <p:nvPr>
-            <p:ph type="title"/>
-          </p:nvPr>
-        </p:nvSpPr>
-        <p:spPr/>
-        <p:txBody>
-          <a:bodyPr/>
-          <a:lstStyle/>
-          <a:p>
-            <a:r>
-              <a:rPr lang="en-US" b="1" i="0" dirty="0">
-                <a:effectLst/>
-                <a:latin typeface="Söhne"/>
-              </a:rPr>
-              <a:t>Q&amp;A</a:t>
-            </a:r>
-            <a:endParaRPr lang="en-US" dirty="0"/>
-          </a:p>
-        </p:txBody>
-      </p:sp>
-      <p:sp>
-        <p:nvSpPr>
-          <p:cNvPr id="3" name="Content Placeholder 2">
-            <a:extLst>
-              <a:ext uri="{FF2B5EF4-FFF2-40B4-BE49-F238E27FC236}">
-                <a16:creationId xmlns:a16="http://schemas.microsoft.com/office/drawing/2014/main" id="{1B3D3996-60A1-2871-C46B-726A1A81EF5C}"/>
-              </a:ext>
-            </a:extLst>
-          </p:cNvPr>
-          <p:cNvSpPr>
-            <a:spLocks noGrp="1"/>
-          </p:cNvSpPr>
-          <p:nvPr>
-            <p:ph idx="1"/>
-          </p:nvPr>
-        </p:nvSpPr>
-        <p:spPr/>
-        <p:txBody>
-          <a:bodyPr/>
-          <a:lstStyle/>
-          <a:p>
-            <a:r>
-              <a:rPr lang="en-US" dirty="0"/>
-              <a:t>We will take questions from audience </a:t>
-            </a:r>
-          </a:p>
-        </p:txBody>
-      </p:sp>
-    </p:spTree>
-    <p:extLst>
-      <p:ext uri="{BB962C8B-B14F-4D97-AF65-F5344CB8AC3E}">
-        <p14:creationId xmlns:p14="http://schemas.microsoft.com/office/powerpoint/2010/main" val="1541405568"/>
-      </p:ext>
-    </p:extLst>
-  </p:cSld>
-  <p:clrMapOvr>
-    <a:masterClrMapping/>
-  </p:clrMapOvr>
-</p:sld>
-</file>
-
-<file path=ppt/slides/slide24.xml><?xml version="1.0" encoding="utf-8"?>
-<p:sld xmlns:a="http://schemas.openxmlformats.org/drawingml/2006/main" xmlns:r="http://schemas.openxmlformats.org/officeDocument/2006/relationships" xmlns:p="http://schemas.openxmlformats.org/presentationml/2006/main">
-  <p:cSld>
-    <p:spTree>
-      <p:nvGrpSpPr>
-        <p:cNvPr id="1" name=""/>
-        <p:cNvGrpSpPr/>
-        <p:nvPr/>
-      </p:nvGrpSpPr>
-      <p:grpSpPr>
-        <a:xfrm>
-          <a:off x="0" y="0"/>
-          <a:ext cx="0" cy="0"/>
-          <a:chOff x="0" y="0"/>
-          <a:chExt cx="0" cy="0"/>
-        </a:xfrm>
-      </p:grpSpPr>
-      <p:sp>
-        <p:nvSpPr>
-          <p:cNvPr id="2" name="Title 1">
-            <a:extLst>
-              <a:ext uri="{FF2B5EF4-FFF2-40B4-BE49-F238E27FC236}">
                 <a16:creationId xmlns:a16="http://schemas.microsoft.com/office/drawing/2014/main" id="{A375243E-9A29-04F0-6451-7B75E395FD6D}"/>
               </a:ext>
             </a:extLst>
@@ -9658,17 +10024,20 @@
         </p:nvSpPr>
         <p:spPr/>
         <p:txBody>
-          <a:bodyPr/>
+          <a:bodyPr>
+            <a:normAutofit/>
+          </a:bodyPr>
           <a:lstStyle/>
           <a:p>
-            <a:r>
-              <a:rPr lang="en-US" b="1" i="0" dirty="0">
+            <a:pPr algn="ctr"/>
+            <a:r>
+              <a:rPr lang="en-US" sz="3600" b="1" i="0" dirty="0">
                 <a:effectLst/>
                 <a:latin typeface="Söhne"/>
               </a:rPr>
               <a:t>Thank You</a:t>
             </a:r>
-            <a:endParaRPr lang="en-US" dirty="0"/>
+            <a:endParaRPr lang="en-US" sz="3600" dirty="0"/>
           </a:p>
         </p:txBody>
       </p:sp>
@@ -9713,7 +10082,7 @@
 </p:sld>
 </file>
 
-<file path=ppt/slides/slide25.xml><?xml version="1.0" encoding="utf-8"?>
+<file path=ppt/slides/slide23.xml><?xml version="1.0" encoding="utf-8"?>
 <p:sld xmlns:a="http://schemas.openxmlformats.org/drawingml/2006/main" xmlns:r="http://schemas.openxmlformats.org/officeDocument/2006/relationships" xmlns:p="http://schemas.openxmlformats.org/presentationml/2006/main">
   <p:cSld>
     <p:spTree>
@@ -9825,7 +10194,7 @@
           <p:cNvPr id="2" name="Title 1">
             <a:extLst>
               <a:ext uri="{FF2B5EF4-FFF2-40B4-BE49-F238E27FC236}">
-                <a16:creationId xmlns:a16="http://schemas.microsoft.com/office/drawing/2014/main" id="{7069D3B9-44DE-D658-F543-C1D9F51DF36A}"/>
+                <a16:creationId xmlns:a16="http://schemas.microsoft.com/office/drawing/2014/main" id="{CD3E3233-3A75-94AE-1F5F-6CD6E3E920C3}"/>
               </a:ext>
             </a:extLst>
           </p:cNvPr>
@@ -9843,13 +10212,9 @@
           <a:p>
             <a:pPr algn="ctr"/>
             <a:r>
-              <a:rPr lang="en-US" b="1" i="0" dirty="0">
-                <a:effectLst/>
-                <a:latin typeface="Söhne"/>
-              </a:rPr>
-              <a:t>Objective of Analysis</a:t>
-            </a:r>
-            <a:endParaRPr lang="en-US" dirty="0"/>
+              <a:rPr lang="en-US" dirty="0"/>
+              <a:t>Introduction</a:t>
+            </a:r>
           </a:p>
         </p:txBody>
       </p:sp>
@@ -9858,7 +10223,7 @@
           <p:cNvPr id="3" name="Content Placeholder 2">
             <a:extLst>
               <a:ext uri="{FF2B5EF4-FFF2-40B4-BE49-F238E27FC236}">
-                <a16:creationId xmlns:a16="http://schemas.microsoft.com/office/drawing/2014/main" id="{2D9C1327-5DB1-C658-9BA6-CE87AEC0C5F3}"/>
+                <a16:creationId xmlns:a16="http://schemas.microsoft.com/office/drawing/2014/main" id="{2C52AE82-5EC2-9952-5A70-C0ACA09F30D7}"/>
               </a:ext>
             </a:extLst>
           </p:cNvPr>
@@ -9871,65 +10236,87 @@
         </p:nvSpPr>
         <p:spPr/>
         <p:txBody>
-          <a:bodyPr>
-            <a:normAutofit/>
-          </a:bodyPr>
+          <a:bodyPr/>
           <a:lstStyle/>
           <a:p>
-            <a:r>
-              <a:rPr lang="en-US" dirty="0"/>
-              <a:t>Core objective of this data analysis is to utilize the prediction data of job market and identify the impact of automation in specific jobs in future job market. We will answer the following questions during this analysis,</a:t>
-            </a:r>
-          </a:p>
-          <a:p>
-            <a:pPr marL="285750" indent="-285750">
+            <a:pPr marL="285750" indent="-285750" algn="just">
               <a:buFont typeface="Arial" panose="020B0604020202020204" pitchFamily="34" charset="0"/>
               <a:buChar char="•"/>
             </a:pPr>
             <a:r>
-              <a:rPr lang="en-US" dirty="0"/>
-              <a:t>What is the employment distribution across various sectors/industries?</a:t>
-            </a:r>
-          </a:p>
-          <a:p>
-            <a:pPr marL="285750" indent="-285750">
+              <a:rPr lang="en-US" sz="1800" dirty="0">
+                <a:solidFill>
+                  <a:srgbClr val="374151"/>
+                </a:solidFill>
+              </a:rPr>
+              <a:t>Rapidly changing dynamics of job market</a:t>
+            </a:r>
+          </a:p>
+          <a:p>
+            <a:pPr marL="285750" indent="-285750" algn="just">
               <a:buFont typeface="Arial" panose="020B0604020202020204" pitchFamily="34" charset="0"/>
               <a:buChar char="•"/>
             </a:pPr>
             <a:r>
-              <a:rPr lang="en-US" dirty="0"/>
-              <a:t>What are the fastest growing/declining occupations ?</a:t>
-            </a:r>
-          </a:p>
-          <a:p>
-            <a:pPr marL="285750" indent="-285750">
+              <a:rPr lang="en-US" dirty="0">
+                <a:solidFill>
+                  <a:srgbClr val="374151"/>
+                </a:solidFill>
+              </a:rPr>
+              <a:t>Influence of </a:t>
+            </a:r>
+            <a:r>
+              <a:rPr lang="en-US" sz="1800" dirty="0">
+                <a:solidFill>
+                  <a:srgbClr val="374151"/>
+                </a:solidFill>
+              </a:rPr>
+              <a:t>Technological advancements</a:t>
+            </a:r>
+          </a:p>
+          <a:p>
+            <a:pPr marL="285750" indent="-285750" algn="just">
               <a:buFont typeface="Arial" panose="020B0604020202020204" pitchFamily="34" charset="0"/>
               <a:buChar char="•"/>
             </a:pPr>
             <a:r>
-              <a:rPr lang="en-US" dirty="0"/>
-              <a:t>What is the distribution of the wages for different sectors?</a:t>
-            </a:r>
-          </a:p>
-          <a:p>
-            <a:pPr marL="285750" indent="-285750">
+              <a:rPr lang="en-US" sz="1800" dirty="0">
+                <a:solidFill>
+                  <a:srgbClr val="374151"/>
+                </a:solidFill>
+              </a:rPr>
+              <a:t>Affects on various industries and job roles</a:t>
+            </a:r>
+          </a:p>
+          <a:p>
+            <a:pPr marL="285750" indent="-285750" algn="just">
               <a:buFont typeface="Arial" panose="020B0604020202020204" pitchFamily="34" charset="0"/>
               <a:buChar char="•"/>
             </a:pPr>
-            <a:endParaRPr lang="en-US" dirty="0"/>
-          </a:p>
-          <a:p>
+            <a:r>
+              <a:rPr lang="en-US" dirty="0">
+                <a:solidFill>
+                  <a:srgbClr val="374151"/>
+                </a:solidFill>
+              </a:rPr>
+              <a:t>Need of Impact of Automation on occupations analysis</a:t>
+            </a:r>
             <a:endParaRPr lang="en-US" sz="1800" dirty="0">
-              <a:effectLst/>
-              <a:ea typeface="Times New Roman" panose="02020603050405020304" pitchFamily="18" charset="0"/>
-              <a:cs typeface="Times New Roman" panose="02020603050405020304" pitchFamily="18" charset="0"/>
+              <a:solidFill>
+                <a:srgbClr val="374151"/>
+              </a:solidFill>
             </a:endParaRPr>
           </a:p>
           <a:p>
-            <a:pPr marL="285750" indent="-285750">
-              <a:buFont typeface="Arial" panose="020B0604020202020204" pitchFamily="34" charset="0"/>
-              <a:buChar char="•"/>
-            </a:pPr>
+            <a:pPr algn="just"/>
+            <a:endParaRPr lang="en-US" sz="1800" dirty="0">
+              <a:solidFill>
+                <a:srgbClr val="374151"/>
+              </a:solidFill>
+            </a:endParaRPr>
+          </a:p>
+          <a:p>
+            <a:pPr algn="just"/>
             <a:endParaRPr lang="en-US" dirty="0"/>
           </a:p>
         </p:txBody>
@@ -9937,7 +10324,7 @@
     </p:spTree>
     <p:extLst>
       <p:ext uri="{BB962C8B-B14F-4D97-AF65-F5344CB8AC3E}">
-        <p14:creationId xmlns:p14="http://schemas.microsoft.com/office/powerpoint/2010/main" val="34551194"/>
+        <p14:creationId xmlns:p14="http://schemas.microsoft.com/office/powerpoint/2010/main" val="941120016"/>
       </p:ext>
     </p:extLst>
   </p:cSld>
@@ -9969,7 +10356,7 @@
           <p:cNvPr id="2" name="Title 1">
             <a:extLst>
               <a:ext uri="{FF2B5EF4-FFF2-40B4-BE49-F238E27FC236}">
-                <a16:creationId xmlns:a16="http://schemas.microsoft.com/office/drawing/2014/main" id="{84309D03-67D4-C6B6-E978-487233BDDFF3}"/>
+                <a16:creationId xmlns:a16="http://schemas.microsoft.com/office/drawing/2014/main" id="{7069D3B9-44DE-D658-F543-C1D9F51DF36A}"/>
               </a:ext>
             </a:extLst>
           </p:cNvPr>
@@ -9989,9 +10376,8 @@
             <a:r>
               <a:rPr lang="en-US" b="1" i="0" dirty="0">
                 <a:effectLst/>
-                <a:latin typeface="Söhne"/>
               </a:rPr>
-              <a:t>Objective of Analysis</a:t>
+              <a:t>Objectives</a:t>
             </a:r>
             <a:endParaRPr lang="en-US" dirty="0"/>
           </a:p>
@@ -10002,7 +10388,7 @@
           <p:cNvPr id="3" name="Content Placeholder 2">
             <a:extLst>
               <a:ext uri="{FF2B5EF4-FFF2-40B4-BE49-F238E27FC236}">
-                <a16:creationId xmlns:a16="http://schemas.microsoft.com/office/drawing/2014/main" id="{5B785898-3D3E-6EE7-A6F8-20A53B791C83}"/>
+                <a16:creationId xmlns:a16="http://schemas.microsoft.com/office/drawing/2014/main" id="{2D9C1327-5DB1-C658-9BA6-CE87AEC0C5F3}"/>
               </a:ext>
             </a:extLst>
           </p:cNvPr>
@@ -10016,77 +10402,74 @@
         <p:spPr/>
         <p:txBody>
           <a:bodyPr>
-            <a:normAutofit lnSpcReduction="10000"/>
+            <a:normAutofit/>
           </a:bodyPr>
           <a:lstStyle/>
           <a:p>
-            <a:pPr marL="285750" indent="-285750">
+            <a:pPr algn="just"/>
+            <a:r>
+              <a:rPr lang="en-US" dirty="0"/>
+              <a:t>Core objective of this data analysis is to utilize the prediction data of job market and identify the impact of automation in specific jobs in future job market. We will answer the following questions during this analysis,</a:t>
+            </a:r>
+          </a:p>
+          <a:p>
+            <a:pPr marL="285750" indent="-285750" algn="just">
               <a:buFont typeface="Arial" panose="020B0604020202020204" pitchFamily="34" charset="0"/>
               <a:buChar char="•"/>
             </a:pPr>
             <a:r>
               <a:rPr lang="en-US" dirty="0"/>
-              <a:t>What are the jobs that are affected the most due to automation</a:t>
-            </a:r>
-          </a:p>
-          <a:p>
-            <a:pPr marL="285750" indent="-285750">
+              <a:t>What is the employment distribution across various sectors/industries?</a:t>
+            </a:r>
+          </a:p>
+          <a:p>
+            <a:pPr marL="285750" indent="-285750" algn="just">
               <a:buFont typeface="Arial" panose="020B0604020202020204" pitchFamily="34" charset="0"/>
               <a:buChar char="•"/>
             </a:pPr>
             <a:r>
               <a:rPr lang="en-US" dirty="0"/>
-              <a:t>What will be the impact of automation on each ethnicity. </a:t>
-            </a:r>
-          </a:p>
-          <a:p>
-            <a:pPr marL="285750" indent="-285750">
+              <a:t>What are the fastest growing/declining occupations ?</a:t>
+            </a:r>
+          </a:p>
+          <a:p>
+            <a:pPr marL="285750" indent="-285750" algn="just">
               <a:buFont typeface="Arial" panose="020B0604020202020204" pitchFamily="34" charset="0"/>
               <a:buChar char="•"/>
             </a:pPr>
             <a:r>
               <a:rPr lang="en-US" dirty="0"/>
-              <a:t>What are the employment prospects for the job seekers who have lost their jobs due to automation?</a:t>
-            </a:r>
-          </a:p>
-          <a:p>
-            <a:pPr marL="285750" indent="-285750">
+              <a:t>What is the distribution of the wages for different sectors?</a:t>
+            </a:r>
+          </a:p>
+          <a:p>
+            <a:pPr marL="285750" indent="-285750" algn="just">
               <a:buFont typeface="Arial" panose="020B0604020202020204" pitchFamily="34" charset="0"/>
               <a:buChar char="•"/>
             </a:pPr>
-            <a:r>
-              <a:rPr lang="en-US" dirty="0"/>
-              <a:t>Map displaying the states with booming employment </a:t>
-            </a:r>
-          </a:p>
-          <a:p>
-            <a:pPr marL="285750" indent="-285750">
+            <a:endParaRPr lang="en-US" dirty="0"/>
+          </a:p>
+          <a:p>
+            <a:pPr algn="just"/>
+            <a:endParaRPr lang="en-US" sz="1800" dirty="0">
+              <a:effectLst/>
+              <a:ea typeface="Times New Roman" panose="02020603050405020304" pitchFamily="18" charset="0"/>
+              <a:cs typeface="Times New Roman" panose="02020603050405020304" pitchFamily="18" charset="0"/>
+            </a:endParaRPr>
+          </a:p>
+          <a:p>
+            <a:pPr marL="285750" indent="-285750" algn="just">
               <a:buFont typeface="Arial" panose="020B0604020202020204" pitchFamily="34" charset="0"/>
               <a:buChar char="•"/>
             </a:pPr>
-            <a:r>
-              <a:rPr lang="en-US" dirty="0"/>
-              <a:t>Are the jobs being lost to automation lower or higher paying than other jobs available</a:t>
-            </a:r>
-          </a:p>
-          <a:p>
-            <a:pPr marL="285750" indent="-285750">
-              <a:buFont typeface="Arial" panose="020B0604020202020204" pitchFamily="34" charset="0"/>
-              <a:buChar char="•"/>
-            </a:pPr>
-            <a:endParaRPr lang="en-US" dirty="0">
-              <a:solidFill>
-                <a:srgbClr val="222222"/>
-              </a:solidFill>
-              <a:latin typeface="Arial" panose="020B0604020202020204" pitchFamily="34" charset="0"/>
-            </a:endParaRPr>
+            <a:endParaRPr lang="en-US" dirty="0"/>
           </a:p>
         </p:txBody>
       </p:sp>
     </p:spTree>
     <p:extLst>
       <p:ext uri="{BB962C8B-B14F-4D97-AF65-F5344CB8AC3E}">
-        <p14:creationId xmlns:p14="http://schemas.microsoft.com/office/powerpoint/2010/main" val="3173031761"/>
+        <p14:creationId xmlns:p14="http://schemas.microsoft.com/office/powerpoint/2010/main" val="34551194"/>
       </p:ext>
     </p:extLst>
   </p:cSld>
@@ -10118,7 +10501,7 @@
           <p:cNvPr id="2" name="Title 1">
             <a:extLst>
               <a:ext uri="{FF2B5EF4-FFF2-40B4-BE49-F238E27FC236}">
-                <a16:creationId xmlns:a16="http://schemas.microsoft.com/office/drawing/2014/main" id="{628525FC-DFBF-9396-F370-484A5A9337C3}"/>
+                <a16:creationId xmlns:a16="http://schemas.microsoft.com/office/drawing/2014/main" id="{84309D03-67D4-C6B6-E978-487233BDDFF3}"/>
               </a:ext>
             </a:extLst>
           </p:cNvPr>
@@ -10136,8 +10519,14 @@
           <a:p>
             <a:pPr algn="ctr"/>
             <a:r>
+              <a:rPr lang="en-US" b="1" i="0" dirty="0">
+                <a:effectLst/>
+              </a:rPr>
+              <a:t>Objective</a:t>
+            </a:r>
+            <a:r>
               <a:rPr lang="en-US" dirty="0"/>
-              <a:t>Data Source</a:t>
+              <a:t>s</a:t>
             </a:r>
           </a:p>
         </p:txBody>
@@ -10147,7 +10536,7 @@
           <p:cNvPr id="3" name="Content Placeholder 2">
             <a:extLst>
               <a:ext uri="{FF2B5EF4-FFF2-40B4-BE49-F238E27FC236}">
-                <a16:creationId xmlns:a16="http://schemas.microsoft.com/office/drawing/2014/main" id="{FF5F1A34-F58E-C6A8-0726-BEA2434DC815}"/>
+                <a16:creationId xmlns:a16="http://schemas.microsoft.com/office/drawing/2014/main" id="{5B785898-3D3E-6EE7-A6F8-20A53B791C83}"/>
               </a:ext>
             </a:extLst>
           </p:cNvPr>
@@ -10158,270 +10547,80 @@
             <p:ph idx="1"/>
           </p:nvPr>
         </p:nvSpPr>
-        <p:spPr>
-          <a:xfrm>
-            <a:off x="1920240" y="2312276"/>
-            <a:ext cx="8770571" cy="4103504"/>
-          </a:xfrm>
-        </p:spPr>
+        <p:spPr/>
         <p:txBody>
           <a:bodyPr>
-            <a:normAutofit fontScale="85000" lnSpcReduction="20000"/>
+            <a:normAutofit lnSpcReduction="10000"/>
           </a:bodyPr>
           <a:lstStyle/>
           <a:p>
-            <a:pPr marL="285750" indent="-285750">
+            <a:pPr marL="285750" indent="-285750" algn="just">
               <a:buFont typeface="Arial" panose="020B0604020202020204" pitchFamily="34" charset="0"/>
               <a:buChar char="•"/>
             </a:pPr>
             <a:r>
-              <a:rPr lang="en-US" sz="1800" dirty="0">
-                <a:solidFill>
-                  <a:srgbClr val="0070C0"/>
-                </a:solidFill>
-                <a:hlinkClick r:id="rId2">
-                  <a:extLst>
-                    <a:ext uri="{A12FA001-AC4F-418D-AE19-62706E023703}">
-                      <ahyp:hlinkClr xmlns:ahyp="http://schemas.microsoft.com/office/drawing/2018/hyperlinkcolor" val="tx"/>
-                    </a:ext>
-                  </a:extLst>
-                </a:hlinkClick>
-              </a:rPr>
-              <a:t>https://www.bls.gov/emp/tables/occupational-projections-and-characteristics.htm</a:t>
-            </a:r>
-            <a:endParaRPr lang="en-US" sz="1800" dirty="0">
-              <a:solidFill>
-                <a:srgbClr val="0070C0"/>
-              </a:solidFill>
-            </a:endParaRPr>
-          </a:p>
-          <a:p>
-            <a:pPr marL="285750" indent="-285750">
+              <a:rPr lang="en-US" dirty="0"/>
+              <a:t>What are the jobs that are affected the most due to automation</a:t>
+            </a:r>
+          </a:p>
+          <a:p>
+            <a:pPr marL="285750" indent="-285750" algn="just">
               <a:buFont typeface="Arial" panose="020B0604020202020204" pitchFamily="34" charset="0"/>
               <a:buChar char="•"/>
             </a:pPr>
             <a:r>
-              <a:rPr lang="en-US" sz="1800" dirty="0">
-                <a:solidFill>
-                  <a:srgbClr val="0070C0"/>
-                </a:solidFill>
-                <a:hlinkClick r:id="rId3">
-                  <a:extLst>
-                    <a:ext uri="{A12FA001-AC4F-418D-AE19-62706E023703}">
-                      <ahyp:hlinkClr xmlns:ahyp="http://schemas.microsoft.com/office/drawing/2018/hyperlinkcolor" val="tx"/>
-                    </a:ext>
-                  </a:extLst>
-                </a:hlinkClick>
-              </a:rPr>
-              <a:t>https://www.bls.gov/oes/current/oes_nat.htm#17-0000</a:t>
-            </a:r>
-            <a:endParaRPr lang="en-US" sz="1800" dirty="0">
-              <a:solidFill>
-                <a:srgbClr val="0070C0"/>
-              </a:solidFill>
-            </a:endParaRPr>
-          </a:p>
-          <a:p>
-            <a:pPr marL="285750" indent="-285750">
+              <a:rPr lang="en-US" dirty="0"/>
+              <a:t>What will be the impact of automation on each ethnicity. </a:t>
+            </a:r>
+          </a:p>
+          <a:p>
+            <a:pPr marL="285750" indent="-285750" algn="just">
               <a:buFont typeface="Arial" panose="020B0604020202020204" pitchFamily="34" charset="0"/>
               <a:buChar char="•"/>
             </a:pPr>
             <a:r>
-              <a:rPr lang="en-US" sz="1800" kern="100" dirty="0">
-                <a:solidFill>
-                  <a:srgbClr val="0070C0"/>
-                </a:solidFill>
-                <a:effectLst/>
-                <a:latin typeface="Calibri" panose="020F0502020204030204" pitchFamily="34" charset="0"/>
-                <a:ea typeface="Calibri" panose="020F0502020204030204" pitchFamily="34" charset="0"/>
-                <a:cs typeface="Times New Roman" panose="02020603050405020304" pitchFamily="18" charset="0"/>
-                <a:hlinkClick r:id="rId4">
-                  <a:extLst>
-                    <a:ext uri="{A12FA001-AC4F-418D-AE19-62706E023703}">
-                      <ahyp:hlinkClr xmlns:ahyp="http://schemas.microsoft.com/office/drawing/2018/hyperlinkcolor" val="tx"/>
-                    </a:ext>
-                  </a:extLst>
-                </a:hlinkClick>
-              </a:rPr>
-              <a:t>https://www.bls.gov/emp/tables/occupational-separations-and-openings.htm</a:t>
-            </a:r>
-            <a:endParaRPr lang="en-US" sz="1800" kern="100" dirty="0">
-              <a:solidFill>
-                <a:srgbClr val="0070C0"/>
-              </a:solidFill>
-              <a:effectLst/>
-              <a:latin typeface="Calibri" panose="020F0502020204030204" pitchFamily="34" charset="0"/>
-              <a:ea typeface="Calibri" panose="020F0502020204030204" pitchFamily="34" charset="0"/>
-              <a:cs typeface="Times New Roman" panose="02020603050405020304" pitchFamily="18" charset="0"/>
-            </a:endParaRPr>
-          </a:p>
-          <a:p>
-            <a:pPr marL="285750" indent="-285750">
+              <a:rPr lang="en-US" dirty="0"/>
+              <a:t>What are the employment prospects for the job seekers who have lost their jobs due to automation?</a:t>
+            </a:r>
+          </a:p>
+          <a:p>
+            <a:pPr marL="285750" indent="-285750" algn="just">
               <a:buFont typeface="Arial" panose="020B0604020202020204" pitchFamily="34" charset="0"/>
               <a:buChar char="•"/>
             </a:pPr>
             <a:r>
-              <a:rPr lang="en-US" sz="1800" u="sng" kern="0" dirty="0">
-                <a:solidFill>
-                  <a:srgbClr val="0070C0"/>
-                </a:solidFill>
-                <a:effectLst/>
-                <a:latin typeface="Arial" panose="020B0604020202020204" pitchFamily="34" charset="0"/>
-                <a:ea typeface="Times New Roman" panose="02020603050405020304" pitchFamily="18" charset="0"/>
-                <a:cs typeface="Times New Roman" panose="02020603050405020304" pitchFamily="18" charset="0"/>
-                <a:hlinkClick r:id="rId5">
-                  <a:extLst>
-                    <a:ext uri="{A12FA001-AC4F-418D-AE19-62706E023703}">
-                      <ahyp:hlinkClr xmlns:ahyp="http://schemas.microsoft.com/office/drawing/2018/hyperlinkcolor" val="tx"/>
-                    </a:ext>
-                  </a:extLst>
-                </a:hlinkClick>
-              </a:rPr>
-              <a:t>https://www.bls.gov/emp/tables/unemployment-earnings-education.htm</a:t>
-            </a:r>
-            <a:endParaRPr lang="en-US" sz="1800" dirty="0">
-              <a:solidFill>
-                <a:srgbClr val="0070C0"/>
-              </a:solidFill>
-            </a:endParaRPr>
-          </a:p>
-          <a:p>
-            <a:pPr marL="285750" indent="-285750">
+              <a:rPr lang="en-US" dirty="0"/>
+              <a:t>Map displaying the states with booming employment </a:t>
+            </a:r>
+          </a:p>
+          <a:p>
+            <a:pPr marL="285750" indent="-285750" algn="just">
               <a:buFont typeface="Arial" panose="020B0604020202020204" pitchFamily="34" charset="0"/>
               <a:buChar char="•"/>
             </a:pPr>
             <a:r>
-              <a:rPr lang="en-US" sz="1800" u="sng" kern="0" dirty="0">
-                <a:solidFill>
-                  <a:srgbClr val="0070C0"/>
-                </a:solidFill>
-                <a:effectLst/>
-                <a:latin typeface="Arial" panose="020B0604020202020204" pitchFamily="34" charset="0"/>
-                <a:ea typeface="Times New Roman" panose="02020603050405020304" pitchFamily="18" charset="0"/>
-                <a:cs typeface="Times New Roman" panose="02020603050405020304" pitchFamily="18" charset="0"/>
-                <a:hlinkClick r:id="rId6">
-                  <a:extLst>
-                    <a:ext uri="{A12FA001-AC4F-418D-AE19-62706E023703}">
-                      <ahyp:hlinkClr xmlns:ahyp="http://schemas.microsoft.com/office/drawing/2018/hyperlinkcolor" val="tx"/>
-                    </a:ext>
-                  </a:extLst>
-                </a:hlinkClick>
-              </a:rPr>
-              <a:t>https://www.kaggle.com/datasets/andrewmvd/occupation-salary-and-likelihood-of-automation/</a:t>
-            </a:r>
-            <a:endParaRPr lang="en-US" sz="1800" kern="100" dirty="0">
-              <a:solidFill>
-                <a:srgbClr val="0070C0"/>
-              </a:solidFill>
-              <a:effectLst/>
-              <a:latin typeface="Calibri" panose="020F0502020204030204" pitchFamily="34" charset="0"/>
-              <a:ea typeface="Calibri" panose="020F0502020204030204" pitchFamily="34" charset="0"/>
-              <a:cs typeface="Times New Roman" panose="02020603050405020304" pitchFamily="18" charset="0"/>
-            </a:endParaRPr>
-          </a:p>
-          <a:p>
-            <a:pPr marL="285750" indent="-285750">
+              <a:rPr lang="en-US" dirty="0"/>
+              <a:t>Are the jobs being lost to automation lower or higher paying than other jobs available</a:t>
+            </a:r>
+          </a:p>
+          <a:p>
+            <a:pPr marL="285750" indent="-285750" algn="just">
               <a:buFont typeface="Arial" panose="020B0604020202020204" pitchFamily="34" charset="0"/>
               <a:buChar char="•"/>
             </a:pPr>
-            <a:r>
-              <a:rPr lang="en-US" sz="1800" kern="0" dirty="0">
-                <a:solidFill>
-                  <a:srgbClr val="0070C0"/>
-                </a:solidFill>
-                <a:effectLst/>
-                <a:latin typeface="Arial" panose="020B0604020202020204" pitchFamily="34" charset="0"/>
-                <a:ea typeface="Times New Roman" panose="02020603050405020304" pitchFamily="18" charset="0"/>
-                <a:cs typeface="Times New Roman" panose="02020603050405020304" pitchFamily="18" charset="0"/>
-              </a:rPr>
-              <a:t>Article: </a:t>
-            </a:r>
-            <a:r>
-              <a:rPr lang="en-US" sz="1800" u="sng" kern="0" dirty="0">
-                <a:solidFill>
-                  <a:srgbClr val="0070C0"/>
-                </a:solidFill>
-                <a:effectLst/>
-                <a:latin typeface="Arial" panose="020B0604020202020204" pitchFamily="34" charset="0"/>
-                <a:ea typeface="Times New Roman" panose="02020603050405020304" pitchFamily="18" charset="0"/>
-                <a:cs typeface="Times New Roman" panose="02020603050405020304" pitchFamily="18" charset="0"/>
-                <a:hlinkClick r:id="rId7">
-                  <a:extLst>
-                    <a:ext uri="{A12FA001-AC4F-418D-AE19-62706E023703}">
-                      <ahyp:hlinkClr xmlns:ahyp="http://schemas.microsoft.com/office/drawing/2018/hyperlinkcolor" val="tx"/>
-                    </a:ext>
-                  </a:extLst>
-                </a:hlinkClick>
-              </a:rPr>
-              <a:t>oxfordmartin.ox.ac.uk/downloads/academic/The_Future_of_Employment.pdf</a:t>
-            </a:r>
-            <a:endParaRPr lang="en-US" sz="1800" u="sng" kern="0" dirty="0">
+            <a:endParaRPr lang="en-US" dirty="0">
               <a:solidFill>
-                <a:srgbClr val="0070C0"/>
+                <a:srgbClr val="222222"/>
               </a:solidFill>
-              <a:effectLst/>
               <a:latin typeface="Arial" panose="020B0604020202020204" pitchFamily="34" charset="0"/>
-              <a:ea typeface="Times New Roman" panose="02020603050405020304" pitchFamily="18" charset="0"/>
-              <a:cs typeface="Times New Roman" panose="02020603050405020304" pitchFamily="18" charset="0"/>
             </a:endParaRPr>
-          </a:p>
-          <a:p>
-            <a:pPr marL="285750" indent="-285750">
-              <a:buFont typeface="Arial" panose="020B0604020202020204" pitchFamily="34" charset="0"/>
-              <a:buChar char="•"/>
-            </a:pPr>
-            <a:r>
-              <a:rPr lang="en-US" sz="1800" b="0" dirty="0">
-                <a:solidFill>
-                  <a:srgbClr val="0070C0"/>
-                </a:solidFill>
-                <a:effectLst/>
-              </a:rPr>
-              <a:t>BLS Public Data API</a:t>
-            </a:r>
-          </a:p>
-          <a:p>
-            <a:pPr marL="285750" indent="-285750">
-              <a:lnSpc>
-                <a:spcPct val="120000"/>
-              </a:lnSpc>
-              <a:buFont typeface="Arial" panose="020B0604020202020204" pitchFamily="34" charset="0"/>
-              <a:buChar char="•"/>
-            </a:pPr>
-            <a:r>
-              <a:rPr lang="en-US" sz="1800" dirty="0">
-                <a:solidFill>
-                  <a:srgbClr val="0070C0"/>
-                </a:solidFill>
-              </a:rPr>
-              <a:t>"https://api.bls.gov/</a:t>
-            </a:r>
-            <a:r>
-              <a:rPr lang="en-US" sz="1800" dirty="0" err="1">
-                <a:solidFill>
-                  <a:srgbClr val="0070C0"/>
-                </a:solidFill>
-              </a:rPr>
-              <a:t>publicAPI</a:t>
-            </a:r>
-            <a:r>
-              <a:rPr lang="en-US" sz="1800" dirty="0">
-                <a:solidFill>
-                  <a:srgbClr val="0070C0"/>
-                </a:solidFill>
-              </a:rPr>
-              <a:t>/v2/"</a:t>
-            </a:r>
-          </a:p>
-          <a:p>
-            <a:endParaRPr lang="en-US" dirty="0"/>
           </a:p>
         </p:txBody>
       </p:sp>
     </p:spTree>
     <p:extLst>
       <p:ext uri="{BB962C8B-B14F-4D97-AF65-F5344CB8AC3E}">
-        <p14:creationId xmlns:p14="http://schemas.microsoft.com/office/powerpoint/2010/main" val="347237258"/>
+        <p14:creationId xmlns:p14="http://schemas.microsoft.com/office/powerpoint/2010/main" val="3173031761"/>
       </p:ext>
     </p:extLst>
   </p:cSld>
@@ -10453,7 +10652,7 @@
           <p:cNvPr id="2" name="Title 1">
             <a:extLst>
               <a:ext uri="{FF2B5EF4-FFF2-40B4-BE49-F238E27FC236}">
-                <a16:creationId xmlns:a16="http://schemas.microsoft.com/office/drawing/2014/main" id="{61782D0F-A29A-C296-4971-9E9E95450782}"/>
+                <a16:creationId xmlns:a16="http://schemas.microsoft.com/office/drawing/2014/main" id="{628525FC-DFBF-9396-F370-484A5A9337C3}"/>
               </a:ext>
             </a:extLst>
           </p:cNvPr>
@@ -10466,12 +10665,15 @@
         </p:nvSpPr>
         <p:spPr/>
         <p:txBody>
-          <a:bodyPr/>
+          <a:bodyPr>
+            <a:normAutofit/>
+          </a:bodyPr>
           <a:lstStyle/>
           <a:p>
+            <a:pPr algn="ctr"/>
             <a:r>
               <a:rPr lang="en-US" dirty="0"/>
-              <a:t>Modeling the Data for analysis</a:t>
+              <a:t>Data Source</a:t>
             </a:r>
           </a:p>
         </p:txBody>
@@ -10481,7 +10683,7 @@
           <p:cNvPr id="3" name="Content Placeholder 2">
             <a:extLst>
               <a:ext uri="{FF2B5EF4-FFF2-40B4-BE49-F238E27FC236}">
-                <a16:creationId xmlns:a16="http://schemas.microsoft.com/office/drawing/2014/main" id="{515408FA-6489-583C-1BA3-E459DC41372F}"/>
+                <a16:creationId xmlns:a16="http://schemas.microsoft.com/office/drawing/2014/main" id="{FF5F1A34-F58E-C6A8-0726-BEA2434DC815}"/>
               </a:ext>
             </a:extLst>
           </p:cNvPr>
@@ -10492,22 +10694,279 @@
             <p:ph idx="1"/>
           </p:nvPr>
         </p:nvSpPr>
-        <p:spPr/>
-        <p:txBody>
-          <a:bodyPr/>
+        <p:spPr>
+          <a:xfrm>
+            <a:off x="1161288" y="2312276"/>
+            <a:ext cx="10844784" cy="4545724"/>
+          </a:xfrm>
+        </p:spPr>
+        <p:txBody>
+          <a:bodyPr>
+            <a:noAutofit/>
+          </a:bodyPr>
           <a:lstStyle/>
           <a:p>
-            <a:r>
-              <a:rPr lang="en-US" dirty="0"/>
-              <a:t>Here we will mention how we modeled the dataset for our analysis.</a:t>
-            </a:r>
+            <a:pPr marL="285750" indent="-285750">
+              <a:buFont typeface="Arial" panose="020B0604020202020204" pitchFamily="34" charset="0"/>
+              <a:buChar char="•"/>
+            </a:pPr>
+            <a:r>
+              <a:rPr lang="en-US" sz="1600" dirty="0">
+                <a:solidFill>
+                  <a:srgbClr val="0070C0"/>
+                </a:solidFill>
+                <a:latin typeface="+mj-lt"/>
+                <a:hlinkClick r:id="rId2">
+                  <a:extLst>
+                    <a:ext uri="{A12FA001-AC4F-418D-AE19-62706E023703}">
+                      <ahyp:hlinkClr xmlns:ahyp="http://schemas.microsoft.com/office/drawing/2018/hyperlinkcolor" val="tx"/>
+                    </a:ext>
+                  </a:extLst>
+                </a:hlinkClick>
+              </a:rPr>
+              <a:t>https://www.bls.gov/emp/tables/occupational-projections-and-characteristics.htm</a:t>
+            </a:r>
+            <a:endParaRPr lang="en-US" sz="1600" dirty="0">
+              <a:solidFill>
+                <a:srgbClr val="0070C0"/>
+              </a:solidFill>
+              <a:latin typeface="+mj-lt"/>
+            </a:endParaRPr>
+          </a:p>
+          <a:p>
+            <a:pPr marL="285750" indent="-285750">
+              <a:buFont typeface="Arial" panose="020B0604020202020204" pitchFamily="34" charset="0"/>
+              <a:buChar char="•"/>
+            </a:pPr>
+            <a:r>
+              <a:rPr lang="en-US" sz="1600" dirty="0">
+                <a:solidFill>
+                  <a:srgbClr val="0070C0"/>
+                </a:solidFill>
+                <a:latin typeface="+mj-lt"/>
+                <a:hlinkClick r:id="rId3">
+                  <a:extLst>
+                    <a:ext uri="{A12FA001-AC4F-418D-AE19-62706E023703}">
+                      <ahyp:hlinkClr xmlns:ahyp="http://schemas.microsoft.com/office/drawing/2018/hyperlinkcolor" val="tx"/>
+                    </a:ext>
+                  </a:extLst>
+                </a:hlinkClick>
+              </a:rPr>
+              <a:t>https://www.bls.gov/oes/current/oes_nat.htm#17-0000</a:t>
+            </a:r>
+            <a:endParaRPr lang="en-US" sz="1600" dirty="0">
+              <a:solidFill>
+                <a:srgbClr val="0070C0"/>
+              </a:solidFill>
+              <a:latin typeface="+mj-lt"/>
+            </a:endParaRPr>
+          </a:p>
+          <a:p>
+            <a:pPr marL="285750" indent="-285750">
+              <a:buFont typeface="Arial" panose="020B0604020202020204" pitchFamily="34" charset="0"/>
+              <a:buChar char="•"/>
+            </a:pPr>
+            <a:r>
+              <a:rPr lang="en-US" sz="1600" kern="100" dirty="0">
+                <a:solidFill>
+                  <a:srgbClr val="0070C0"/>
+                </a:solidFill>
+                <a:effectLst/>
+                <a:latin typeface="+mj-lt"/>
+                <a:ea typeface="Calibri" panose="020F0502020204030204" pitchFamily="34" charset="0"/>
+                <a:cs typeface="Times New Roman" panose="02020603050405020304" pitchFamily="18" charset="0"/>
+                <a:hlinkClick r:id="rId4">
+                  <a:extLst>
+                    <a:ext uri="{A12FA001-AC4F-418D-AE19-62706E023703}">
+                      <ahyp:hlinkClr xmlns:ahyp="http://schemas.microsoft.com/office/drawing/2018/hyperlinkcolor" val="tx"/>
+                    </a:ext>
+                  </a:extLst>
+                </a:hlinkClick>
+              </a:rPr>
+              <a:t>https://www.bls.gov/emp/tables/occupational-separations-and-openings.htm</a:t>
+            </a:r>
+            <a:endParaRPr lang="en-US" sz="1600" kern="100" dirty="0">
+              <a:solidFill>
+                <a:srgbClr val="0070C0"/>
+              </a:solidFill>
+              <a:effectLst/>
+              <a:latin typeface="+mj-lt"/>
+              <a:ea typeface="Calibri" panose="020F0502020204030204" pitchFamily="34" charset="0"/>
+              <a:cs typeface="Times New Roman" panose="02020603050405020304" pitchFamily="18" charset="0"/>
+            </a:endParaRPr>
+          </a:p>
+          <a:p>
+            <a:pPr marL="285750" indent="-285750">
+              <a:buFont typeface="Arial" panose="020B0604020202020204" pitchFamily="34" charset="0"/>
+              <a:buChar char="•"/>
+            </a:pPr>
+            <a:r>
+              <a:rPr lang="en-US" sz="1600" u="sng" kern="0" dirty="0">
+                <a:solidFill>
+                  <a:srgbClr val="0070C0"/>
+                </a:solidFill>
+                <a:effectLst/>
+                <a:latin typeface="+mj-lt"/>
+                <a:ea typeface="Times New Roman" panose="02020603050405020304" pitchFamily="18" charset="0"/>
+                <a:cs typeface="Times New Roman" panose="02020603050405020304" pitchFamily="18" charset="0"/>
+                <a:hlinkClick r:id="rId5">
+                  <a:extLst>
+                    <a:ext uri="{A12FA001-AC4F-418D-AE19-62706E023703}">
+                      <ahyp:hlinkClr xmlns:ahyp="http://schemas.microsoft.com/office/drawing/2018/hyperlinkcolor" val="tx"/>
+                    </a:ext>
+                  </a:extLst>
+                </a:hlinkClick>
+              </a:rPr>
+              <a:t>https://www.bls.gov/emp/tables/unemployment-earnings-education.htm</a:t>
+            </a:r>
+            <a:endParaRPr lang="en-US" sz="1600" dirty="0">
+              <a:solidFill>
+                <a:srgbClr val="0070C0"/>
+              </a:solidFill>
+              <a:latin typeface="+mj-lt"/>
+            </a:endParaRPr>
+          </a:p>
+          <a:p>
+            <a:pPr marL="285750" indent="-285750">
+              <a:buFont typeface="Arial" panose="020B0604020202020204" pitchFamily="34" charset="0"/>
+              <a:buChar char="•"/>
+            </a:pPr>
+            <a:r>
+              <a:rPr lang="en-US" sz="1600" u="sng" kern="0" dirty="0">
+                <a:solidFill>
+                  <a:srgbClr val="0070C0"/>
+                </a:solidFill>
+                <a:effectLst/>
+                <a:latin typeface="+mj-lt"/>
+                <a:ea typeface="Times New Roman" panose="02020603050405020304" pitchFamily="18" charset="0"/>
+                <a:cs typeface="Times New Roman" panose="02020603050405020304" pitchFamily="18" charset="0"/>
+                <a:hlinkClick r:id="rId6">
+                  <a:extLst>
+                    <a:ext uri="{A12FA001-AC4F-418D-AE19-62706E023703}">
+                      <ahyp:hlinkClr xmlns:ahyp="http://schemas.microsoft.com/office/drawing/2018/hyperlinkcolor" val="tx"/>
+                    </a:ext>
+                  </a:extLst>
+                </a:hlinkClick>
+              </a:rPr>
+              <a:t>https://www.kaggle.com/datasets/andrewmvd/occupation-salary-and-likelihood-of-automation/</a:t>
+            </a:r>
+            <a:endParaRPr lang="en-US" sz="1600" kern="100" dirty="0">
+              <a:solidFill>
+                <a:srgbClr val="0070C0"/>
+              </a:solidFill>
+              <a:effectLst/>
+              <a:latin typeface="+mj-lt"/>
+              <a:ea typeface="Calibri" panose="020F0502020204030204" pitchFamily="34" charset="0"/>
+              <a:cs typeface="Times New Roman" panose="02020603050405020304" pitchFamily="18" charset="0"/>
+            </a:endParaRPr>
+          </a:p>
+          <a:p>
+            <a:pPr marL="285750" indent="-285750">
+              <a:buFont typeface="Arial" panose="020B0604020202020204" pitchFamily="34" charset="0"/>
+              <a:buChar char="•"/>
+            </a:pPr>
+            <a:r>
+              <a:rPr lang="en-US" sz="1600" kern="0" dirty="0">
+                <a:solidFill>
+                  <a:srgbClr val="0070C0"/>
+                </a:solidFill>
+                <a:effectLst/>
+                <a:latin typeface="+mj-lt"/>
+                <a:ea typeface="Times New Roman" panose="02020603050405020304" pitchFamily="18" charset="0"/>
+                <a:cs typeface="Times New Roman" panose="02020603050405020304" pitchFamily="18" charset="0"/>
+              </a:rPr>
+              <a:t>Article: </a:t>
+            </a:r>
+            <a:r>
+              <a:rPr lang="en-US" sz="1600" u="sng" kern="0" dirty="0">
+                <a:solidFill>
+                  <a:srgbClr val="0070C0"/>
+                </a:solidFill>
+                <a:effectLst/>
+                <a:latin typeface="+mj-lt"/>
+                <a:ea typeface="Times New Roman" panose="02020603050405020304" pitchFamily="18" charset="0"/>
+                <a:cs typeface="Times New Roman" panose="02020603050405020304" pitchFamily="18" charset="0"/>
+                <a:hlinkClick r:id="rId7">
+                  <a:extLst>
+                    <a:ext uri="{A12FA001-AC4F-418D-AE19-62706E023703}">
+                      <ahyp:hlinkClr xmlns:ahyp="http://schemas.microsoft.com/office/drawing/2018/hyperlinkcolor" val="tx"/>
+                    </a:ext>
+                  </a:extLst>
+                </a:hlinkClick>
+              </a:rPr>
+              <a:t>oxfordmartin.ox.ac.uk/downloads/academic/The_Future_of_Employment.pdf</a:t>
+            </a:r>
+            <a:endParaRPr lang="en-US" sz="1600" u="sng" kern="0" dirty="0">
+              <a:solidFill>
+                <a:srgbClr val="0070C0"/>
+              </a:solidFill>
+              <a:effectLst/>
+              <a:latin typeface="+mj-lt"/>
+              <a:ea typeface="Times New Roman" panose="02020603050405020304" pitchFamily="18" charset="0"/>
+              <a:cs typeface="Times New Roman" panose="02020603050405020304" pitchFamily="18" charset="0"/>
+            </a:endParaRPr>
+          </a:p>
+          <a:p>
+            <a:pPr marL="285750" indent="-285750">
+              <a:buFont typeface="Arial" panose="020B0604020202020204" pitchFamily="34" charset="0"/>
+              <a:buChar char="•"/>
+            </a:pPr>
+            <a:r>
+              <a:rPr lang="en-US" sz="1600" b="0" dirty="0">
+                <a:solidFill>
+                  <a:srgbClr val="0070C0"/>
+                </a:solidFill>
+                <a:effectLst/>
+                <a:latin typeface="+mj-lt"/>
+              </a:rPr>
+              <a:t>BLS Public Data API</a:t>
+            </a:r>
+          </a:p>
+          <a:p>
+            <a:pPr marL="285750" indent="-285750">
+              <a:lnSpc>
+                <a:spcPct val="120000"/>
+              </a:lnSpc>
+              <a:buFont typeface="Arial" panose="020B0604020202020204" pitchFamily="34" charset="0"/>
+              <a:buChar char="•"/>
+            </a:pPr>
+            <a:r>
+              <a:rPr lang="en-US" sz="1600" dirty="0">
+                <a:solidFill>
+                  <a:srgbClr val="0070C0"/>
+                </a:solidFill>
+                <a:latin typeface="+mj-lt"/>
+              </a:rPr>
+              <a:t>"https://api.bls.gov/</a:t>
+            </a:r>
+            <a:r>
+              <a:rPr lang="en-US" sz="1600" dirty="0" err="1">
+                <a:solidFill>
+                  <a:srgbClr val="0070C0"/>
+                </a:solidFill>
+                <a:latin typeface="+mj-lt"/>
+              </a:rPr>
+              <a:t>publicAPI</a:t>
+            </a:r>
+            <a:r>
+              <a:rPr lang="en-US" sz="1600" dirty="0">
+                <a:solidFill>
+                  <a:srgbClr val="0070C0"/>
+                </a:solidFill>
+                <a:latin typeface="+mj-lt"/>
+              </a:rPr>
+              <a:t>/v2/"</a:t>
+            </a:r>
+          </a:p>
+          <a:p>
+            <a:endParaRPr lang="en-US" sz="1600" dirty="0"/>
           </a:p>
         </p:txBody>
       </p:sp>
     </p:spTree>
     <p:extLst>
       <p:ext uri="{BB962C8B-B14F-4D97-AF65-F5344CB8AC3E}">
-        <p14:creationId xmlns:p14="http://schemas.microsoft.com/office/powerpoint/2010/main" val="1050294836"/>
+        <p14:creationId xmlns:p14="http://schemas.microsoft.com/office/powerpoint/2010/main" val="347237258"/>
       </p:ext>
     </p:extLst>
   </p:cSld>
@@ -10553,16 +11012,15 @@
         <p:spPr/>
         <p:txBody>
           <a:bodyPr>
-            <a:normAutofit fontScale="90000"/>
+            <a:noAutofit/>
           </a:bodyPr>
           <a:lstStyle/>
           <a:p>
             <a:pPr algn="ctr"/>
             <a:r>
-              <a:rPr lang="en-US" sz="3200" dirty="0"/>
+              <a:rPr lang="en-US" dirty="0"/>
               <a:t>Data Processing – Cleaning &amp; transformation</a:t>
             </a:r>
-            <a:endParaRPr lang="en-US" dirty="0"/>
           </a:p>
         </p:txBody>
       </p:sp>
@@ -10587,7 +11045,7 @@
           <a:bodyPr/>
           <a:lstStyle/>
           <a:p>
-            <a:pPr marL="285750" indent="-285750">
+            <a:pPr marL="285750" indent="-285750" algn="just">
               <a:buFont typeface="Arial" panose="020B0604020202020204" pitchFamily="34" charset="0"/>
               <a:buChar char="•"/>
             </a:pPr>
@@ -10597,7 +11055,7 @@
             </a:r>
           </a:p>
           <a:p>
-            <a:pPr marL="285750" indent="-285750">
+            <a:pPr marL="285750" indent="-285750" algn="just">
               <a:buFont typeface="Arial" panose="020B0604020202020204" pitchFamily="34" charset="0"/>
               <a:buChar char="•"/>
             </a:pPr>
@@ -10607,7 +11065,7 @@
             </a:r>
           </a:p>
           <a:p>
-            <a:pPr marL="285750" indent="-285750">
+            <a:pPr marL="285750" indent="-285750" algn="just">
               <a:buFont typeface="Arial" panose="020B0604020202020204" pitchFamily="34" charset="0"/>
               <a:buChar char="•"/>
             </a:pPr>
@@ -10617,7 +11075,7 @@
             </a:r>
           </a:p>
           <a:p>
-            <a:pPr marL="285750" indent="-285750">
+            <a:pPr marL="285750" indent="-285750" algn="just">
               <a:buFont typeface="Arial" panose="020B0604020202020204" pitchFamily="34" charset="0"/>
               <a:buChar char="•"/>
             </a:pPr>
@@ -10627,6 +11085,7 @@
             </a:r>
           </a:p>
           <a:p>
+            <a:pPr algn="just"/>
             <a:endParaRPr lang="en-US" dirty="0"/>
           </a:p>
         </p:txBody>
@@ -10736,7 +11195,7 @@
         <p:spPr>
           <a:xfrm>
             <a:off x="1664898" y="5227608"/>
-            <a:ext cx="8128000" cy="338554"/>
+            <a:ext cx="8128000" cy="369332"/>
           </a:xfrm>
           <a:prstGeom prst="rect">
             <a:avLst/>
@@ -10750,7 +11209,7 @@
           <a:lstStyle/>
           <a:p>
             <a:r>
-              <a:rPr lang="en-US" sz="1600" dirty="0"/>
+              <a:rPr lang="en-US" dirty="0"/>
               <a:t>Note: The employment data values are in thousands </a:t>
             </a:r>
           </a:p>

</xml_diff>

<commit_message>
Added correct map in ppt
</commit_message>
<xml_diff>
--- a/Project1.pptx
+++ b/Project1.pptx
@@ -9489,10 +9489,10 @@
       </p:sp>
       <p:pic>
         <p:nvPicPr>
-          <p:cNvPr id="5" name="Picture 4" descr="A map of the united states&#10;&#10;Description automatically generated">
+          <p:cNvPr id="4" name="Picture 3" descr="A map of the united states&#10;&#10;Description automatically generated">
             <a:extLst>
               <a:ext uri="{FF2B5EF4-FFF2-40B4-BE49-F238E27FC236}">
-                <a16:creationId xmlns:a16="http://schemas.microsoft.com/office/drawing/2014/main" id="{19F43834-F69A-F86E-C5EB-69144D03EADC}"/>
+                <a16:creationId xmlns:a16="http://schemas.microsoft.com/office/drawing/2014/main" id="{8917DD46-0943-EAC5-D6EB-DE5F6A469BB2}"/>
               </a:ext>
             </a:extLst>
           </p:cNvPr>
@@ -9509,8 +9509,8 @@
         </p:blipFill>
         <p:spPr>
           <a:xfrm>
-            <a:off x="123569" y="1310006"/>
-            <a:ext cx="11640064" cy="5355635"/>
+            <a:off x="855406" y="1075039"/>
+            <a:ext cx="10908226" cy="5134032"/>
           </a:xfrm>
           <a:prstGeom prst="rect">
             <a:avLst/>

</xml_diff>

<commit_message>
Added the final slides
</commit_message>
<xml_diff>
--- a/Project1.pptx
+++ b/Project1.pptx
@@ -6,7 +6,7 @@
     <p:sldMasterId id="2147483700" r:id="rId2"/>
   </p:sldMasterIdLst>
   <p:notesMasterIdLst>
-    <p:notesMasterId r:id="rId28"/>
+    <p:notesMasterId r:id="rId30"/>
   </p:notesMasterIdLst>
   <p:sldIdLst>
     <p:sldId id="256" r:id="rId3"/>
@@ -21,19 +21,21 @@
     <p:sldId id="278" r:id="rId12"/>
     <p:sldId id="279" r:id="rId13"/>
     <p:sldId id="280" r:id="rId14"/>
-    <p:sldId id="291" r:id="rId15"/>
+    <p:sldId id="294" r:id="rId15"/>
     <p:sldId id="290" r:id="rId16"/>
     <p:sldId id="289" r:id="rId17"/>
     <p:sldId id="264" r:id="rId18"/>
     <p:sldId id="281" r:id="rId19"/>
     <p:sldId id="282" r:id="rId20"/>
-    <p:sldId id="266" r:id="rId21"/>
-    <p:sldId id="267" r:id="rId22"/>
-    <p:sldId id="268" r:id="rId23"/>
-    <p:sldId id="284" r:id="rId24"/>
-    <p:sldId id="285" r:id="rId25"/>
-    <p:sldId id="292" r:id="rId26"/>
-    <p:sldId id="293" r:id="rId27"/>
+    <p:sldId id="267" r:id="rId21"/>
+    <p:sldId id="268" r:id="rId22"/>
+    <p:sldId id="284" r:id="rId23"/>
+    <p:sldId id="285" r:id="rId24"/>
+    <p:sldId id="266" r:id="rId25"/>
+    <p:sldId id="296" r:id="rId26"/>
+    <p:sldId id="292" r:id="rId27"/>
+    <p:sldId id="295" r:id="rId28"/>
+    <p:sldId id="293" r:id="rId29"/>
   </p:sldIdLst>
   <p:sldSz cx="12192000" cy="6858000"/>
   <p:notesSz cx="6858000" cy="9144000"/>
@@ -12309,6 +12311,14 @@
 <file path=ppt/slides/slide13.xml><?xml version="1.0" encoding="utf-8"?>
 <p:sld xmlns:a="http://schemas.openxmlformats.org/drawingml/2006/main" xmlns:r="http://schemas.openxmlformats.org/officeDocument/2006/relationships" xmlns:p="http://schemas.openxmlformats.org/presentationml/2006/main">
   <p:cSld>
+    <p:bg>
+      <p:bgPr>
+        <a:solidFill>
+          <a:schemeClr val="bg1"/>
+        </a:solidFill>
+        <a:effectLst/>
+      </p:bgPr>
+    </p:bg>
     <p:spTree>
       <p:nvGrpSpPr>
         <p:cNvPr id="1" name=""/>
@@ -12325,78 +12335,165 @@
       </p:grpSpPr>
       <p:sp>
         <p:nvSpPr>
-          <p:cNvPr id="2" name="Title 1">
+          <p:cNvPr id="10" name="Rectangle 9">
             <a:extLst>
               <a:ext uri="{FF2B5EF4-FFF2-40B4-BE49-F238E27FC236}">
-                <a16:creationId xmlns:a16="http://schemas.microsoft.com/office/drawing/2014/main" id="{2E5757C9-6549-FC6F-221B-F2E8B09CE0F1}"/>
+                <a16:creationId xmlns:a16="http://schemas.microsoft.com/office/drawing/2014/main" id="{42A4FC2C-047E-45A5-965D-8E1E3BF09BC6}"/>
+              </a:ext>
+              <a:ext uri="{C183D7F6-B498-43B3-948B-1728B52AA6E4}">
+                <adec:decorative xmlns:adec="http://schemas.microsoft.com/office/drawing/2017/decorative" val="1"/>
               </a:ext>
             </a:extLst>
           </p:cNvPr>
-          <p:cNvSpPr txBox="1">
-            <a:spLocks/>
+          <p:cNvSpPr>
+            <a:spLocks noGrp="1" noRot="1" noChangeAspect="1" noMove="1" noResize="1" noEditPoints="1" noAdjustHandles="1" noChangeArrowheads="1" noChangeShapeType="1" noTextEdit="1"/>
           </p:cNvSpPr>
-          <p:nvPr/>
+          <p:nvPr>
+            <p:extLst>
+              <p:ext uri="{386F3935-93C4-4BCD-93E2-E3B085C9AB24}">
+                <p16:designElem xmlns:p16="http://schemas.microsoft.com/office/powerpoint/2015/main" val="1"/>
+              </p:ext>
+            </p:extLst>
+          </p:nvPr>
         </p:nvSpPr>
-        <p:spPr>
+        <p:spPr bwMode="white">
           <a:xfrm>
-            <a:off x="703751" y="2037972"/>
-            <a:ext cx="3132940" cy="1391027"/>
+            <a:off x="1524" y="0"/>
+            <a:ext cx="12188952" cy="6858000"/>
           </a:xfrm>
           <a:prstGeom prst="rect">
             <a:avLst/>
           </a:prstGeom>
+          <a:noFill/>
+          <a:ln>
+            <a:noFill/>
+          </a:ln>
         </p:spPr>
+        <p:style>
+          <a:lnRef idx="2">
+            <a:schemeClr val="accent1">
+              <a:shade val="50000"/>
+            </a:schemeClr>
+          </a:lnRef>
+          <a:fillRef idx="1">
+            <a:schemeClr val="accent1"/>
+          </a:fillRef>
+          <a:effectRef idx="0">
+            <a:schemeClr val="accent1"/>
+          </a:effectRef>
+          <a:fontRef idx="minor">
+            <a:schemeClr val="lt1"/>
+          </a:fontRef>
+        </p:style>
         <p:txBody>
-          <a:bodyPr anchor="t">
-            <a:normAutofit/>
-          </a:bodyPr>
+          <a:bodyPr rtlCol="0" anchor="ctr"/>
           <a:lstStyle>
-            <a:lvl1pPr algn="l" defTabSz="914400" rtl="0" eaLnBrk="1" latinLnBrk="0" hangingPunct="1">
-              <a:lnSpc>
-                <a:spcPct val="90000"/>
-              </a:lnSpc>
-              <a:spcBef>
-                <a:spcPct val="0"/>
-              </a:spcBef>
-              <a:buNone/>
-              <a:defRPr sz="4400" kern="1200">
+            <a:defPPr>
+              <a:defRPr lang="en-US"/>
+            </a:defPPr>
+            <a:lvl1pPr marL="0" algn="l" defTabSz="914400" rtl="0" eaLnBrk="1" latinLnBrk="0" hangingPunct="1">
+              <a:defRPr sz="1800" kern="1200">
                 <a:solidFill>
-                  <a:schemeClr val="tx1"/>
+                  <a:schemeClr val="lt1"/>
                 </a:solidFill>
-                <a:latin typeface="+mj-lt"/>
-                <a:ea typeface="+mj-ea"/>
-                <a:cs typeface="+mj-cs"/>
+                <a:latin typeface="+mn-lt"/>
+                <a:ea typeface="+mn-ea"/>
+                <a:cs typeface="+mn-cs"/>
               </a:defRPr>
             </a:lvl1pPr>
+            <a:lvl2pPr marL="457200" algn="l" defTabSz="914400" rtl="0" eaLnBrk="1" latinLnBrk="0" hangingPunct="1">
+              <a:defRPr sz="1800" kern="1200">
+                <a:solidFill>
+                  <a:schemeClr val="lt1"/>
+                </a:solidFill>
+                <a:latin typeface="+mn-lt"/>
+                <a:ea typeface="+mn-ea"/>
+                <a:cs typeface="+mn-cs"/>
+              </a:defRPr>
+            </a:lvl2pPr>
+            <a:lvl3pPr marL="914400" algn="l" defTabSz="914400" rtl="0" eaLnBrk="1" latinLnBrk="0" hangingPunct="1">
+              <a:defRPr sz="1800" kern="1200">
+                <a:solidFill>
+                  <a:schemeClr val="lt1"/>
+                </a:solidFill>
+                <a:latin typeface="+mn-lt"/>
+                <a:ea typeface="+mn-ea"/>
+                <a:cs typeface="+mn-cs"/>
+              </a:defRPr>
+            </a:lvl3pPr>
+            <a:lvl4pPr marL="1371600" algn="l" defTabSz="914400" rtl="0" eaLnBrk="1" latinLnBrk="0" hangingPunct="1">
+              <a:defRPr sz="1800" kern="1200">
+                <a:solidFill>
+                  <a:schemeClr val="lt1"/>
+                </a:solidFill>
+                <a:latin typeface="+mn-lt"/>
+                <a:ea typeface="+mn-ea"/>
+                <a:cs typeface="+mn-cs"/>
+              </a:defRPr>
+            </a:lvl4pPr>
+            <a:lvl5pPr marL="1828800" algn="l" defTabSz="914400" rtl="0" eaLnBrk="1" latinLnBrk="0" hangingPunct="1">
+              <a:defRPr sz="1800" kern="1200">
+                <a:solidFill>
+                  <a:schemeClr val="lt1"/>
+                </a:solidFill>
+                <a:latin typeface="+mn-lt"/>
+                <a:ea typeface="+mn-ea"/>
+                <a:cs typeface="+mn-cs"/>
+              </a:defRPr>
+            </a:lvl5pPr>
+            <a:lvl6pPr marL="2286000" algn="l" defTabSz="914400" rtl="0" eaLnBrk="1" latinLnBrk="0" hangingPunct="1">
+              <a:defRPr sz="1800" kern="1200">
+                <a:solidFill>
+                  <a:schemeClr val="lt1"/>
+                </a:solidFill>
+                <a:latin typeface="+mn-lt"/>
+                <a:ea typeface="+mn-ea"/>
+                <a:cs typeface="+mn-cs"/>
+              </a:defRPr>
+            </a:lvl6pPr>
+            <a:lvl7pPr marL="2743200" algn="l" defTabSz="914400" rtl="0" eaLnBrk="1" latinLnBrk="0" hangingPunct="1">
+              <a:defRPr sz="1800" kern="1200">
+                <a:solidFill>
+                  <a:schemeClr val="lt1"/>
+                </a:solidFill>
+                <a:latin typeface="+mn-lt"/>
+                <a:ea typeface="+mn-ea"/>
+                <a:cs typeface="+mn-cs"/>
+              </a:defRPr>
+            </a:lvl7pPr>
+            <a:lvl8pPr marL="3200400" algn="l" defTabSz="914400" rtl="0" eaLnBrk="1" latinLnBrk="0" hangingPunct="1">
+              <a:defRPr sz="1800" kern="1200">
+                <a:solidFill>
+                  <a:schemeClr val="lt1"/>
+                </a:solidFill>
+                <a:latin typeface="+mn-lt"/>
+                <a:ea typeface="+mn-ea"/>
+                <a:cs typeface="+mn-cs"/>
+              </a:defRPr>
+            </a:lvl8pPr>
+            <a:lvl9pPr marL="3657600" algn="l" defTabSz="914400" rtl="0" eaLnBrk="1" latinLnBrk="0" hangingPunct="1">
+              <a:defRPr sz="1800" kern="1200">
+                <a:solidFill>
+                  <a:schemeClr val="lt1"/>
+                </a:solidFill>
+                <a:latin typeface="+mn-lt"/>
+                <a:ea typeface="+mn-ea"/>
+                <a:cs typeface="+mn-cs"/>
+              </a:defRPr>
+            </a:lvl9pPr>
           </a:lstStyle>
           <a:p>
-            <a:pPr defTabSz="850392"/>
-            <a:br>
-              <a:rPr lang="en-US" sz="1800" dirty="0"/>
-            </a:br>
-            <a:r>
-              <a:rPr lang="en-US" sz="1800" dirty="0">
-                <a:latin typeface="Bradley Hand" pitchFamily="2" charset="77"/>
-              </a:rPr>
-              <a:t>Across 22 major occupations, Bar graph here exhibits the highest and lowest paying jobs</a:t>
-            </a:r>
-            <a:r>
-              <a:rPr lang="en-US" sz="1800" dirty="0"/>
-              <a:t>. </a:t>
-            </a:r>
-            <a:br>
-              <a:rPr lang="en-US" sz="1800" dirty="0"/>
-            </a:br>
-            <a:endParaRPr lang="en-US" sz="1800" dirty="0"/>
+            <a:pPr algn="ctr"/>
+            <a:endParaRPr lang="en-US"/>
           </a:p>
         </p:txBody>
       </p:sp>
       <p:pic>
         <p:nvPicPr>
-          <p:cNvPr id="3" name="Picture 2">
+          <p:cNvPr id="7" name="Picture 6" descr="A graph of a number of blue and white bars&#10;&#10;Description automatically generated">
             <a:extLst>
               <a:ext uri="{FF2B5EF4-FFF2-40B4-BE49-F238E27FC236}">
-                <a16:creationId xmlns:a16="http://schemas.microsoft.com/office/drawing/2014/main" id="{37A4DD80-0CC5-D4A8-984E-1A1D5259649E}"/>
+                <a16:creationId xmlns:a16="http://schemas.microsoft.com/office/drawing/2014/main" id="{7461CF3D-FEE8-FEE8-F697-B8B09DF82089}"/>
               </a:ext>
             </a:extLst>
           </p:cNvPr>
@@ -12413,20 +12510,121 @@
         </p:blipFill>
         <p:spPr>
           <a:xfrm>
-            <a:off x="4337409" y="1069647"/>
-            <a:ext cx="7525408" cy="5090592"/>
+            <a:off x="5026330" y="104503"/>
+            <a:ext cx="7280189" cy="6858000"/>
           </a:xfrm>
           <a:prstGeom prst="rect">
             <a:avLst/>
           </a:prstGeom>
         </p:spPr>
       </p:pic>
+      <p:sp>
+        <p:nvSpPr>
+          <p:cNvPr id="8" name="TextBox 7">
+            <a:extLst>
+              <a:ext uri="{FF2B5EF4-FFF2-40B4-BE49-F238E27FC236}">
+                <a16:creationId xmlns:a16="http://schemas.microsoft.com/office/drawing/2014/main" id="{C8AF4146-703A-B1E7-1F6F-10B45E14326D}"/>
+              </a:ext>
+            </a:extLst>
+          </p:cNvPr>
+          <p:cNvSpPr txBox="1"/>
+          <p:nvPr/>
+        </p:nvSpPr>
+        <p:spPr>
+          <a:xfrm>
+            <a:off x="4389119" y="-646331"/>
+            <a:ext cx="2730137" cy="646331"/>
+          </a:xfrm>
+          <a:prstGeom prst="rect">
+            <a:avLst/>
+          </a:prstGeom>
+          <a:noFill/>
+        </p:spPr>
+        <p:txBody>
+          <a:bodyPr wrap="square" rtlCol="0">
+            <a:spAutoFit/>
+          </a:bodyPr>
+          <a:lstStyle/>
+          <a:p>
+            <a:r>
+              <a:rPr lang="en-US" sz="1800" b="1" dirty="0">
+                <a:solidFill>
+                  <a:srgbClr val="002060"/>
+                </a:solidFill>
+                <a:latin typeface="Bradley Hand" pitchFamily="2" charset="77"/>
+              </a:rPr>
+              <a:t>   </a:t>
+            </a:r>
+            <a:r>
+              <a:rPr lang="en-US" sz="1800" b="1" dirty="0">
+                <a:solidFill>
+                  <a:srgbClr val="002060"/>
+                </a:solidFill>
+                <a:latin typeface="Meiryo" panose="020B0604030504040204" pitchFamily="34" charset="-128"/>
+                <a:ea typeface="Meiryo" panose="020B0604030504040204" pitchFamily="34" charset="-128"/>
+              </a:rPr>
+              <a:t>Wages Distribution</a:t>
+            </a:r>
+          </a:p>
+          <a:p>
+            <a:endParaRPr lang="en-US" dirty="0"/>
+          </a:p>
+        </p:txBody>
+      </p:sp>
+      <p:sp>
+        <p:nvSpPr>
+          <p:cNvPr id="12" name="TextBox 11">
+            <a:extLst>
+              <a:ext uri="{FF2B5EF4-FFF2-40B4-BE49-F238E27FC236}">
+                <a16:creationId xmlns:a16="http://schemas.microsoft.com/office/drawing/2014/main" id="{8FE0C1CC-7AAA-D239-E291-6FA0DF16315A}"/>
+              </a:ext>
+            </a:extLst>
+          </p:cNvPr>
+          <p:cNvSpPr txBox="1"/>
+          <p:nvPr/>
+        </p:nvSpPr>
+        <p:spPr>
+          <a:xfrm>
+            <a:off x="431075" y="1136469"/>
+            <a:ext cx="3004456" cy="1200329"/>
+          </a:xfrm>
+          <a:prstGeom prst="rect">
+            <a:avLst/>
+          </a:prstGeom>
+          <a:noFill/>
+        </p:spPr>
+        <p:txBody>
+          <a:bodyPr wrap="square" rtlCol="0">
+            <a:spAutoFit/>
+          </a:bodyPr>
+          <a:lstStyle/>
+          <a:p>
+            <a:r>
+              <a:rPr lang="en-US" sz="1800" kern="1200" dirty="0">
+                <a:solidFill>
+                  <a:srgbClr val="002060"/>
+                </a:solidFill>
+                <a:latin typeface="Meiryo" panose="020B0604030504040204" pitchFamily="34" charset="-128"/>
+                <a:ea typeface="Meiryo" panose="020B0604030504040204" pitchFamily="34" charset="-128"/>
+              </a:rPr>
+              <a:t>Across 22 major occupations, Bar graph here exhibits the highest and lowest paying jobs</a:t>
+            </a:r>
+            <a:endParaRPr lang="en-US" dirty="0">
+              <a:solidFill>
+                <a:srgbClr val="002060"/>
+              </a:solidFill>
+              <a:latin typeface="Meiryo" panose="020B0604030504040204" pitchFamily="34" charset="-128"/>
+              <a:ea typeface="Meiryo" panose="020B0604030504040204" pitchFamily="34" charset="-128"/>
+            </a:endParaRPr>
+          </a:p>
+        </p:txBody>
+      </p:sp>
       <p:graphicFrame>
         <p:nvGraphicFramePr>
-          <p:cNvPr id="4" name="Table 3">
+          <p:cNvPr id="13" name="Table 12">
             <a:extLst>
               <a:ext uri="{FF2B5EF4-FFF2-40B4-BE49-F238E27FC236}">
-                <a16:creationId xmlns:a16="http://schemas.microsoft.com/office/drawing/2014/main" id="{0A09082D-D94C-F761-DE1C-E730D5F35EE0}"/>
+                <a16:creationId xmlns:a16="http://schemas.microsoft.com/office/drawing/2014/main" id="{451093A5-7749-3D2F-D5AA-79B244FC6520}"/>
               </a:ext>
             </a:extLst>
           </p:cNvPr>
@@ -12436,14 +12634,14 @@
           <p:nvPr>
             <p:extLst>
               <p:ext uri="{D42A27DB-BD31-4B8C-83A1-F6EECF244321}">
-                <p14:modId xmlns:p14="http://schemas.microsoft.com/office/powerpoint/2010/main" val="2496339858"/>
+                <p14:modId xmlns:p14="http://schemas.microsoft.com/office/powerpoint/2010/main" val="3751156350"/>
               </p:ext>
             </p:extLst>
           </p:nvPr>
         </p:nvGraphicFramePr>
         <p:xfrm>
-          <a:off x="457200" y="3859716"/>
-          <a:ext cx="3752192" cy="1530854"/>
+          <a:off x="130629" y="3213463"/>
+          <a:ext cx="4519747" cy="1719140"/>
         </p:xfrm>
         <a:graphic>
           <a:graphicData uri="http://schemas.openxmlformats.org/drawingml/2006/table">
@@ -12452,14 +12650,14 @@
                 <a:tableStyleId>{5C22544A-7EE6-4342-B048-85BDC9FD1C3A}</a:tableStyleId>
               </a:tblPr>
               <a:tblGrid>
-                <a:gridCol w="2314732">
+                <a:gridCol w="2788237">
                   <a:extLst>
                     <a:ext uri="{9D8B030D-6E8A-4147-A177-3AD203B41FA5}">
                       <a16:colId xmlns:a16="http://schemas.microsoft.com/office/drawing/2014/main" val="1939791815"/>
                     </a:ext>
                   </a:extLst>
                 </a:gridCol>
-                <a:gridCol w="1437460">
+                <a:gridCol w="1731510">
                   <a:extLst>
                     <a:ext uri="{9D8B030D-6E8A-4147-A177-3AD203B41FA5}">
                       <a16:colId xmlns:a16="http://schemas.microsoft.com/office/drawing/2014/main" val="2814798671"/>
@@ -12467,7 +12665,7 @@
                   </a:extLst>
                 </a:gridCol>
               </a:tblGrid>
-              <a:tr h="268222">
+              <a:tr h="429785">
                 <a:tc>
                   <a:txBody>
                     <a:bodyPr/>
@@ -12475,20 +12673,23 @@
                     <a:p>
                       <a:pPr algn="ctr" fontAlgn="b"/>
                       <a:r>
-                        <a:rPr lang="en-US" sz="1600" b="1" u="none" strike="noStrike" dirty="0">
+                        <a:rPr lang="en-US" sz="1200" b="1" u="none" strike="noStrike" dirty="0">
                           <a:solidFill>
                             <a:srgbClr val="0070C0"/>
                           </a:solidFill>
                           <a:effectLst/>
+                          <a:latin typeface="Meiryo" panose="020B0604030504040204" pitchFamily="34" charset="-128"/>
+                          <a:ea typeface="Meiryo" panose="020B0604030504040204" pitchFamily="34" charset="-128"/>
                         </a:rPr>
                         <a:t>Highest Pay</a:t>
                       </a:r>
-                      <a:endParaRPr lang="en-US" sz="1600" b="1" i="0" u="none" strike="noStrike" dirty="0">
+                      <a:endParaRPr lang="en-US" sz="1200" b="1" i="0" u="none" strike="noStrike" dirty="0">
                         <a:solidFill>
                           <a:srgbClr val="0070C0"/>
                         </a:solidFill>
                         <a:effectLst/>
-                        <a:latin typeface="Calibri" panose="020F0502020204030204" pitchFamily="34" charset="0"/>
+                        <a:latin typeface="Meiryo" panose="020B0604030504040204" pitchFamily="34" charset="-128"/>
+                        <a:ea typeface="Meiryo" panose="020B0604030504040204" pitchFamily="34" charset="-128"/>
                       </a:endParaRPr>
                     </a:p>
                   </a:txBody>
@@ -12501,20 +12702,23 @@
                     <a:p>
                       <a:pPr algn="ctr" fontAlgn="b"/>
                       <a:r>
-                        <a:rPr lang="en-US" sz="1600" b="1" u="none" strike="noStrike" dirty="0">
+                        <a:rPr lang="en-US" sz="1200" b="1" u="none" strike="noStrike" dirty="0">
                           <a:solidFill>
                             <a:srgbClr val="0070C0"/>
                           </a:solidFill>
                           <a:effectLst/>
+                          <a:latin typeface="Meiryo" panose="020B0604030504040204" pitchFamily="34" charset="-128"/>
+                          <a:ea typeface="Meiryo" panose="020B0604030504040204" pitchFamily="34" charset="-128"/>
                         </a:rPr>
                         <a:t>Lowest Pay</a:t>
                       </a:r>
-                      <a:endParaRPr lang="en-US" sz="1600" b="1" i="0" u="none" strike="noStrike" dirty="0">
+                      <a:endParaRPr lang="en-US" sz="1200" b="1" i="0" u="none" strike="noStrike" dirty="0">
                         <a:solidFill>
                           <a:srgbClr val="0070C0"/>
                         </a:solidFill>
                         <a:effectLst/>
-                        <a:latin typeface="Calibri" panose="020F0502020204030204" pitchFamily="34" charset="0"/>
+                        <a:latin typeface="Meiryo" panose="020B0604030504040204" pitchFamily="34" charset="-128"/>
+                        <a:ea typeface="Meiryo" panose="020B0604030504040204" pitchFamily="34" charset="-128"/>
                       </a:endParaRPr>
                     </a:p>
                   </a:txBody>
@@ -12526,7 +12730,7 @@
                   </a:ext>
                 </a:extLst>
               </a:tr>
-              <a:tr h="268222">
+              <a:tr h="429785">
                 <a:tc>
                   <a:txBody>
                     <a:bodyPr/>
@@ -12534,17 +12738,20 @@
                     <a:p>
                       <a:pPr algn="ctr" fontAlgn="b"/>
                       <a:r>
-                        <a:rPr lang="en-US" sz="1600" u="none" strike="noStrike" dirty="0">
+                        <a:rPr lang="en-US" sz="1200" u="none" strike="noStrike" dirty="0">
                           <a:effectLst/>
+                          <a:latin typeface="Meiryo" panose="020B0604030504040204" pitchFamily="34" charset="-128"/>
+                          <a:ea typeface="Meiryo" panose="020B0604030504040204" pitchFamily="34" charset="-128"/>
                         </a:rPr>
                         <a:t>Management </a:t>
                       </a:r>
-                      <a:endParaRPr lang="en-US" sz="1600" b="0" i="0" u="none" strike="noStrike" dirty="0">
+                      <a:endParaRPr lang="en-US" sz="1200" b="0" i="0" u="none" strike="noStrike" dirty="0">
                         <a:solidFill>
                           <a:srgbClr val="000000"/>
                         </a:solidFill>
                         <a:effectLst/>
-                        <a:latin typeface="Calibri" panose="020F0502020204030204" pitchFamily="34" charset="0"/>
+                        <a:latin typeface="Meiryo" panose="020B0604030504040204" pitchFamily="34" charset="-128"/>
+                        <a:ea typeface="Meiryo" panose="020B0604030504040204" pitchFamily="34" charset="-128"/>
                       </a:endParaRPr>
                     </a:p>
                   </a:txBody>
@@ -12557,17 +12764,20 @@
                     <a:p>
                       <a:pPr algn="ctr" fontAlgn="b"/>
                       <a:r>
-                        <a:rPr lang="en-US" sz="1600" u="none" strike="noStrike" dirty="0">
+                        <a:rPr lang="en-US" sz="1200" u="none" strike="noStrike" dirty="0">
                           <a:effectLst/>
+                          <a:latin typeface="Meiryo" panose="020B0604030504040204" pitchFamily="34" charset="-128"/>
+                          <a:ea typeface="Meiryo" panose="020B0604030504040204" pitchFamily="34" charset="-128"/>
                         </a:rPr>
                         <a:t>Food Industry</a:t>
                       </a:r>
-                      <a:endParaRPr lang="en-US" sz="1600" b="0" i="0" u="none" strike="noStrike" dirty="0">
+                      <a:endParaRPr lang="en-US" sz="1200" b="0" i="0" u="none" strike="noStrike" dirty="0">
                         <a:solidFill>
                           <a:srgbClr val="000000"/>
                         </a:solidFill>
                         <a:effectLst/>
-                        <a:latin typeface="Calibri" panose="020F0502020204030204" pitchFamily="34" charset="0"/>
+                        <a:latin typeface="Meiryo" panose="020B0604030504040204" pitchFamily="34" charset="-128"/>
+                        <a:ea typeface="Meiryo" panose="020B0604030504040204" pitchFamily="34" charset="-128"/>
                       </a:endParaRPr>
                     </a:p>
                   </a:txBody>
@@ -12579,7 +12789,7 @@
                   </a:ext>
                 </a:extLst>
               </a:tr>
-              <a:tr h="268222">
+              <a:tr h="429785">
                 <a:tc>
                   <a:txBody>
                     <a:bodyPr/>
@@ -12587,17 +12797,20 @@
                     <a:p>
                       <a:pPr algn="ctr" fontAlgn="b"/>
                       <a:r>
-                        <a:rPr lang="en-US" sz="1600" u="none" strike="noStrike" dirty="0">
+                        <a:rPr lang="en-US" sz="1200" u="none" strike="noStrike" dirty="0">
                           <a:effectLst/>
+                          <a:latin typeface="Meiryo" panose="020B0604030504040204" pitchFamily="34" charset="-128"/>
+                          <a:ea typeface="Meiryo" panose="020B0604030504040204" pitchFamily="34" charset="-128"/>
                         </a:rPr>
                         <a:t>Computer and Math occupation</a:t>
                       </a:r>
-                      <a:endParaRPr lang="en-US" sz="1600" b="0" i="0" u="none" strike="noStrike" dirty="0">
+                      <a:endParaRPr lang="en-US" sz="1200" b="0" i="0" u="none" strike="noStrike" dirty="0">
                         <a:solidFill>
                           <a:srgbClr val="000000"/>
                         </a:solidFill>
                         <a:effectLst/>
-                        <a:latin typeface="Calibri" panose="020F0502020204030204" pitchFamily="34" charset="0"/>
+                        <a:latin typeface="Meiryo" panose="020B0604030504040204" pitchFamily="34" charset="-128"/>
+                        <a:ea typeface="Meiryo" panose="020B0604030504040204" pitchFamily="34" charset="-128"/>
                       </a:endParaRPr>
                     </a:p>
                   </a:txBody>
@@ -12610,17 +12823,20 @@
                     <a:p>
                       <a:pPr algn="ctr" fontAlgn="b"/>
                       <a:r>
-                        <a:rPr lang="en-US" sz="1600" u="none" strike="noStrike" dirty="0">
+                        <a:rPr lang="en-US" sz="1200" u="none" strike="noStrike" dirty="0">
                           <a:effectLst/>
+                          <a:latin typeface="Meiryo" panose="020B0604030504040204" pitchFamily="34" charset="-128"/>
+                          <a:ea typeface="Meiryo" panose="020B0604030504040204" pitchFamily="34" charset="-128"/>
                         </a:rPr>
                         <a:t>Sales Jobs</a:t>
                       </a:r>
-                      <a:endParaRPr lang="en-US" sz="1600" b="0" i="0" u="none" strike="noStrike" dirty="0">
+                      <a:endParaRPr lang="en-US" sz="1200" b="0" i="0" u="none" strike="noStrike" dirty="0">
                         <a:solidFill>
                           <a:srgbClr val="000000"/>
                         </a:solidFill>
                         <a:effectLst/>
-                        <a:latin typeface="Calibri" panose="020F0502020204030204" pitchFamily="34" charset="0"/>
+                        <a:latin typeface="Meiryo" panose="020B0604030504040204" pitchFamily="34" charset="-128"/>
+                        <a:ea typeface="Meiryo" panose="020B0604030504040204" pitchFamily="34" charset="-128"/>
                       </a:endParaRPr>
                     </a:p>
                   </a:txBody>
@@ -12632,7 +12848,7 @@
                   </a:ext>
                 </a:extLst>
               </a:tr>
-              <a:tr h="268222">
+              <a:tr h="429785">
                 <a:tc>
                   <a:txBody>
                     <a:bodyPr/>
@@ -12640,17 +12856,20 @@
                     <a:p>
                       <a:pPr algn="ctr" fontAlgn="b"/>
                       <a:r>
-                        <a:rPr lang="en-US" sz="1600" u="none" strike="noStrike">
+                        <a:rPr lang="en-US" sz="1200" u="none" strike="noStrike">
                           <a:effectLst/>
+                          <a:latin typeface="Meiryo" panose="020B0604030504040204" pitchFamily="34" charset="-128"/>
+                          <a:ea typeface="Meiryo" panose="020B0604030504040204" pitchFamily="34" charset="-128"/>
                         </a:rPr>
                         <a:t>Legal</a:t>
                       </a:r>
-                      <a:endParaRPr lang="en-US" sz="1600" b="0" i="0" u="none" strike="noStrike">
+                      <a:endParaRPr lang="en-US" sz="1200" b="0" i="0" u="none" strike="noStrike">
                         <a:solidFill>
                           <a:srgbClr val="000000"/>
                         </a:solidFill>
                         <a:effectLst/>
-                        <a:latin typeface="Calibri" panose="020F0502020204030204" pitchFamily="34" charset="0"/>
+                        <a:latin typeface="Meiryo" panose="020B0604030504040204" pitchFamily="34" charset="-128"/>
+                        <a:ea typeface="Meiryo" panose="020B0604030504040204" pitchFamily="34" charset="-128"/>
                       </a:endParaRPr>
                     </a:p>
                   </a:txBody>
@@ -12663,17 +12882,20 @@
                     <a:p>
                       <a:pPr algn="ctr" fontAlgn="b"/>
                       <a:r>
-                        <a:rPr lang="en-US" sz="1600" u="none" strike="noStrike" dirty="0">
+                        <a:rPr lang="en-US" sz="1200" u="none" strike="noStrike" dirty="0">
                           <a:effectLst/>
+                          <a:latin typeface="Meiryo" panose="020B0604030504040204" pitchFamily="34" charset="-128"/>
+                          <a:ea typeface="Meiryo" panose="020B0604030504040204" pitchFamily="34" charset="-128"/>
                         </a:rPr>
                         <a:t>Healthcare Support</a:t>
                       </a:r>
-                      <a:endParaRPr lang="en-US" sz="1600" b="0" i="0" u="none" strike="noStrike" dirty="0">
+                      <a:endParaRPr lang="en-US" sz="1200" b="0" i="0" u="none" strike="noStrike" dirty="0">
                         <a:solidFill>
                           <a:srgbClr val="000000"/>
                         </a:solidFill>
                         <a:effectLst/>
-                        <a:latin typeface="Calibri" panose="020F0502020204030204" pitchFamily="34" charset="0"/>
+                        <a:latin typeface="Meiryo" panose="020B0604030504040204" pitchFamily="34" charset="-128"/>
+                        <a:ea typeface="Meiryo" panose="020B0604030504040204" pitchFamily="34" charset="-128"/>
                       </a:endParaRPr>
                     </a:p>
                   </a:txBody>
@@ -12689,71 +12911,10 @@
           </a:graphicData>
         </a:graphic>
       </p:graphicFrame>
-      <p:sp>
-        <p:nvSpPr>
-          <p:cNvPr id="5" name="TextBox 4">
-            <a:extLst>
-              <a:ext uri="{FF2B5EF4-FFF2-40B4-BE49-F238E27FC236}">
-                <a16:creationId xmlns:a16="http://schemas.microsoft.com/office/drawing/2014/main" id="{2B4110DA-3CAB-2560-7398-9C5D624F4D9C}"/>
-              </a:ext>
-            </a:extLst>
-          </p:cNvPr>
-          <p:cNvSpPr txBox="1"/>
-          <p:nvPr/>
-        </p:nvSpPr>
-        <p:spPr>
-          <a:xfrm>
-            <a:off x="3051672" y="231354"/>
-            <a:ext cx="4792338" cy="584775"/>
-          </a:xfrm>
-          <a:prstGeom prst="rect">
-            <a:avLst/>
-          </a:prstGeom>
-          <a:noFill/>
-        </p:spPr>
-        <p:txBody>
-          <a:bodyPr wrap="square" rtlCol="0">
-            <a:spAutoFit/>
-          </a:bodyPr>
-          <a:lstStyle/>
-          <a:p>
-            <a:pPr marL="0" marR="0" lvl="0" indent="0" algn="ctr" defTabSz="914400" rtl="0" eaLnBrk="1" fontAlgn="auto" latinLnBrk="0" hangingPunct="1">
-              <a:lnSpc>
-                <a:spcPct val="100000"/>
-              </a:lnSpc>
-              <a:spcBef>
-                <a:spcPts val="0"/>
-              </a:spcBef>
-              <a:spcAft>
-                <a:spcPts val="0"/>
-              </a:spcAft>
-              <a:buClrTx/>
-              <a:buSzTx/>
-              <a:buFontTx/>
-              <a:buNone/>
-              <a:tabLst/>
-              <a:defRPr/>
-            </a:pPr>
-            <a:r>
-              <a:rPr kumimoji="0" lang="en-US" sz="3200" b="1" i="0" u="none" strike="noStrike" kern="1200" cap="none" spc="0" normalizeH="0" baseline="0" noProof="0" dirty="0">
-                <a:ln>
-                  <a:noFill/>
-                </a:ln>
-                <a:effectLst/>
-                <a:uLnTx/>
-                <a:uFillTx/>
-                <a:latin typeface="Meiryo" panose="020B0604030504040204" pitchFamily="34" charset="-128"/>
-                <a:ea typeface="Meiryo" panose="020B0604030504040204" pitchFamily="34" charset="-128"/>
-              </a:rPr>
-              <a:t>Wages Distribution</a:t>
-            </a:r>
-          </a:p>
-        </p:txBody>
-      </p:sp>
     </p:spTree>
     <p:extLst>
       <p:ext uri="{BB962C8B-B14F-4D97-AF65-F5344CB8AC3E}">
-        <p14:creationId xmlns:p14="http://schemas.microsoft.com/office/powerpoint/2010/main" val="3759892850"/>
+        <p14:creationId xmlns:p14="http://schemas.microsoft.com/office/powerpoint/2010/main" val="4189333891"/>
       </p:ext>
     </p:extLst>
   </p:cSld>
@@ -17371,13 +17532,13 @@
           <p:nvPr>
             <p:extLst>
               <p:ext uri="{D42A27DB-BD31-4B8C-83A1-F6EECF244321}">
-                <p14:modId xmlns:p14="http://schemas.microsoft.com/office/powerpoint/2010/main" val="548798040"/>
+                <p14:modId xmlns:p14="http://schemas.microsoft.com/office/powerpoint/2010/main" val="3263796946"/>
               </p:ext>
             </p:extLst>
           </p:nvPr>
         </p:nvGraphicFramePr>
         <p:xfrm>
-          <a:off x="802396" y="0"/>
+          <a:off x="802396" y="312299"/>
           <a:ext cx="10587208" cy="6550938"/>
         </p:xfrm>
         <a:graphic>
@@ -21885,7 +22046,7 @@
           <p:cNvPr id="2" name="Title 1">
             <a:extLst>
               <a:ext uri="{FF2B5EF4-FFF2-40B4-BE49-F238E27FC236}">
-                <a16:creationId xmlns:a16="http://schemas.microsoft.com/office/drawing/2014/main" id="{2A50D09B-00CE-BDD6-8725-C5466B6A8F5A}"/>
+                <a16:creationId xmlns:a16="http://schemas.microsoft.com/office/drawing/2014/main" id="{A112D148-F99E-41E6-C396-5396486C10AE}"/>
               </a:ext>
             </a:extLst>
           </p:cNvPr>
@@ -21896,56 +22057,60 @@
             <p:ph type="title"/>
           </p:nvPr>
         </p:nvSpPr>
-        <p:spPr/>
+        <p:spPr>
+          <a:xfrm>
+            <a:off x="543698" y="111211"/>
+            <a:ext cx="11219934" cy="963828"/>
+          </a:xfrm>
+        </p:spPr>
         <p:txBody>
           <a:bodyPr>
-            <a:noAutofit/>
+            <a:normAutofit/>
           </a:bodyPr>
           <a:lstStyle/>
           <a:p>
             <a:pPr algn="ctr"/>
             <a:r>
               <a:rPr lang="en-US" dirty="0"/>
-              <a:t>Employment prospects for job seekers</a:t>
+              <a:t>Impact of automation per state (Percentage)</a:t>
             </a:r>
           </a:p>
         </p:txBody>
       </p:sp>
-      <p:sp>
-        <p:nvSpPr>
-          <p:cNvPr id="3" name="Content Placeholder 2">
+      <p:pic>
+        <p:nvPicPr>
+          <p:cNvPr id="4" name="Picture 3" descr="A map of the united states&#10;&#10;Description automatically generated">
             <a:extLst>
               <a:ext uri="{FF2B5EF4-FFF2-40B4-BE49-F238E27FC236}">
-                <a16:creationId xmlns:a16="http://schemas.microsoft.com/office/drawing/2014/main" id="{2146A438-C4A9-BCA6-70F9-5C049150BF61}"/>
+                <a16:creationId xmlns:a16="http://schemas.microsoft.com/office/drawing/2014/main" id="{1A86AEAC-F084-1A4F-6073-A407D2A33454}"/>
               </a:ext>
             </a:extLst>
           </p:cNvPr>
-          <p:cNvSpPr>
-            <a:spLocks noGrp="1"/>
-          </p:cNvSpPr>
-          <p:nvPr>
-            <p:ph idx="1"/>
-          </p:nvPr>
-        </p:nvSpPr>
-        <p:spPr/>
-        <p:txBody>
-          <a:bodyPr/>
-          <a:lstStyle/>
-          <a:p>
-            <a:r>
-              <a:rPr lang="en-US" dirty="0"/>
-              <a:t>Answer to question 6</a:t>
-            </a:r>
-          </a:p>
-          <a:p>
-            <a:endParaRPr lang="en-US" dirty="0"/>
-          </a:p>
-        </p:txBody>
-      </p:sp>
+          <p:cNvPicPr>
+            <a:picLocks noChangeAspect="1"/>
+          </p:cNvPicPr>
+          <p:nvPr/>
+        </p:nvPicPr>
+        <p:blipFill>
+          <a:blip r:embed="rId2"/>
+          <a:stretch>
+            <a:fillRect/>
+          </a:stretch>
+        </p:blipFill>
+        <p:spPr>
+          <a:xfrm>
+            <a:off x="543698" y="1229044"/>
+            <a:ext cx="10770154" cy="4978656"/>
+          </a:xfrm>
+          <a:prstGeom prst="rect">
+            <a:avLst/>
+          </a:prstGeom>
+        </p:spPr>
+      </p:pic>
     </p:spTree>
     <p:extLst>
       <p:ext uri="{BB962C8B-B14F-4D97-AF65-F5344CB8AC3E}">
-        <p14:creationId xmlns:p14="http://schemas.microsoft.com/office/powerpoint/2010/main" val="271651074"/>
+        <p14:creationId xmlns:p14="http://schemas.microsoft.com/office/powerpoint/2010/main" val="372559737"/>
       </p:ext>
     </p:extLst>
   </p:cSld>
@@ -22179,102 +22344,6 @@
           <p:cNvPr id="2" name="Title 1">
             <a:extLst>
               <a:ext uri="{FF2B5EF4-FFF2-40B4-BE49-F238E27FC236}">
-                <a16:creationId xmlns:a16="http://schemas.microsoft.com/office/drawing/2014/main" id="{A112D148-F99E-41E6-C396-5396486C10AE}"/>
-              </a:ext>
-            </a:extLst>
-          </p:cNvPr>
-          <p:cNvSpPr>
-            <a:spLocks noGrp="1"/>
-          </p:cNvSpPr>
-          <p:nvPr>
-            <p:ph type="title"/>
-          </p:nvPr>
-        </p:nvSpPr>
-        <p:spPr>
-          <a:xfrm>
-            <a:off x="543698" y="111211"/>
-            <a:ext cx="11219934" cy="963828"/>
-          </a:xfrm>
-        </p:spPr>
-        <p:txBody>
-          <a:bodyPr>
-            <a:normAutofit/>
-          </a:bodyPr>
-          <a:lstStyle/>
-          <a:p>
-            <a:pPr algn="ctr"/>
-            <a:r>
-              <a:rPr lang="en-US" dirty="0"/>
-              <a:t>Impact of automation per state (Percentage)</a:t>
-            </a:r>
-          </a:p>
-        </p:txBody>
-      </p:sp>
-      <p:pic>
-        <p:nvPicPr>
-          <p:cNvPr id="5" name="Picture 4" descr="A map of the united states&#10;&#10;Description automatically generated">
-            <a:extLst>
-              <a:ext uri="{FF2B5EF4-FFF2-40B4-BE49-F238E27FC236}">
-                <a16:creationId xmlns:a16="http://schemas.microsoft.com/office/drawing/2014/main" id="{19F43834-F69A-F86E-C5EB-69144D03EADC}"/>
-              </a:ext>
-            </a:extLst>
-          </p:cNvPr>
-          <p:cNvPicPr>
-            <a:picLocks noChangeAspect="1"/>
-          </p:cNvPicPr>
-          <p:nvPr/>
-        </p:nvPicPr>
-        <p:blipFill>
-          <a:blip r:embed="rId2"/>
-          <a:stretch>
-            <a:fillRect/>
-          </a:stretch>
-        </p:blipFill>
-        <p:spPr>
-          <a:xfrm>
-            <a:off x="123569" y="1310006"/>
-            <a:ext cx="11640064" cy="5355635"/>
-          </a:xfrm>
-          <a:prstGeom prst="rect">
-            <a:avLst/>
-          </a:prstGeom>
-        </p:spPr>
-      </p:pic>
-    </p:spTree>
-    <p:extLst>
-      <p:ext uri="{BB962C8B-B14F-4D97-AF65-F5344CB8AC3E}">
-        <p14:creationId xmlns:p14="http://schemas.microsoft.com/office/powerpoint/2010/main" val="372559737"/>
-      </p:ext>
-    </p:extLst>
-  </p:cSld>
-  <p:clrMapOvr>
-    <a:masterClrMapping/>
-  </p:clrMapOvr>
-</p:sld>
-</file>
-
-<file path=ppt/slides/slide21.xml><?xml version="1.0" encoding="utf-8"?>
-<p:sld xmlns:a="http://schemas.openxmlformats.org/drawingml/2006/main" xmlns:r="http://schemas.openxmlformats.org/officeDocument/2006/relationships" xmlns:p="http://schemas.openxmlformats.org/presentationml/2006/main">
-  <p:cSld>
-    <p:spTree>
-      <p:nvGrpSpPr>
-        <p:cNvPr id="1" name=""/>
-        <p:cNvGrpSpPr/>
-        <p:nvPr/>
-      </p:nvGrpSpPr>
-      <p:grpSpPr>
-        <a:xfrm>
-          <a:off x="0" y="0"/>
-          <a:ext cx="0" cy="0"/>
-          <a:chOff x="0" y="0"/>
-          <a:chExt cx="0" cy="0"/>
-        </a:xfrm>
-      </p:grpSpPr>
-      <p:sp>
-        <p:nvSpPr>
-          <p:cNvPr id="2" name="Title 1">
-            <a:extLst>
-              <a:ext uri="{FF2B5EF4-FFF2-40B4-BE49-F238E27FC236}">
                 <a16:creationId xmlns:a16="http://schemas.microsoft.com/office/drawing/2014/main" id="{5695B0C7-7527-9653-87F6-6A1FFE784120}"/>
               </a:ext>
             </a:extLst>
@@ -22349,7 +22418,7 @@
 </p:sld>
 </file>
 
-<file path=ppt/slides/slide22.xml><?xml version="1.0" encoding="utf-8"?>
+<file path=ppt/slides/slide21.xml><?xml version="1.0" encoding="utf-8"?>
 <p:sld xmlns:a="http://schemas.openxmlformats.org/drawingml/2006/main" xmlns:r="http://schemas.openxmlformats.org/officeDocument/2006/relationships" xmlns:p="http://schemas.openxmlformats.org/presentationml/2006/main">
   <p:cSld>
     <p:spTree>
@@ -22475,7 +22544,7 @@
 </p:sld>
 </file>
 
-<file path=ppt/slides/slide23.xml><?xml version="1.0" encoding="utf-8"?>
+<file path=ppt/slides/slide22.xml><?xml version="1.0" encoding="utf-8"?>
 <p:sld xmlns:a="http://schemas.openxmlformats.org/drawingml/2006/main" xmlns:r="http://schemas.openxmlformats.org/officeDocument/2006/relationships" xmlns:p="http://schemas.openxmlformats.org/presentationml/2006/main">
   <p:cSld>
     <p:spTree>
@@ -22601,7 +22670,249 @@
 </p:sld>
 </file>
 
+<file path=ppt/slides/slide23.xml><?xml version="1.0" encoding="utf-8"?>
+<p:sld xmlns:a="http://schemas.openxmlformats.org/drawingml/2006/main" xmlns:r="http://schemas.openxmlformats.org/officeDocument/2006/relationships" xmlns:p="http://schemas.openxmlformats.org/presentationml/2006/main">
+  <p:cSld>
+    <p:spTree>
+      <p:nvGrpSpPr>
+        <p:cNvPr id="1" name=""/>
+        <p:cNvGrpSpPr/>
+        <p:nvPr/>
+      </p:nvGrpSpPr>
+      <p:grpSpPr>
+        <a:xfrm>
+          <a:off x="0" y="0"/>
+          <a:ext cx="0" cy="0"/>
+          <a:chOff x="0" y="0"/>
+          <a:chExt cx="0" cy="0"/>
+        </a:xfrm>
+      </p:grpSpPr>
+      <p:sp>
+        <p:nvSpPr>
+          <p:cNvPr id="2" name="Title 1">
+            <a:extLst>
+              <a:ext uri="{FF2B5EF4-FFF2-40B4-BE49-F238E27FC236}">
+                <a16:creationId xmlns:a16="http://schemas.microsoft.com/office/drawing/2014/main" id="{2A50D09B-00CE-BDD6-8725-C5466B6A8F5A}"/>
+              </a:ext>
+            </a:extLst>
+          </p:cNvPr>
+          <p:cNvSpPr>
+            <a:spLocks noGrp="1"/>
+          </p:cNvSpPr>
+          <p:nvPr>
+            <p:ph type="title"/>
+          </p:nvPr>
+        </p:nvSpPr>
+        <p:spPr/>
+        <p:txBody>
+          <a:bodyPr>
+            <a:noAutofit/>
+          </a:bodyPr>
+          <a:lstStyle/>
+          <a:p>
+            <a:pPr algn="ctr"/>
+            <a:r>
+              <a:rPr lang="en-US" dirty="0"/>
+              <a:t>Employment prospects for job seekers</a:t>
+            </a:r>
+          </a:p>
+        </p:txBody>
+      </p:sp>
+      <p:pic>
+        <p:nvPicPr>
+          <p:cNvPr id="4" name="Picture 3" descr="A graph with blue dots&#10;&#10;Description automatically generated">
+            <a:extLst>
+              <a:ext uri="{FF2B5EF4-FFF2-40B4-BE49-F238E27FC236}">
+                <a16:creationId xmlns:a16="http://schemas.microsoft.com/office/drawing/2014/main" id="{189F30ED-CB32-835D-5DBB-FB120EDBDB5A}"/>
+              </a:ext>
+            </a:extLst>
+          </p:cNvPr>
+          <p:cNvPicPr>
+            <a:picLocks noChangeAspect="1"/>
+          </p:cNvPicPr>
+          <p:nvPr/>
+        </p:nvPicPr>
+        <p:blipFill>
+          <a:blip r:embed="rId2"/>
+          <a:stretch>
+            <a:fillRect/>
+          </a:stretch>
+        </p:blipFill>
+        <p:spPr>
+          <a:xfrm>
+            <a:off x="6341638" y="2451795"/>
+            <a:ext cx="4670920" cy="3844716"/>
+          </a:xfrm>
+          <a:prstGeom prst="rect">
+            <a:avLst/>
+          </a:prstGeom>
+        </p:spPr>
+      </p:pic>
+      <p:pic>
+        <p:nvPicPr>
+          <p:cNvPr id="8" name="Picture 7" descr="A graph with blue dots&#10;&#10;Description automatically generated">
+            <a:extLst>
+              <a:ext uri="{FF2B5EF4-FFF2-40B4-BE49-F238E27FC236}">
+                <a16:creationId xmlns:a16="http://schemas.microsoft.com/office/drawing/2014/main" id="{48BF51DD-EA3A-7CC9-921E-077AD50B8D41}"/>
+              </a:ext>
+            </a:extLst>
+          </p:cNvPr>
+          <p:cNvPicPr>
+            <a:picLocks noChangeAspect="1"/>
+          </p:cNvPicPr>
+          <p:nvPr/>
+        </p:nvPicPr>
+        <p:blipFill>
+          <a:blip r:embed="rId3"/>
+          <a:stretch>
+            <a:fillRect/>
+          </a:stretch>
+        </p:blipFill>
+        <p:spPr>
+          <a:xfrm>
+            <a:off x="1212464" y="2478975"/>
+            <a:ext cx="4637899" cy="3817536"/>
+          </a:xfrm>
+          <a:prstGeom prst="rect">
+            <a:avLst/>
+          </a:prstGeom>
+        </p:spPr>
+      </p:pic>
+    </p:spTree>
+    <p:extLst>
+      <p:ext uri="{BB962C8B-B14F-4D97-AF65-F5344CB8AC3E}">
+        <p14:creationId xmlns:p14="http://schemas.microsoft.com/office/powerpoint/2010/main" val="271651074"/>
+      </p:ext>
+    </p:extLst>
+  </p:cSld>
+  <p:clrMapOvr>
+    <a:masterClrMapping/>
+  </p:clrMapOvr>
+</p:sld>
+</file>
+
 <file path=ppt/slides/slide24.xml><?xml version="1.0" encoding="utf-8"?>
+<p:sld xmlns:a="http://schemas.openxmlformats.org/drawingml/2006/main" xmlns:r="http://schemas.openxmlformats.org/officeDocument/2006/relationships" xmlns:p="http://schemas.openxmlformats.org/presentationml/2006/main">
+  <p:cSld>
+    <p:spTree>
+      <p:nvGrpSpPr>
+        <p:cNvPr id="1" name=""/>
+        <p:cNvGrpSpPr/>
+        <p:nvPr/>
+      </p:nvGrpSpPr>
+      <p:grpSpPr>
+        <a:xfrm>
+          <a:off x="0" y="0"/>
+          <a:ext cx="0" cy="0"/>
+          <a:chOff x="0" y="0"/>
+          <a:chExt cx="0" cy="0"/>
+        </a:xfrm>
+      </p:grpSpPr>
+      <p:sp>
+        <p:nvSpPr>
+          <p:cNvPr id="2" name="Title 1">
+            <a:extLst>
+              <a:ext uri="{FF2B5EF4-FFF2-40B4-BE49-F238E27FC236}">
+                <a16:creationId xmlns:a16="http://schemas.microsoft.com/office/drawing/2014/main" id="{2A50D09B-00CE-BDD6-8725-C5466B6A8F5A}"/>
+              </a:ext>
+            </a:extLst>
+          </p:cNvPr>
+          <p:cNvSpPr>
+            <a:spLocks noGrp="1"/>
+          </p:cNvSpPr>
+          <p:nvPr>
+            <p:ph type="title"/>
+          </p:nvPr>
+        </p:nvSpPr>
+        <p:spPr/>
+        <p:txBody>
+          <a:bodyPr>
+            <a:noAutofit/>
+          </a:bodyPr>
+          <a:lstStyle/>
+          <a:p>
+            <a:pPr algn="ctr"/>
+            <a:r>
+              <a:rPr lang="en-US" dirty="0"/>
+              <a:t>Employment prospects for job seekers</a:t>
+            </a:r>
+          </a:p>
+        </p:txBody>
+      </p:sp>
+      <p:pic>
+        <p:nvPicPr>
+          <p:cNvPr id="9" name="Picture 8" descr="A graph with blue dots&#10;&#10;Description automatically generated">
+            <a:extLst>
+              <a:ext uri="{FF2B5EF4-FFF2-40B4-BE49-F238E27FC236}">
+                <a16:creationId xmlns:a16="http://schemas.microsoft.com/office/drawing/2014/main" id="{81CA3A6E-5AC1-04F9-D654-294084310BF9}"/>
+              </a:ext>
+            </a:extLst>
+          </p:cNvPr>
+          <p:cNvPicPr>
+            <a:picLocks noChangeAspect="1"/>
+          </p:cNvPicPr>
+          <p:nvPr/>
+        </p:nvPicPr>
+        <p:blipFill>
+          <a:blip r:embed="rId2"/>
+          <a:stretch>
+            <a:fillRect/>
+          </a:stretch>
+        </p:blipFill>
+        <p:spPr>
+          <a:xfrm>
+            <a:off x="1199795" y="2425290"/>
+            <a:ext cx="4670920" cy="3844716"/>
+          </a:xfrm>
+          <a:prstGeom prst="rect">
+            <a:avLst/>
+          </a:prstGeom>
+        </p:spPr>
+      </p:pic>
+      <p:pic>
+        <p:nvPicPr>
+          <p:cNvPr id="11" name="Picture 10" descr="A graph with lines and numbers&#10;&#10;Description automatically generated">
+            <a:extLst>
+              <a:ext uri="{FF2B5EF4-FFF2-40B4-BE49-F238E27FC236}">
+                <a16:creationId xmlns:a16="http://schemas.microsoft.com/office/drawing/2014/main" id="{D5ED1865-CE26-4BF2-CABC-CD71CCEF7CCA}"/>
+              </a:ext>
+            </a:extLst>
+          </p:cNvPr>
+          <p:cNvPicPr>
+            <a:picLocks noChangeAspect="1"/>
+          </p:cNvPicPr>
+          <p:nvPr/>
+        </p:nvPicPr>
+        <p:blipFill>
+          <a:blip r:embed="rId3"/>
+          <a:stretch>
+            <a:fillRect/>
+          </a:stretch>
+        </p:blipFill>
+        <p:spPr>
+          <a:xfrm>
+            <a:off x="6045031" y="2559307"/>
+            <a:ext cx="4947174" cy="3714516"/>
+          </a:xfrm>
+          <a:prstGeom prst="rect">
+            <a:avLst/>
+          </a:prstGeom>
+        </p:spPr>
+      </p:pic>
+    </p:spTree>
+    <p:extLst>
+      <p:ext uri="{BB962C8B-B14F-4D97-AF65-F5344CB8AC3E}">
+        <p14:creationId xmlns:p14="http://schemas.microsoft.com/office/powerpoint/2010/main" val="3792922993"/>
+      </p:ext>
+    </p:extLst>
+  </p:cSld>
+  <p:clrMapOvr>
+    <a:masterClrMapping/>
+  </p:clrMapOvr>
+</p:sld>
+</file>
+
+<file path=ppt/slides/slide25.xml><?xml version="1.0" encoding="utf-8"?>
 <p:sld xmlns:a="http://schemas.openxmlformats.org/drawingml/2006/main" xmlns:r="http://schemas.openxmlformats.org/officeDocument/2006/relationships" xmlns:p="http://schemas.openxmlformats.org/presentationml/2006/main">
   <p:cSld>
     <p:spTree>
@@ -22667,7 +22978,229 @@
 </p:sld>
 </file>
 
-<file path=ppt/slides/slide25.xml><?xml version="1.0" encoding="utf-8"?>
+<file path=ppt/slides/slide26.xml><?xml version="1.0" encoding="utf-8"?>
+<p:sld xmlns:a="http://schemas.openxmlformats.org/drawingml/2006/main" xmlns:r="http://schemas.openxmlformats.org/officeDocument/2006/relationships" xmlns:p="http://schemas.openxmlformats.org/presentationml/2006/main">
+  <p:cSld>
+    <p:bg>
+      <p:bgPr>
+        <a:solidFill>
+          <a:schemeClr val="bg1"/>
+        </a:solidFill>
+        <a:effectLst/>
+      </p:bgPr>
+    </p:bg>
+    <p:spTree>
+      <p:nvGrpSpPr>
+        <p:cNvPr id="1" name=""/>
+        <p:cNvGrpSpPr/>
+        <p:nvPr/>
+      </p:nvGrpSpPr>
+      <p:grpSpPr>
+        <a:xfrm>
+          <a:off x="0" y="0"/>
+          <a:ext cx="0" cy="0"/>
+          <a:chOff x="0" y="0"/>
+          <a:chExt cx="0" cy="0"/>
+        </a:xfrm>
+      </p:grpSpPr>
+      <p:sp>
+        <p:nvSpPr>
+          <p:cNvPr id="8" name="Rectangle 7">
+            <a:extLst>
+              <a:ext uri="{FF2B5EF4-FFF2-40B4-BE49-F238E27FC236}">
+                <a16:creationId xmlns:a16="http://schemas.microsoft.com/office/drawing/2014/main" id="{42A4FC2C-047E-45A5-965D-8E1E3BF09BC6}"/>
+              </a:ext>
+              <a:ext uri="{C183D7F6-B498-43B3-948B-1728B52AA6E4}">
+                <adec:decorative xmlns:adec="http://schemas.microsoft.com/office/drawing/2017/decorative" val="1"/>
+              </a:ext>
+            </a:extLst>
+          </p:cNvPr>
+          <p:cNvSpPr>
+            <a:spLocks noGrp="1" noRot="1" noChangeAspect="1" noMove="1" noResize="1" noEditPoints="1" noAdjustHandles="1" noChangeArrowheads="1" noChangeShapeType="1" noTextEdit="1"/>
+          </p:cNvSpPr>
+          <p:nvPr>
+            <p:extLst>
+              <p:ext uri="{386F3935-93C4-4BCD-93E2-E3B085C9AB24}">
+                <p16:designElem xmlns:p16="http://schemas.microsoft.com/office/powerpoint/2015/main" val="1"/>
+              </p:ext>
+            </p:extLst>
+          </p:nvPr>
+        </p:nvSpPr>
+        <p:spPr bwMode="white">
+          <a:xfrm>
+            <a:off x="1524" y="0"/>
+            <a:ext cx="12188952" cy="6858000"/>
+          </a:xfrm>
+          <a:prstGeom prst="rect">
+            <a:avLst/>
+          </a:prstGeom>
+          <a:noFill/>
+          <a:ln>
+            <a:noFill/>
+          </a:ln>
+        </p:spPr>
+        <p:style>
+          <a:lnRef idx="2">
+            <a:schemeClr val="accent1">
+              <a:shade val="50000"/>
+            </a:schemeClr>
+          </a:lnRef>
+          <a:fillRef idx="1">
+            <a:schemeClr val="accent1"/>
+          </a:fillRef>
+          <a:effectRef idx="0">
+            <a:schemeClr val="accent1"/>
+          </a:effectRef>
+          <a:fontRef idx="minor">
+            <a:schemeClr val="lt1"/>
+          </a:fontRef>
+        </p:style>
+        <p:txBody>
+          <a:bodyPr rtlCol="0" anchor="ctr"/>
+          <a:lstStyle>
+            <a:defPPr>
+              <a:defRPr lang="en-US"/>
+            </a:defPPr>
+            <a:lvl1pPr marL="0" algn="l" defTabSz="914400" rtl="0" eaLnBrk="1" latinLnBrk="0" hangingPunct="1">
+              <a:defRPr sz="1800" kern="1200">
+                <a:solidFill>
+                  <a:schemeClr val="lt1"/>
+                </a:solidFill>
+                <a:latin typeface="+mn-lt"/>
+                <a:ea typeface="+mn-ea"/>
+                <a:cs typeface="+mn-cs"/>
+              </a:defRPr>
+            </a:lvl1pPr>
+            <a:lvl2pPr marL="457200" algn="l" defTabSz="914400" rtl="0" eaLnBrk="1" latinLnBrk="0" hangingPunct="1">
+              <a:defRPr sz="1800" kern="1200">
+                <a:solidFill>
+                  <a:schemeClr val="lt1"/>
+                </a:solidFill>
+                <a:latin typeface="+mn-lt"/>
+                <a:ea typeface="+mn-ea"/>
+                <a:cs typeface="+mn-cs"/>
+              </a:defRPr>
+            </a:lvl2pPr>
+            <a:lvl3pPr marL="914400" algn="l" defTabSz="914400" rtl="0" eaLnBrk="1" latinLnBrk="0" hangingPunct="1">
+              <a:defRPr sz="1800" kern="1200">
+                <a:solidFill>
+                  <a:schemeClr val="lt1"/>
+                </a:solidFill>
+                <a:latin typeface="+mn-lt"/>
+                <a:ea typeface="+mn-ea"/>
+                <a:cs typeface="+mn-cs"/>
+              </a:defRPr>
+            </a:lvl3pPr>
+            <a:lvl4pPr marL="1371600" algn="l" defTabSz="914400" rtl="0" eaLnBrk="1" latinLnBrk="0" hangingPunct="1">
+              <a:defRPr sz="1800" kern="1200">
+                <a:solidFill>
+                  <a:schemeClr val="lt1"/>
+                </a:solidFill>
+                <a:latin typeface="+mn-lt"/>
+                <a:ea typeface="+mn-ea"/>
+                <a:cs typeface="+mn-cs"/>
+              </a:defRPr>
+            </a:lvl4pPr>
+            <a:lvl5pPr marL="1828800" algn="l" defTabSz="914400" rtl="0" eaLnBrk="1" latinLnBrk="0" hangingPunct="1">
+              <a:defRPr sz="1800" kern="1200">
+                <a:solidFill>
+                  <a:schemeClr val="lt1"/>
+                </a:solidFill>
+                <a:latin typeface="+mn-lt"/>
+                <a:ea typeface="+mn-ea"/>
+                <a:cs typeface="+mn-cs"/>
+              </a:defRPr>
+            </a:lvl5pPr>
+            <a:lvl6pPr marL="2286000" algn="l" defTabSz="914400" rtl="0" eaLnBrk="1" latinLnBrk="0" hangingPunct="1">
+              <a:defRPr sz="1800" kern="1200">
+                <a:solidFill>
+                  <a:schemeClr val="lt1"/>
+                </a:solidFill>
+                <a:latin typeface="+mn-lt"/>
+                <a:ea typeface="+mn-ea"/>
+                <a:cs typeface="+mn-cs"/>
+              </a:defRPr>
+            </a:lvl6pPr>
+            <a:lvl7pPr marL="2743200" algn="l" defTabSz="914400" rtl="0" eaLnBrk="1" latinLnBrk="0" hangingPunct="1">
+              <a:defRPr sz="1800" kern="1200">
+                <a:solidFill>
+                  <a:schemeClr val="lt1"/>
+                </a:solidFill>
+                <a:latin typeface="+mn-lt"/>
+                <a:ea typeface="+mn-ea"/>
+                <a:cs typeface="+mn-cs"/>
+              </a:defRPr>
+            </a:lvl7pPr>
+            <a:lvl8pPr marL="3200400" algn="l" defTabSz="914400" rtl="0" eaLnBrk="1" latinLnBrk="0" hangingPunct="1">
+              <a:defRPr sz="1800" kern="1200">
+                <a:solidFill>
+                  <a:schemeClr val="lt1"/>
+                </a:solidFill>
+                <a:latin typeface="+mn-lt"/>
+                <a:ea typeface="+mn-ea"/>
+                <a:cs typeface="+mn-cs"/>
+              </a:defRPr>
+            </a:lvl8pPr>
+            <a:lvl9pPr marL="3657600" algn="l" defTabSz="914400" rtl="0" eaLnBrk="1" latinLnBrk="0" hangingPunct="1">
+              <a:defRPr sz="1800" kern="1200">
+                <a:solidFill>
+                  <a:schemeClr val="lt1"/>
+                </a:solidFill>
+                <a:latin typeface="+mn-lt"/>
+                <a:ea typeface="+mn-ea"/>
+                <a:cs typeface="+mn-cs"/>
+              </a:defRPr>
+            </a:lvl9pPr>
+          </a:lstStyle>
+          <a:p>
+            <a:pPr algn="ctr"/>
+            <a:endParaRPr lang="en-US"/>
+          </a:p>
+        </p:txBody>
+      </p:sp>
+      <p:pic>
+        <p:nvPicPr>
+          <p:cNvPr id="3" name="Picture 2" descr="A thank you card with a blue square&#10;&#10;Description automatically generated with medium confidence">
+            <a:extLst>
+              <a:ext uri="{FF2B5EF4-FFF2-40B4-BE49-F238E27FC236}">
+                <a16:creationId xmlns:a16="http://schemas.microsoft.com/office/drawing/2014/main" id="{A23D8F0F-C873-EFA9-3597-F22A0C20581B}"/>
+              </a:ext>
+            </a:extLst>
+          </p:cNvPr>
+          <p:cNvPicPr>
+            <a:picLocks noChangeAspect="1"/>
+          </p:cNvPicPr>
+          <p:nvPr/>
+        </p:nvPicPr>
+        <p:blipFill rotWithShape="1">
+          <a:blip r:embed="rId2"/>
+          <a:srcRect t="19"/>
+          <a:stretch/>
+        </p:blipFill>
+        <p:spPr>
+          <a:xfrm>
+            <a:off x="20" y="1282"/>
+            <a:ext cx="12191980" cy="6856718"/>
+          </a:xfrm>
+          <a:prstGeom prst="rect">
+            <a:avLst/>
+          </a:prstGeom>
+        </p:spPr>
+      </p:pic>
+    </p:spTree>
+    <p:extLst>
+      <p:ext uri="{BB962C8B-B14F-4D97-AF65-F5344CB8AC3E}">
+        <p14:creationId xmlns:p14="http://schemas.microsoft.com/office/powerpoint/2010/main" val="2801938294"/>
+      </p:ext>
+    </p:extLst>
+  </p:cSld>
+  <p:clrMapOvr>
+    <a:masterClrMapping/>
+  </p:clrMapOvr>
+</p:sld>
+</file>
+
+<file path=ppt/slides/slide27.xml><?xml version="1.0" encoding="utf-8"?>
 <p:sld xmlns:a="http://schemas.openxmlformats.org/drawingml/2006/main" xmlns:r="http://schemas.openxmlformats.org/officeDocument/2006/relationships" xmlns:p="http://schemas.openxmlformats.org/presentationml/2006/main">
   <p:cSld>
     <p:spTree>

</xml_diff>